<commit_message>
Added Angular Client Samples
Added 3 slides with an angular walkthrought
</commit_message>
<xml_diff>
--- a/MeetUP 31-03-2023 BFF and Security/How BFF pattern can be used to improve security in SPAs - 31-03-2023.pptx
+++ b/MeetUP 31-03-2023 BFF and Security/How BFF pattern can be used to improve security in SPAs - 31-03-2023.pptx
@@ -5,7 +5,7 @@
     <p:sldMasterId id="2147483678" r:id="rId1"/>
   </p:sldMasterIdLst>
   <p:notesMasterIdLst>
-    <p:notesMasterId r:id="rId18"/>
+    <p:notesMasterId r:id="rId21"/>
   </p:notesMasterIdLst>
   <p:sldIdLst>
     <p:sldId id="256" r:id="rId2"/>
@@ -22,8 +22,11 @@
     <p:sldId id="274" r:id="rId13"/>
     <p:sldId id="275" r:id="rId14"/>
     <p:sldId id="276" r:id="rId15"/>
-    <p:sldId id="261" r:id="rId16"/>
-    <p:sldId id="277" r:id="rId17"/>
+    <p:sldId id="278" r:id="rId16"/>
+    <p:sldId id="279" r:id="rId17"/>
+    <p:sldId id="280" r:id="rId18"/>
+    <p:sldId id="261" r:id="rId19"/>
+    <p:sldId id="277" r:id="rId20"/>
   </p:sldIdLst>
   <p:sldSz cx="12192000" cy="6858000"/>
   <p:notesSz cx="6858000" cy="9144000"/>
@@ -850,7 +853,7 @@
           <a:p>
             <a:fld id="{3B9BFD26-3B6D-42C5-BD0F-C45581ADE71D}" type="datetimeFigureOut">
               <a:rPr lang="en-US"/>
-              <a:t>3/30/2023</a:t>
+              <a:t>3/31/2023</a:t>
             </a:fld>
             <a:endParaRPr lang="en-US"/>
           </a:p>
@@ -1248,7 +1251,7 @@
           <a:p>
             <a:fld id="{57EECDCE-D2B3-42DA-89CA-3F4E490F6CDF}" type="datetimeFigureOut">
               <a:rPr lang="el-GR" smtClean="0"/>
-              <a:t>30/3/2023</a:t>
+              <a:t>31/3/2023</a:t>
             </a:fld>
             <a:endParaRPr lang="el-GR"/>
           </a:p>
@@ -1418,7 +1421,7 @@
           <a:p>
             <a:fld id="{57EECDCE-D2B3-42DA-89CA-3F4E490F6CDF}" type="datetimeFigureOut">
               <a:rPr lang="el-GR" smtClean="0"/>
-              <a:t>30/3/2023</a:t>
+              <a:t>31/3/2023</a:t>
             </a:fld>
             <a:endParaRPr lang="el-GR"/>
           </a:p>
@@ -1598,7 +1601,7 @@
           <a:p>
             <a:fld id="{57EECDCE-D2B3-42DA-89CA-3F4E490F6CDF}" type="datetimeFigureOut">
               <a:rPr lang="el-GR" smtClean="0"/>
-              <a:t>30/3/2023</a:t>
+              <a:t>31/3/2023</a:t>
             </a:fld>
             <a:endParaRPr lang="el-GR"/>
           </a:p>
@@ -1768,7 +1771,7 @@
           <a:p>
             <a:fld id="{57EECDCE-D2B3-42DA-89CA-3F4E490F6CDF}" type="datetimeFigureOut">
               <a:rPr lang="el-GR" smtClean="0"/>
-              <a:t>30/3/2023</a:t>
+              <a:t>31/3/2023</a:t>
             </a:fld>
             <a:endParaRPr lang="el-GR"/>
           </a:p>
@@ -2014,7 +2017,7 @@
           <a:p>
             <a:fld id="{57EECDCE-D2B3-42DA-89CA-3F4E490F6CDF}" type="datetimeFigureOut">
               <a:rPr lang="el-GR" smtClean="0"/>
-              <a:t>30/3/2023</a:t>
+              <a:t>31/3/2023</a:t>
             </a:fld>
             <a:endParaRPr lang="el-GR"/>
           </a:p>
@@ -2246,7 +2249,7 @@
           <a:p>
             <a:fld id="{57EECDCE-D2B3-42DA-89CA-3F4E490F6CDF}" type="datetimeFigureOut">
               <a:rPr lang="el-GR" smtClean="0"/>
-              <a:t>30/3/2023</a:t>
+              <a:t>31/3/2023</a:t>
             </a:fld>
             <a:endParaRPr lang="el-GR"/>
           </a:p>
@@ -2613,7 +2616,7 @@
           <a:p>
             <a:fld id="{57EECDCE-D2B3-42DA-89CA-3F4E490F6CDF}" type="datetimeFigureOut">
               <a:rPr lang="el-GR" smtClean="0"/>
-              <a:t>30/3/2023</a:t>
+              <a:t>31/3/2023</a:t>
             </a:fld>
             <a:endParaRPr lang="el-GR"/>
           </a:p>
@@ -2731,7 +2734,7 @@
           <a:p>
             <a:fld id="{57EECDCE-D2B3-42DA-89CA-3F4E490F6CDF}" type="datetimeFigureOut">
               <a:rPr lang="el-GR" smtClean="0"/>
-              <a:t>30/3/2023</a:t>
+              <a:t>31/3/2023</a:t>
             </a:fld>
             <a:endParaRPr lang="el-GR"/>
           </a:p>
@@ -2826,7 +2829,7 @@
           <a:p>
             <a:fld id="{57EECDCE-D2B3-42DA-89CA-3F4E490F6CDF}" type="datetimeFigureOut">
               <a:rPr lang="el-GR" smtClean="0"/>
-              <a:t>30/3/2023</a:t>
+              <a:t>31/3/2023</a:t>
             </a:fld>
             <a:endParaRPr lang="el-GR"/>
           </a:p>
@@ -3103,7 +3106,7 @@
           <a:p>
             <a:fld id="{57EECDCE-D2B3-42DA-89CA-3F4E490F6CDF}" type="datetimeFigureOut">
               <a:rPr lang="el-GR" smtClean="0"/>
-              <a:t>30/3/2023</a:t>
+              <a:t>31/3/2023</a:t>
             </a:fld>
             <a:endParaRPr lang="el-GR"/>
           </a:p>
@@ -3356,7 +3359,7 @@
           <a:p>
             <a:fld id="{57EECDCE-D2B3-42DA-89CA-3F4E490F6CDF}" type="datetimeFigureOut">
               <a:rPr lang="el-GR" smtClean="0"/>
-              <a:t>30/3/2023</a:t>
+              <a:t>31/3/2023</a:t>
             </a:fld>
             <a:endParaRPr lang="el-GR"/>
           </a:p>
@@ -3569,7 +3572,7 @@
           <a:p>
             <a:fld id="{57EECDCE-D2B3-42DA-89CA-3F4E490F6CDF}" type="datetimeFigureOut">
               <a:rPr lang="el-GR" smtClean="0"/>
-              <a:t>30/3/2023</a:t>
+              <a:t>31/3/2023</a:t>
             </a:fld>
             <a:endParaRPr lang="el-GR"/>
           </a:p>
@@ -6810,6 +6813,1551 @@
       </p:grpSpPr>
       <p:pic>
         <p:nvPicPr>
+          <p:cNvPr id="8" name="Picture 7">
+            <a:extLst>
+              <a:ext uri="{FF2B5EF4-FFF2-40B4-BE49-F238E27FC236}">
+                <a16:creationId xmlns:a16="http://schemas.microsoft.com/office/drawing/2014/main" id="{D7DED20C-2938-E2EE-71FE-F0FB81C5958A}"/>
+              </a:ext>
+            </a:extLst>
+          </p:cNvPr>
+          <p:cNvPicPr>
+            <a:picLocks noChangeAspect="1"/>
+          </p:cNvPicPr>
+          <p:nvPr/>
+        </p:nvPicPr>
+        <p:blipFill>
+          <a:blip r:embed="rId2">
+            <a:extLst>
+              <a:ext uri="{28A0092B-C50C-407E-A947-70E740481C1C}">
+                <a14:useLocalDpi xmlns:a14="http://schemas.microsoft.com/office/drawing/2010/main" val="0"/>
+              </a:ext>
+            </a:extLst>
+          </a:blip>
+          <a:stretch>
+            <a:fillRect/>
+          </a:stretch>
+        </p:blipFill>
+        <p:spPr>
+          <a:xfrm>
+            <a:off x="5113020" y="5715000"/>
+            <a:ext cx="7078980" cy="1143000"/>
+          </a:xfrm>
+          <a:prstGeom prst="rect">
+            <a:avLst/>
+          </a:prstGeom>
+        </p:spPr>
+      </p:pic>
+      <p:sp>
+        <p:nvSpPr>
+          <p:cNvPr id="2" name="Title 1">
+            <a:extLst>
+              <a:ext uri="{FF2B5EF4-FFF2-40B4-BE49-F238E27FC236}">
+                <a16:creationId xmlns:a16="http://schemas.microsoft.com/office/drawing/2014/main" id="{45AEABC3-6CFD-A198-4158-9EBCDF733BCB}"/>
+              </a:ext>
+            </a:extLst>
+          </p:cNvPr>
+          <p:cNvSpPr>
+            <a:spLocks noGrp="1"/>
+          </p:cNvSpPr>
+          <p:nvPr>
+            <p:ph type="title"/>
+          </p:nvPr>
+        </p:nvSpPr>
+        <p:spPr/>
+        <p:txBody>
+          <a:bodyPr/>
+          <a:lstStyle/>
+          <a:p>
+            <a:r>
+              <a:rPr lang="en-US" dirty="0"/>
+              <a:t>BFF Identity Server with Angular –pt1</a:t>
+            </a:r>
+          </a:p>
+        </p:txBody>
+      </p:sp>
+      <p:sp>
+        <p:nvSpPr>
+          <p:cNvPr id="3" name="Content Placeholder 2">
+            <a:extLst>
+              <a:ext uri="{FF2B5EF4-FFF2-40B4-BE49-F238E27FC236}">
+                <a16:creationId xmlns:a16="http://schemas.microsoft.com/office/drawing/2014/main" id="{1CA9431B-5551-6B58-47A1-EFF84A5863DF}"/>
+              </a:ext>
+            </a:extLst>
+          </p:cNvPr>
+          <p:cNvSpPr>
+            <a:spLocks noGrp="1"/>
+          </p:cNvSpPr>
+          <p:nvPr>
+            <p:ph idx="1"/>
+          </p:nvPr>
+        </p:nvSpPr>
+        <p:spPr/>
+        <p:txBody>
+          <a:bodyPr/>
+          <a:lstStyle/>
+          <a:p>
+            <a:r>
+              <a:rPr lang="en-US" dirty="0"/>
+              <a:t>Use the OIDC Client:</a:t>
+            </a:r>
+          </a:p>
+          <a:p>
+            <a:pPr lvl="1"/>
+            <a:r>
+              <a:rPr lang="en-US" dirty="0"/>
+              <a:t>angular-oauth2-oidc </a:t>
+            </a:r>
+          </a:p>
+          <a:p>
+            <a:r>
+              <a:rPr lang="en-US" dirty="0"/>
+              <a:t>Configuration:</a:t>
+            </a:r>
+          </a:p>
+          <a:p>
+            <a:endParaRPr lang="en-US" dirty="0"/>
+          </a:p>
+        </p:txBody>
+      </p:sp>
+      <p:sp>
+        <p:nvSpPr>
+          <p:cNvPr id="6" name="TextBox 5">
+            <a:extLst>
+              <a:ext uri="{FF2B5EF4-FFF2-40B4-BE49-F238E27FC236}">
+                <a16:creationId xmlns:a16="http://schemas.microsoft.com/office/drawing/2014/main" id="{A1A98B1F-2E57-4C92-CC3B-8A319C476CD9}"/>
+              </a:ext>
+            </a:extLst>
+          </p:cNvPr>
+          <p:cNvSpPr txBox="1"/>
+          <p:nvPr/>
+        </p:nvSpPr>
+        <p:spPr>
+          <a:xfrm>
+            <a:off x="718908" y="3261344"/>
+            <a:ext cx="6001926" cy="3416320"/>
+          </a:xfrm>
+          <a:prstGeom prst="rect">
+            <a:avLst/>
+          </a:prstGeom>
+          <a:noFill/>
+        </p:spPr>
+        <p:txBody>
+          <a:bodyPr wrap="square" rtlCol="0">
+            <a:spAutoFit/>
+          </a:bodyPr>
+          <a:lstStyle/>
+          <a:p>
+            <a:r>
+              <a:rPr lang="en-US" dirty="0">
+                <a:latin typeface="Cascadia Code" panose="020B0609020000020004" pitchFamily="49" charset="0"/>
+                <a:cs typeface="Cascadia Code" panose="020B0609020000020004" pitchFamily="49" charset="0"/>
+              </a:rPr>
+              <a:t>import { </a:t>
+            </a:r>
+            <a:r>
+              <a:rPr lang="en-US" dirty="0" err="1">
+                <a:latin typeface="Cascadia Code" panose="020B0609020000020004" pitchFamily="49" charset="0"/>
+                <a:cs typeface="Cascadia Code" panose="020B0609020000020004" pitchFamily="49" charset="0"/>
+              </a:rPr>
+              <a:t>AuthConfig</a:t>
+            </a:r>
+            <a:r>
+              <a:rPr lang="en-US" dirty="0">
+                <a:latin typeface="Cascadia Code" panose="020B0609020000020004" pitchFamily="49" charset="0"/>
+                <a:cs typeface="Cascadia Code" panose="020B0609020000020004" pitchFamily="49" charset="0"/>
+              </a:rPr>
+              <a:t> } from 'angular-oauth2-oidc';</a:t>
+            </a:r>
+          </a:p>
+          <a:p>
+            <a:endParaRPr lang="en-US" dirty="0">
+              <a:latin typeface="Cascadia Code" panose="020B0609020000020004" pitchFamily="49" charset="0"/>
+              <a:cs typeface="Cascadia Code" panose="020B0609020000020004" pitchFamily="49" charset="0"/>
+            </a:endParaRPr>
+          </a:p>
+          <a:p>
+            <a:r>
+              <a:rPr lang="en-US" dirty="0">
+                <a:latin typeface="Cascadia Code" panose="020B0609020000020004" pitchFamily="49" charset="0"/>
+                <a:cs typeface="Cascadia Code" panose="020B0609020000020004" pitchFamily="49" charset="0"/>
+              </a:rPr>
+              <a:t>export const </a:t>
+            </a:r>
+            <a:r>
+              <a:rPr lang="en-US" dirty="0" err="1">
+                <a:latin typeface="Cascadia Code" panose="020B0609020000020004" pitchFamily="49" charset="0"/>
+                <a:cs typeface="Cascadia Code" panose="020B0609020000020004" pitchFamily="49" charset="0"/>
+              </a:rPr>
+              <a:t>authConfig</a:t>
+            </a:r>
+            <a:r>
+              <a:rPr lang="en-US" dirty="0">
+                <a:latin typeface="Cascadia Code" panose="020B0609020000020004" pitchFamily="49" charset="0"/>
+                <a:cs typeface="Cascadia Code" panose="020B0609020000020004" pitchFamily="49" charset="0"/>
+              </a:rPr>
+              <a:t>: </a:t>
+            </a:r>
+            <a:r>
+              <a:rPr lang="en-US" dirty="0" err="1">
+                <a:latin typeface="Cascadia Code" panose="020B0609020000020004" pitchFamily="49" charset="0"/>
+                <a:cs typeface="Cascadia Code" panose="020B0609020000020004" pitchFamily="49" charset="0"/>
+              </a:rPr>
+              <a:t>AuthConfig</a:t>
+            </a:r>
+            <a:r>
+              <a:rPr lang="en-US" dirty="0">
+                <a:latin typeface="Cascadia Code" panose="020B0609020000020004" pitchFamily="49" charset="0"/>
+                <a:cs typeface="Cascadia Code" panose="020B0609020000020004" pitchFamily="49" charset="0"/>
+              </a:rPr>
+              <a:t> = {</a:t>
+            </a:r>
+          </a:p>
+          <a:p>
+            <a:r>
+              <a:rPr lang="en-US" dirty="0">
+                <a:latin typeface="Cascadia Code" panose="020B0609020000020004" pitchFamily="49" charset="0"/>
+                <a:cs typeface="Cascadia Code" panose="020B0609020000020004" pitchFamily="49" charset="0"/>
+              </a:rPr>
+              <a:t>  issuer: 'https://demo.duendesoftware.com',</a:t>
+            </a:r>
+          </a:p>
+          <a:p>
+            <a:r>
+              <a:rPr lang="en-US" dirty="0">
+                <a:latin typeface="Cascadia Code" panose="020B0609020000020004" pitchFamily="49" charset="0"/>
+                <a:cs typeface="Cascadia Code" panose="020B0609020000020004" pitchFamily="49" charset="0"/>
+              </a:rPr>
+              <a:t>  </a:t>
+            </a:r>
+            <a:r>
+              <a:rPr lang="en-US" dirty="0" err="1">
+                <a:latin typeface="Cascadia Code" panose="020B0609020000020004" pitchFamily="49" charset="0"/>
+                <a:cs typeface="Cascadia Code" panose="020B0609020000020004" pitchFamily="49" charset="0"/>
+              </a:rPr>
+              <a:t>clientId</a:t>
+            </a:r>
+            <a:r>
+              <a:rPr lang="en-US" dirty="0">
+                <a:latin typeface="Cascadia Code" panose="020B0609020000020004" pitchFamily="49" charset="0"/>
+                <a:cs typeface="Cascadia Code" panose="020B0609020000020004" pitchFamily="49" charset="0"/>
+              </a:rPr>
+              <a:t>: '</a:t>
+            </a:r>
+            <a:r>
+              <a:rPr lang="en-US" dirty="0" err="1">
+                <a:latin typeface="Cascadia Code" panose="020B0609020000020004" pitchFamily="49" charset="0"/>
+                <a:cs typeface="Cascadia Code" panose="020B0609020000020004" pitchFamily="49" charset="0"/>
+              </a:rPr>
+              <a:t>interactive.public</a:t>
+            </a:r>
+            <a:r>
+              <a:rPr lang="en-US" dirty="0">
+                <a:latin typeface="Cascadia Code" panose="020B0609020000020004" pitchFamily="49" charset="0"/>
+                <a:cs typeface="Cascadia Code" panose="020B0609020000020004" pitchFamily="49" charset="0"/>
+              </a:rPr>
+              <a:t>', </a:t>
+            </a:r>
+          </a:p>
+          <a:p>
+            <a:r>
+              <a:rPr lang="en-US" dirty="0">
+                <a:latin typeface="Cascadia Code" panose="020B0609020000020004" pitchFamily="49" charset="0"/>
+                <a:cs typeface="Cascadia Code" panose="020B0609020000020004" pitchFamily="49" charset="0"/>
+              </a:rPr>
+              <a:t>  </a:t>
+            </a:r>
+            <a:r>
+              <a:rPr lang="en-US" dirty="0" err="1">
+                <a:latin typeface="Cascadia Code" panose="020B0609020000020004" pitchFamily="49" charset="0"/>
+                <a:cs typeface="Cascadia Code" panose="020B0609020000020004" pitchFamily="49" charset="0"/>
+              </a:rPr>
+              <a:t>responseType</a:t>
+            </a:r>
+            <a:r>
+              <a:rPr lang="en-US" dirty="0">
+                <a:latin typeface="Cascadia Code" panose="020B0609020000020004" pitchFamily="49" charset="0"/>
+                <a:cs typeface="Cascadia Code" panose="020B0609020000020004" pitchFamily="49" charset="0"/>
+              </a:rPr>
+              <a:t>: 'code',</a:t>
+            </a:r>
+          </a:p>
+          <a:p>
+            <a:r>
+              <a:rPr lang="en-US" dirty="0">
+                <a:latin typeface="Cascadia Code" panose="020B0609020000020004" pitchFamily="49" charset="0"/>
+                <a:cs typeface="Cascadia Code" panose="020B0609020000020004" pitchFamily="49" charset="0"/>
+              </a:rPr>
+              <a:t>  ....</a:t>
+            </a:r>
+          </a:p>
+          <a:p>
+            <a:r>
+              <a:rPr lang="en-US" dirty="0">
+                <a:latin typeface="Cascadia Code" panose="020B0609020000020004" pitchFamily="49" charset="0"/>
+                <a:cs typeface="Cascadia Code" panose="020B0609020000020004" pitchFamily="49" charset="0"/>
+              </a:rPr>
+              <a:t>  </a:t>
+            </a:r>
+          </a:p>
+          <a:p>
+            <a:r>
+              <a:rPr lang="en-US" dirty="0">
+                <a:latin typeface="Cascadia Code" panose="020B0609020000020004" pitchFamily="49" charset="0"/>
+                <a:cs typeface="Cascadia Code" panose="020B0609020000020004" pitchFamily="49" charset="0"/>
+              </a:rPr>
+              <a:t>  </a:t>
+            </a:r>
+            <a:r>
+              <a:rPr lang="en-US" dirty="0" err="1">
+                <a:latin typeface="Cascadia Code" panose="020B0609020000020004" pitchFamily="49" charset="0"/>
+                <a:cs typeface="Cascadia Code" panose="020B0609020000020004" pitchFamily="49" charset="0"/>
+              </a:rPr>
+              <a:t>nonceStateSeparator</a:t>
+            </a:r>
+            <a:r>
+              <a:rPr lang="en-US" dirty="0">
+                <a:latin typeface="Cascadia Code" panose="020B0609020000020004" pitchFamily="49" charset="0"/>
+                <a:cs typeface="Cascadia Code" panose="020B0609020000020004" pitchFamily="49" charset="0"/>
+              </a:rPr>
+              <a:t>: 'semicolon', </a:t>
+            </a:r>
+          </a:p>
+          <a:p>
+            <a:r>
+              <a:rPr lang="en-US" dirty="0">
+                <a:latin typeface="Cascadia Code" panose="020B0609020000020004" pitchFamily="49" charset="0"/>
+                <a:cs typeface="Cascadia Code" panose="020B0609020000020004" pitchFamily="49" charset="0"/>
+              </a:rPr>
+              <a:t>};</a:t>
+            </a:r>
+          </a:p>
+        </p:txBody>
+      </p:sp>
+      <p:pic>
+        <p:nvPicPr>
+          <p:cNvPr id="1026" name="Picture 2" descr="Logos and Badges | OpenID">
+            <a:extLst>
+              <a:ext uri="{FF2B5EF4-FFF2-40B4-BE49-F238E27FC236}">
+                <a16:creationId xmlns:a16="http://schemas.microsoft.com/office/drawing/2014/main" id="{5551FBE5-D083-D764-8983-CA15C8671B9A}"/>
+              </a:ext>
+            </a:extLst>
+          </p:cNvPr>
+          <p:cNvPicPr>
+            <a:picLocks noChangeAspect="1" noChangeArrowheads="1"/>
+          </p:cNvPicPr>
+          <p:nvPr/>
+        </p:nvPicPr>
+        <p:blipFill>
+          <a:blip r:embed="rId3" cstate="print">
+            <a:extLst>
+              <a:ext uri="{28A0092B-C50C-407E-A947-70E740481C1C}">
+                <a14:useLocalDpi xmlns:a14="http://schemas.microsoft.com/office/drawing/2010/main" val="0"/>
+              </a:ext>
+            </a:extLst>
+          </a:blip>
+          <a:srcRect/>
+          <a:stretch>
+            <a:fillRect/>
+          </a:stretch>
+        </p:blipFill>
+        <p:spPr bwMode="auto">
+          <a:xfrm>
+            <a:off x="9294824" y="1324924"/>
+            <a:ext cx="1860857" cy="1860857"/>
+          </a:xfrm>
+          <a:prstGeom prst="rect">
+            <a:avLst/>
+          </a:prstGeom>
+          <a:noFill/>
+          <a:extLst>
+            <a:ext uri="{909E8E84-426E-40DD-AFC4-6F175D3DCCD1}">
+              <a14:hiddenFill xmlns:a14="http://schemas.microsoft.com/office/drawing/2010/main">
+                <a:solidFill>
+                  <a:srgbClr val="FFFFFF"/>
+                </a:solidFill>
+              </a14:hiddenFill>
+            </a:ext>
+          </a:extLst>
+        </p:spPr>
+      </p:pic>
+      <p:pic>
+        <p:nvPicPr>
+          <p:cNvPr id="1028" name="Picture 4" descr="Npm Icon - Download in Flat Style">
+            <a:extLst>
+              <a:ext uri="{FF2B5EF4-FFF2-40B4-BE49-F238E27FC236}">
+                <a16:creationId xmlns:a16="http://schemas.microsoft.com/office/drawing/2014/main" id="{DC2E66EF-9F7B-A14E-1719-D3BF607B88C3}"/>
+              </a:ext>
+            </a:extLst>
+          </p:cNvPr>
+          <p:cNvPicPr>
+            <a:picLocks noChangeAspect="1" noChangeArrowheads="1"/>
+          </p:cNvPicPr>
+          <p:nvPr/>
+        </p:nvPicPr>
+        <p:blipFill>
+          <a:blip r:embed="rId4">
+            <a:extLst>
+              <a:ext uri="{28A0092B-C50C-407E-A947-70E740481C1C}">
+                <a14:useLocalDpi xmlns:a14="http://schemas.microsoft.com/office/drawing/2010/main" val="0"/>
+              </a:ext>
+            </a:extLst>
+          </a:blip>
+          <a:srcRect/>
+          <a:stretch>
+            <a:fillRect/>
+          </a:stretch>
+        </p:blipFill>
+        <p:spPr bwMode="auto">
+          <a:xfrm>
+            <a:off x="9006052" y="2782094"/>
+            <a:ext cx="2438400" cy="2438400"/>
+          </a:xfrm>
+          <a:prstGeom prst="rect">
+            <a:avLst/>
+          </a:prstGeom>
+          <a:noFill/>
+          <a:extLst>
+            <a:ext uri="{909E8E84-426E-40DD-AFC4-6F175D3DCCD1}">
+              <a14:hiddenFill xmlns:a14="http://schemas.microsoft.com/office/drawing/2010/main">
+                <a:solidFill>
+                  <a:srgbClr val="FFFFFF"/>
+                </a:solidFill>
+              </a14:hiddenFill>
+            </a:ext>
+          </a:extLst>
+        </p:spPr>
+      </p:pic>
+    </p:spTree>
+    <p:extLst>
+      <p:ext uri="{BB962C8B-B14F-4D97-AF65-F5344CB8AC3E}">
+        <p14:creationId xmlns:p14="http://schemas.microsoft.com/office/powerpoint/2010/main" val="2432345617"/>
+      </p:ext>
+    </p:extLst>
+  </p:cSld>
+  <p:clrMapOvr>
+    <a:masterClrMapping/>
+  </p:clrMapOvr>
+</p:sld>
+</file>
+
+<file path=ppt/slides/slide16.xml><?xml version="1.0" encoding="utf-8"?>
+<p:sld xmlns:a="http://schemas.openxmlformats.org/drawingml/2006/main" xmlns:r="http://schemas.openxmlformats.org/officeDocument/2006/relationships" xmlns:p="http://schemas.openxmlformats.org/presentationml/2006/main">
+  <p:cSld>
+    <p:spTree>
+      <p:nvGrpSpPr>
+        <p:cNvPr id="1" name=""/>
+        <p:cNvGrpSpPr/>
+        <p:nvPr/>
+      </p:nvGrpSpPr>
+      <p:grpSpPr>
+        <a:xfrm>
+          <a:off x="0" y="0"/>
+          <a:ext cx="0" cy="0"/>
+          <a:chOff x="0" y="0"/>
+          <a:chExt cx="0" cy="0"/>
+        </a:xfrm>
+      </p:grpSpPr>
+      <p:sp>
+        <p:nvSpPr>
+          <p:cNvPr id="2" name="Title 1">
+            <a:extLst>
+              <a:ext uri="{FF2B5EF4-FFF2-40B4-BE49-F238E27FC236}">
+                <a16:creationId xmlns:a16="http://schemas.microsoft.com/office/drawing/2014/main" id="{45AEABC3-6CFD-A198-4158-9EBCDF733BCB}"/>
+              </a:ext>
+            </a:extLst>
+          </p:cNvPr>
+          <p:cNvSpPr>
+            <a:spLocks noGrp="1"/>
+          </p:cNvSpPr>
+          <p:nvPr>
+            <p:ph type="title"/>
+          </p:nvPr>
+        </p:nvSpPr>
+        <p:spPr/>
+        <p:txBody>
+          <a:bodyPr/>
+          <a:lstStyle/>
+          <a:p>
+            <a:r>
+              <a:rPr lang="en-US" dirty="0"/>
+              <a:t>BFF Identity Server with Angular –pt2</a:t>
+            </a:r>
+          </a:p>
+        </p:txBody>
+      </p:sp>
+      <p:sp>
+        <p:nvSpPr>
+          <p:cNvPr id="3" name="Content Placeholder 2">
+            <a:extLst>
+              <a:ext uri="{FF2B5EF4-FFF2-40B4-BE49-F238E27FC236}">
+                <a16:creationId xmlns:a16="http://schemas.microsoft.com/office/drawing/2014/main" id="{1CA9431B-5551-6B58-47A1-EFF84A5863DF}"/>
+              </a:ext>
+            </a:extLst>
+          </p:cNvPr>
+          <p:cNvSpPr>
+            <a:spLocks noGrp="1"/>
+          </p:cNvSpPr>
+          <p:nvPr>
+            <p:ph idx="1"/>
+          </p:nvPr>
+        </p:nvSpPr>
+        <p:spPr/>
+        <p:txBody>
+          <a:bodyPr/>
+          <a:lstStyle/>
+          <a:p>
+            <a:r>
+              <a:rPr lang="en-US" dirty="0"/>
+              <a:t>Create a wrapper around </a:t>
+            </a:r>
+            <a:r>
+              <a:rPr lang="en-US" dirty="0" err="1"/>
+              <a:t>AuthService</a:t>
+            </a:r>
+            <a:br>
+              <a:rPr lang="en-US" dirty="0"/>
+            </a:br>
+            <a:r>
+              <a:rPr lang="en-US" dirty="0"/>
+              <a:t>	</a:t>
+            </a:r>
+          </a:p>
+          <a:p>
+            <a:endParaRPr lang="en-US" dirty="0"/>
+          </a:p>
+        </p:txBody>
+      </p:sp>
+      <p:sp>
+        <p:nvSpPr>
+          <p:cNvPr id="6" name="TextBox 5">
+            <a:extLst>
+              <a:ext uri="{FF2B5EF4-FFF2-40B4-BE49-F238E27FC236}">
+                <a16:creationId xmlns:a16="http://schemas.microsoft.com/office/drawing/2014/main" id="{A1A98B1F-2E57-4C92-CC3B-8A319C476CD9}"/>
+              </a:ext>
+            </a:extLst>
+          </p:cNvPr>
+          <p:cNvSpPr txBox="1"/>
+          <p:nvPr/>
+        </p:nvSpPr>
+        <p:spPr>
+          <a:xfrm>
+            <a:off x="649437" y="2333685"/>
+            <a:ext cx="7361799" cy="4524315"/>
+          </a:xfrm>
+          <a:prstGeom prst="rect">
+            <a:avLst/>
+          </a:prstGeom>
+          <a:noFill/>
+        </p:spPr>
+        <p:txBody>
+          <a:bodyPr wrap="square" rtlCol="0">
+            <a:spAutoFit/>
+          </a:bodyPr>
+          <a:lstStyle/>
+          <a:p>
+            <a:r>
+              <a:rPr lang="en-US" b="0" i="0" dirty="0">
+                <a:effectLst/>
+                <a:latin typeface="Cascadia Code" panose="020B0609020000020004" pitchFamily="49" charset="0"/>
+                <a:cs typeface="Cascadia Code" panose="020B0609020000020004" pitchFamily="49" charset="0"/>
+              </a:rPr>
+              <a:t>import</a:t>
+            </a:r>
+            <a:r>
+              <a:rPr lang="en-US" b="0" i="0" dirty="0">
+                <a:solidFill>
+                  <a:srgbClr val="1F2328"/>
+                </a:solidFill>
+                <a:effectLst/>
+                <a:latin typeface="Cascadia Code" panose="020B0609020000020004" pitchFamily="49" charset="0"/>
+                <a:cs typeface="Cascadia Code" panose="020B0609020000020004" pitchFamily="49" charset="0"/>
+              </a:rPr>
+              <a:t> { </a:t>
+            </a:r>
+            <a:r>
+              <a:rPr lang="en-US" b="0" i="0" dirty="0" err="1">
+                <a:effectLst/>
+                <a:latin typeface="Cascadia Code" panose="020B0609020000020004" pitchFamily="49" charset="0"/>
+                <a:cs typeface="Cascadia Code" panose="020B0609020000020004" pitchFamily="49" charset="0"/>
+              </a:rPr>
+              <a:t>OAuthErrorEvent</a:t>
+            </a:r>
+            <a:r>
+              <a:rPr lang="en-US" b="0" i="0" dirty="0">
+                <a:solidFill>
+                  <a:srgbClr val="1F2328"/>
+                </a:solidFill>
+                <a:effectLst/>
+                <a:latin typeface="Cascadia Code" panose="020B0609020000020004" pitchFamily="49" charset="0"/>
+                <a:cs typeface="Cascadia Code" panose="020B0609020000020004" pitchFamily="49" charset="0"/>
+              </a:rPr>
+              <a:t>, </a:t>
+            </a:r>
+            <a:r>
+              <a:rPr lang="en-US" b="0" i="0" dirty="0" err="1">
+                <a:effectLst/>
+                <a:latin typeface="Cascadia Code" panose="020B0609020000020004" pitchFamily="49" charset="0"/>
+                <a:cs typeface="Cascadia Code" panose="020B0609020000020004" pitchFamily="49" charset="0"/>
+              </a:rPr>
+              <a:t>OAuthService</a:t>
+            </a:r>
+            <a:r>
+              <a:rPr lang="en-US" b="0" i="0" dirty="0">
+                <a:solidFill>
+                  <a:srgbClr val="1F2328"/>
+                </a:solidFill>
+                <a:effectLst/>
+                <a:latin typeface="Cascadia Code" panose="020B0609020000020004" pitchFamily="49" charset="0"/>
+                <a:cs typeface="Cascadia Code" panose="020B0609020000020004" pitchFamily="49" charset="0"/>
+              </a:rPr>
+              <a:t> } </a:t>
+            </a:r>
+            <a:r>
+              <a:rPr lang="en-US" b="0" i="0" dirty="0">
+                <a:effectLst/>
+                <a:latin typeface="Cascadia Code" panose="020B0609020000020004" pitchFamily="49" charset="0"/>
+                <a:cs typeface="Cascadia Code" panose="020B0609020000020004" pitchFamily="49" charset="0"/>
+              </a:rPr>
+              <a:t>from</a:t>
+            </a:r>
+            <a:r>
+              <a:rPr lang="en-US" b="0" i="0" dirty="0">
+                <a:solidFill>
+                  <a:srgbClr val="1F2328"/>
+                </a:solidFill>
+                <a:effectLst/>
+                <a:latin typeface="Cascadia Code" panose="020B0609020000020004" pitchFamily="49" charset="0"/>
+                <a:cs typeface="Cascadia Code" panose="020B0609020000020004" pitchFamily="49" charset="0"/>
+              </a:rPr>
+              <a:t> </a:t>
+            </a:r>
+            <a:r>
+              <a:rPr lang="en-US" b="0" i="0" dirty="0">
+                <a:effectLst/>
+                <a:latin typeface="Cascadia Code" panose="020B0609020000020004" pitchFamily="49" charset="0"/>
+                <a:cs typeface="Cascadia Code" panose="020B0609020000020004" pitchFamily="49" charset="0"/>
+              </a:rPr>
+              <a:t>'angular-oauth2-oidc’</a:t>
+            </a:r>
+            <a:r>
+              <a:rPr lang="en-US" b="0" i="0" dirty="0">
+                <a:solidFill>
+                  <a:srgbClr val="1F2328"/>
+                </a:solidFill>
+                <a:effectLst/>
+                <a:latin typeface="Cascadia Code" panose="020B0609020000020004" pitchFamily="49" charset="0"/>
+                <a:cs typeface="Cascadia Code" panose="020B0609020000020004" pitchFamily="49" charset="0"/>
+              </a:rPr>
+              <a:t>;</a:t>
+            </a:r>
+            <a:br>
+              <a:rPr lang="en-US" b="0" i="0" dirty="0">
+                <a:solidFill>
+                  <a:srgbClr val="1F2328"/>
+                </a:solidFill>
+                <a:effectLst/>
+                <a:latin typeface="Cascadia Code" panose="020B0609020000020004" pitchFamily="49" charset="0"/>
+                <a:cs typeface="Cascadia Code" panose="020B0609020000020004" pitchFamily="49" charset="0"/>
+              </a:rPr>
+            </a:br>
+            <a:br>
+              <a:rPr lang="en-US" b="0" i="0" dirty="0">
+                <a:solidFill>
+                  <a:srgbClr val="1F2328"/>
+                </a:solidFill>
+                <a:effectLst/>
+                <a:latin typeface="Cascadia Code" panose="020B0609020000020004" pitchFamily="49" charset="0"/>
+                <a:cs typeface="Cascadia Code" panose="020B0609020000020004" pitchFamily="49" charset="0"/>
+              </a:rPr>
+            </a:br>
+            <a:r>
+              <a:rPr lang="en-US" b="0" i="0" dirty="0">
+                <a:solidFill>
+                  <a:srgbClr val="1F2328"/>
+                </a:solidFill>
+                <a:effectLst/>
+                <a:latin typeface="Cascadia Code" panose="020B0609020000020004" pitchFamily="49" charset="0"/>
+                <a:cs typeface="Cascadia Code" panose="020B0609020000020004" pitchFamily="49" charset="0"/>
+              </a:rPr>
+              <a:t>@Injectable({ </a:t>
+            </a:r>
+            <a:r>
+              <a:rPr lang="en-US" b="0" i="0" dirty="0" err="1">
+                <a:solidFill>
+                  <a:srgbClr val="1F2328"/>
+                </a:solidFill>
+                <a:effectLst/>
+                <a:latin typeface="Cascadia Code" panose="020B0609020000020004" pitchFamily="49" charset="0"/>
+                <a:cs typeface="Cascadia Code" panose="020B0609020000020004" pitchFamily="49" charset="0"/>
+              </a:rPr>
+              <a:t>providedIn</a:t>
+            </a:r>
+            <a:r>
+              <a:rPr lang="en-US" b="0" i="0" dirty="0">
+                <a:solidFill>
+                  <a:srgbClr val="1F2328"/>
+                </a:solidFill>
+                <a:effectLst/>
+                <a:latin typeface="Cascadia Code" panose="020B0609020000020004" pitchFamily="49" charset="0"/>
+                <a:cs typeface="Cascadia Code" panose="020B0609020000020004" pitchFamily="49" charset="0"/>
+              </a:rPr>
+              <a:t>: 'root' })</a:t>
+            </a:r>
+          </a:p>
+          <a:p>
+            <a:r>
+              <a:rPr lang="en-US" b="0" i="0" dirty="0">
+                <a:solidFill>
+                  <a:srgbClr val="1F2328"/>
+                </a:solidFill>
+                <a:effectLst/>
+                <a:latin typeface="Cascadia Code" panose="020B0609020000020004" pitchFamily="49" charset="0"/>
+                <a:cs typeface="Cascadia Code" panose="020B0609020000020004" pitchFamily="49" charset="0"/>
+              </a:rPr>
+              <a:t>export class </a:t>
+            </a:r>
+            <a:r>
+              <a:rPr lang="en-US" b="0" i="0" dirty="0" err="1">
+                <a:solidFill>
+                  <a:srgbClr val="1F2328"/>
+                </a:solidFill>
+                <a:effectLst/>
+                <a:latin typeface="Cascadia Code" panose="020B0609020000020004" pitchFamily="49" charset="0"/>
+                <a:cs typeface="Cascadia Code" panose="020B0609020000020004" pitchFamily="49" charset="0"/>
+              </a:rPr>
+              <a:t>AuthService</a:t>
+            </a:r>
+            <a:r>
+              <a:rPr lang="en-US" b="0" i="0" dirty="0">
+                <a:solidFill>
+                  <a:srgbClr val="1F2328"/>
+                </a:solidFill>
+                <a:effectLst/>
+                <a:latin typeface="Cascadia Code" panose="020B0609020000020004" pitchFamily="49" charset="0"/>
+                <a:cs typeface="Cascadia Code" panose="020B0609020000020004" pitchFamily="49" charset="0"/>
+              </a:rPr>
+              <a:t> {</a:t>
+            </a:r>
+          </a:p>
+          <a:p>
+            <a:r>
+              <a:rPr lang="en-US" dirty="0">
+                <a:solidFill>
+                  <a:srgbClr val="1F2328"/>
+                </a:solidFill>
+                <a:latin typeface="Cascadia Code" panose="020B0609020000020004" pitchFamily="49" charset="0"/>
+                <a:cs typeface="Cascadia Code" panose="020B0609020000020004" pitchFamily="49" charset="0"/>
+              </a:rPr>
+              <a:t>..</a:t>
+            </a:r>
+            <a:br>
+              <a:rPr lang="en-US" b="0" i="0" dirty="0">
+                <a:solidFill>
+                  <a:srgbClr val="1F2328"/>
+                </a:solidFill>
+                <a:effectLst/>
+                <a:latin typeface="Cascadia Code" panose="020B0609020000020004" pitchFamily="49" charset="0"/>
+                <a:cs typeface="Cascadia Code" panose="020B0609020000020004" pitchFamily="49" charset="0"/>
+              </a:rPr>
+            </a:br>
+            <a:r>
+              <a:rPr lang="en-US" b="0" i="0" dirty="0">
+                <a:solidFill>
+                  <a:srgbClr val="1F2328"/>
+                </a:solidFill>
+                <a:effectLst/>
+                <a:latin typeface="Cascadia Code" panose="020B0609020000020004" pitchFamily="49" charset="0"/>
+                <a:cs typeface="Cascadia Code" panose="020B0609020000020004" pitchFamily="49" charset="0"/>
+              </a:rPr>
+              <a:t>//listen to events</a:t>
+            </a:r>
+            <a:br>
+              <a:rPr lang="en-US" b="0" i="0" dirty="0">
+                <a:solidFill>
+                  <a:srgbClr val="1F2328"/>
+                </a:solidFill>
+                <a:effectLst/>
+                <a:latin typeface="Cascadia Code" panose="020B0609020000020004" pitchFamily="49" charset="0"/>
+                <a:cs typeface="Cascadia Code" panose="020B0609020000020004" pitchFamily="49" charset="0"/>
+              </a:rPr>
+            </a:br>
+            <a:r>
+              <a:rPr lang="en-US" b="0" i="0" dirty="0" err="1">
+                <a:solidFill>
+                  <a:srgbClr val="1F2328"/>
+                </a:solidFill>
+                <a:effectLst/>
+                <a:latin typeface="Cascadia Code" panose="020B0609020000020004" pitchFamily="49" charset="0"/>
+                <a:cs typeface="Cascadia Code" panose="020B0609020000020004" pitchFamily="49" charset="0"/>
+              </a:rPr>
+              <a:t>this.oauthService.events.subscribe</a:t>
+            </a:r>
+            <a:r>
+              <a:rPr lang="en-US" b="0" i="0" dirty="0">
+                <a:solidFill>
+                  <a:srgbClr val="1F2328"/>
+                </a:solidFill>
+                <a:effectLst/>
+                <a:latin typeface="Cascadia Code" panose="020B0609020000020004" pitchFamily="49" charset="0"/>
+                <a:cs typeface="Cascadia Code" panose="020B0609020000020004" pitchFamily="49" charset="0"/>
+              </a:rPr>
+              <a:t>((event) =&gt; {</a:t>
+            </a:r>
+            <a:br>
+              <a:rPr lang="en-US" b="0" i="0" dirty="0">
+                <a:solidFill>
+                  <a:srgbClr val="1F2328"/>
+                </a:solidFill>
+                <a:effectLst/>
+                <a:latin typeface="Cascadia Code" panose="020B0609020000020004" pitchFamily="49" charset="0"/>
+                <a:cs typeface="Cascadia Code" panose="020B0609020000020004" pitchFamily="49" charset="0"/>
+              </a:rPr>
+            </a:br>
+            <a:r>
+              <a:rPr lang="en-US" b="0" i="0" dirty="0">
+                <a:solidFill>
+                  <a:srgbClr val="1F2328"/>
+                </a:solidFill>
+                <a:effectLst/>
+                <a:latin typeface="Cascadia Code" panose="020B0609020000020004" pitchFamily="49" charset="0"/>
+                <a:cs typeface="Cascadia Code" panose="020B0609020000020004" pitchFamily="49" charset="0"/>
+              </a:rPr>
+              <a:t>}</a:t>
+            </a:r>
+          </a:p>
+          <a:p>
+            <a:r>
+              <a:rPr lang="en-US" dirty="0">
+                <a:solidFill>
+                  <a:srgbClr val="1F2328"/>
+                </a:solidFill>
+                <a:latin typeface="Cascadia Code" panose="020B0609020000020004" pitchFamily="49" charset="0"/>
+                <a:cs typeface="Cascadia Code" panose="020B0609020000020004" pitchFamily="49" charset="0"/>
+              </a:rPr>
+              <a:t>..</a:t>
+            </a:r>
+            <a:br>
+              <a:rPr lang="en-US" b="0" i="0" dirty="0">
+                <a:solidFill>
+                  <a:srgbClr val="1F2328"/>
+                </a:solidFill>
+                <a:effectLst/>
+                <a:latin typeface="Cascadia Code" panose="020B0609020000020004" pitchFamily="49" charset="0"/>
+                <a:cs typeface="Cascadia Code" panose="020B0609020000020004" pitchFamily="49" charset="0"/>
+              </a:rPr>
+            </a:br>
+            <a:r>
+              <a:rPr lang="en-US" b="0" i="0" dirty="0">
+                <a:solidFill>
+                  <a:srgbClr val="1F2328"/>
+                </a:solidFill>
+                <a:effectLst/>
+                <a:latin typeface="Cascadia Code" panose="020B0609020000020004" pitchFamily="49" charset="0"/>
+                <a:cs typeface="Cascadia Code" panose="020B0609020000020004" pitchFamily="49" charset="0"/>
+              </a:rPr>
+              <a:t>}</a:t>
+            </a:r>
+            <a:br>
+              <a:rPr lang="en-US" b="0" i="0" dirty="0">
+                <a:solidFill>
+                  <a:srgbClr val="1F2328"/>
+                </a:solidFill>
+                <a:effectLst/>
+                <a:latin typeface="ui-monospace"/>
+              </a:rPr>
+            </a:br>
+            <a:endParaRPr lang="en-US" b="0" i="0" dirty="0">
+              <a:solidFill>
+                <a:srgbClr val="1F2328"/>
+              </a:solidFill>
+              <a:effectLst/>
+              <a:latin typeface="ui-monospace"/>
+            </a:endParaRPr>
+          </a:p>
+          <a:p>
+            <a:endParaRPr lang="en-US" b="0" i="0" dirty="0">
+              <a:solidFill>
+                <a:srgbClr val="1F2328"/>
+              </a:solidFill>
+              <a:effectLst/>
+              <a:latin typeface="ui-monospace"/>
+            </a:endParaRPr>
+          </a:p>
+          <a:p>
+            <a:endParaRPr lang="en-US" dirty="0">
+              <a:solidFill>
+                <a:srgbClr val="1F2328"/>
+              </a:solidFill>
+              <a:latin typeface="ui-monospace"/>
+            </a:endParaRPr>
+          </a:p>
+          <a:p>
+            <a:endParaRPr lang="en-US" b="0" i="0" dirty="0">
+              <a:solidFill>
+                <a:srgbClr val="1F2328"/>
+              </a:solidFill>
+              <a:effectLst/>
+              <a:latin typeface="ui-monospace"/>
+            </a:endParaRPr>
+          </a:p>
+          <a:p>
+            <a:endParaRPr lang="en-US" dirty="0">
+              <a:latin typeface="Cascadia Code" panose="020B0609020000020004" pitchFamily="49" charset="0"/>
+              <a:cs typeface="Cascadia Code" panose="020B0609020000020004" pitchFamily="49" charset="0"/>
+            </a:endParaRPr>
+          </a:p>
+        </p:txBody>
+      </p:sp>
+      <p:pic>
+        <p:nvPicPr>
+          <p:cNvPr id="8" name="Picture 7">
+            <a:extLst>
+              <a:ext uri="{FF2B5EF4-FFF2-40B4-BE49-F238E27FC236}">
+                <a16:creationId xmlns:a16="http://schemas.microsoft.com/office/drawing/2014/main" id="{A3DED8E4-2BD9-8726-B9A8-A27C29714BA5}"/>
+              </a:ext>
+            </a:extLst>
+          </p:cNvPr>
+          <p:cNvPicPr>
+            <a:picLocks noChangeAspect="1"/>
+          </p:cNvPicPr>
+          <p:nvPr/>
+        </p:nvPicPr>
+        <p:blipFill>
+          <a:blip r:embed="rId2">
+            <a:extLst>
+              <a:ext uri="{28A0092B-C50C-407E-A947-70E740481C1C}">
+                <a14:useLocalDpi xmlns:a14="http://schemas.microsoft.com/office/drawing/2010/main" val="0"/>
+              </a:ext>
+            </a:extLst>
+          </a:blip>
+          <a:stretch>
+            <a:fillRect/>
+          </a:stretch>
+        </p:blipFill>
+        <p:spPr>
+          <a:xfrm>
+            <a:off x="5113020" y="5715000"/>
+            <a:ext cx="7078980" cy="1143000"/>
+          </a:xfrm>
+          <a:prstGeom prst="rect">
+            <a:avLst/>
+          </a:prstGeom>
+        </p:spPr>
+      </p:pic>
+      <p:pic>
+        <p:nvPicPr>
+          <p:cNvPr id="2050" name="Picture 2">
+            <a:extLst>
+              <a:ext uri="{FF2B5EF4-FFF2-40B4-BE49-F238E27FC236}">
+                <a16:creationId xmlns:a16="http://schemas.microsoft.com/office/drawing/2014/main" id="{30BE3476-5CDF-3230-C319-A28B26288BC2}"/>
+              </a:ext>
+            </a:extLst>
+          </p:cNvPr>
+          <p:cNvPicPr>
+            <a:picLocks noChangeAspect="1" noChangeArrowheads="1"/>
+          </p:cNvPicPr>
+          <p:nvPr/>
+        </p:nvPicPr>
+        <p:blipFill>
+          <a:blip r:embed="rId3">
+            <a:extLst>
+              <a:ext uri="{28A0092B-C50C-407E-A947-70E740481C1C}">
+                <a14:useLocalDpi xmlns:a14="http://schemas.microsoft.com/office/drawing/2010/main" val="0"/>
+              </a:ext>
+            </a:extLst>
+          </a:blip>
+          <a:srcRect/>
+          <a:stretch>
+            <a:fillRect/>
+          </a:stretch>
+        </p:blipFill>
+        <p:spPr bwMode="auto">
+          <a:xfrm>
+            <a:off x="6770537" y="2753519"/>
+            <a:ext cx="4772025" cy="1247775"/>
+          </a:xfrm>
+          <a:prstGeom prst="rect">
+            <a:avLst/>
+          </a:prstGeom>
+          <a:noFill/>
+          <a:extLst>
+            <a:ext uri="{909E8E84-426E-40DD-AFC4-6F175D3DCCD1}">
+              <a14:hiddenFill xmlns:a14="http://schemas.microsoft.com/office/drawing/2010/main">
+                <a:solidFill>
+                  <a:srgbClr val="FFFFFF"/>
+                </a:solidFill>
+              </a14:hiddenFill>
+            </a:ext>
+          </a:extLst>
+        </p:spPr>
+      </p:pic>
+    </p:spTree>
+    <p:extLst>
+      <p:ext uri="{BB962C8B-B14F-4D97-AF65-F5344CB8AC3E}">
+        <p14:creationId xmlns:p14="http://schemas.microsoft.com/office/powerpoint/2010/main" val="4029917957"/>
+      </p:ext>
+    </p:extLst>
+  </p:cSld>
+  <p:clrMapOvr>
+    <a:masterClrMapping/>
+  </p:clrMapOvr>
+</p:sld>
+</file>
+
+<file path=ppt/slides/slide17.xml><?xml version="1.0" encoding="utf-8"?>
+<p:sld xmlns:a="http://schemas.openxmlformats.org/drawingml/2006/main" xmlns:r="http://schemas.openxmlformats.org/officeDocument/2006/relationships" xmlns:p="http://schemas.openxmlformats.org/presentationml/2006/main">
+  <p:cSld>
+    <p:spTree>
+      <p:nvGrpSpPr>
+        <p:cNvPr id="1" name=""/>
+        <p:cNvGrpSpPr/>
+        <p:nvPr/>
+      </p:nvGrpSpPr>
+      <p:grpSpPr>
+        <a:xfrm>
+          <a:off x="0" y="0"/>
+          <a:ext cx="0" cy="0"/>
+          <a:chOff x="0" y="0"/>
+          <a:chExt cx="0" cy="0"/>
+        </a:xfrm>
+      </p:grpSpPr>
+      <p:sp>
+        <p:nvSpPr>
+          <p:cNvPr id="2" name="Title 1">
+            <a:extLst>
+              <a:ext uri="{FF2B5EF4-FFF2-40B4-BE49-F238E27FC236}">
+                <a16:creationId xmlns:a16="http://schemas.microsoft.com/office/drawing/2014/main" id="{45AEABC3-6CFD-A198-4158-9EBCDF733BCB}"/>
+              </a:ext>
+            </a:extLst>
+          </p:cNvPr>
+          <p:cNvSpPr>
+            <a:spLocks noGrp="1"/>
+          </p:cNvSpPr>
+          <p:nvPr>
+            <p:ph type="title"/>
+          </p:nvPr>
+        </p:nvSpPr>
+        <p:spPr/>
+        <p:txBody>
+          <a:bodyPr/>
+          <a:lstStyle/>
+          <a:p>
+            <a:r>
+              <a:rPr lang="en-US" dirty="0"/>
+              <a:t>BFF Identity Server with Angular –pt3</a:t>
+            </a:r>
+          </a:p>
+        </p:txBody>
+      </p:sp>
+      <p:sp>
+        <p:nvSpPr>
+          <p:cNvPr id="3" name="Content Placeholder 2">
+            <a:extLst>
+              <a:ext uri="{FF2B5EF4-FFF2-40B4-BE49-F238E27FC236}">
+                <a16:creationId xmlns:a16="http://schemas.microsoft.com/office/drawing/2014/main" id="{1CA9431B-5551-6B58-47A1-EFF84A5863DF}"/>
+              </a:ext>
+            </a:extLst>
+          </p:cNvPr>
+          <p:cNvSpPr>
+            <a:spLocks noGrp="1"/>
+          </p:cNvSpPr>
+          <p:nvPr>
+            <p:ph idx="1"/>
+          </p:nvPr>
+        </p:nvSpPr>
+        <p:spPr/>
+        <p:txBody>
+          <a:bodyPr/>
+          <a:lstStyle/>
+          <a:p>
+            <a:r>
+              <a:rPr lang="en-US" dirty="0"/>
+              <a:t>Wrap everything in your module</a:t>
+            </a:r>
+            <a:br>
+              <a:rPr lang="en-US" dirty="0"/>
+            </a:br>
+            <a:r>
+              <a:rPr lang="en-US" dirty="0"/>
+              <a:t>	</a:t>
+            </a:r>
+          </a:p>
+          <a:p>
+            <a:endParaRPr lang="en-US" dirty="0"/>
+          </a:p>
+        </p:txBody>
+      </p:sp>
+      <p:sp>
+        <p:nvSpPr>
+          <p:cNvPr id="6" name="TextBox 5">
+            <a:extLst>
+              <a:ext uri="{FF2B5EF4-FFF2-40B4-BE49-F238E27FC236}">
+                <a16:creationId xmlns:a16="http://schemas.microsoft.com/office/drawing/2014/main" id="{A1A98B1F-2E57-4C92-CC3B-8A319C476CD9}"/>
+              </a:ext>
+            </a:extLst>
+          </p:cNvPr>
+          <p:cNvSpPr txBox="1"/>
+          <p:nvPr/>
+        </p:nvSpPr>
+        <p:spPr>
+          <a:xfrm>
+            <a:off x="1040525" y="2447843"/>
+            <a:ext cx="6001926" cy="3693319"/>
+          </a:xfrm>
+          <a:prstGeom prst="rect">
+            <a:avLst/>
+          </a:prstGeom>
+          <a:noFill/>
+        </p:spPr>
+        <p:txBody>
+          <a:bodyPr wrap="square" rtlCol="0">
+            <a:spAutoFit/>
+          </a:bodyPr>
+          <a:lstStyle/>
+          <a:p>
+            <a:r>
+              <a:rPr lang="en-US" b="0" i="0" dirty="0">
+                <a:effectLst/>
+                <a:latin typeface="Cascadia Code" panose="020B0609020000020004" pitchFamily="49" charset="0"/>
+                <a:cs typeface="Cascadia Code" panose="020B0609020000020004" pitchFamily="49" charset="0"/>
+              </a:rPr>
+              <a:t>import</a:t>
+            </a:r>
+            <a:r>
+              <a:rPr lang="en-US" b="0" i="0" dirty="0">
+                <a:solidFill>
+                  <a:srgbClr val="1F2328"/>
+                </a:solidFill>
+                <a:effectLst/>
+                <a:latin typeface="Cascadia Code" panose="020B0609020000020004" pitchFamily="49" charset="0"/>
+                <a:cs typeface="Cascadia Code" panose="020B0609020000020004" pitchFamily="49" charset="0"/>
+              </a:rPr>
+              <a:t> { </a:t>
+            </a:r>
+            <a:r>
+              <a:rPr lang="en-US" b="0" i="0" dirty="0" err="1">
+                <a:effectLst/>
+                <a:latin typeface="Cascadia Code" panose="020B0609020000020004" pitchFamily="49" charset="0"/>
+                <a:cs typeface="Cascadia Code" panose="020B0609020000020004" pitchFamily="49" charset="0"/>
+              </a:rPr>
+              <a:t>OAuthErrorEvent</a:t>
+            </a:r>
+            <a:r>
+              <a:rPr lang="en-US" b="0" i="0" dirty="0">
+                <a:solidFill>
+                  <a:srgbClr val="1F2328"/>
+                </a:solidFill>
+                <a:effectLst/>
+                <a:latin typeface="Cascadia Code" panose="020B0609020000020004" pitchFamily="49" charset="0"/>
+                <a:cs typeface="Cascadia Code" panose="020B0609020000020004" pitchFamily="49" charset="0"/>
+              </a:rPr>
+              <a:t>, </a:t>
+            </a:r>
+            <a:r>
+              <a:rPr lang="en-US" b="0" i="0" dirty="0" err="1">
+                <a:effectLst/>
+                <a:latin typeface="Cascadia Code" panose="020B0609020000020004" pitchFamily="49" charset="0"/>
+                <a:cs typeface="Cascadia Code" panose="020B0609020000020004" pitchFamily="49" charset="0"/>
+              </a:rPr>
+              <a:t>OAuthService</a:t>
+            </a:r>
+            <a:r>
+              <a:rPr lang="en-US" b="0" i="0" dirty="0">
+                <a:solidFill>
+                  <a:srgbClr val="1F2328"/>
+                </a:solidFill>
+                <a:effectLst/>
+                <a:latin typeface="Cascadia Code" panose="020B0609020000020004" pitchFamily="49" charset="0"/>
+                <a:cs typeface="Cascadia Code" panose="020B0609020000020004" pitchFamily="49" charset="0"/>
+              </a:rPr>
+              <a:t> } </a:t>
+            </a:r>
+            <a:r>
+              <a:rPr lang="en-US" b="0" i="0" dirty="0">
+                <a:effectLst/>
+                <a:latin typeface="Cascadia Code" panose="020B0609020000020004" pitchFamily="49" charset="0"/>
+                <a:cs typeface="Cascadia Code" panose="020B0609020000020004" pitchFamily="49" charset="0"/>
+              </a:rPr>
+              <a:t>from</a:t>
+            </a:r>
+            <a:r>
+              <a:rPr lang="en-US" b="0" i="0" dirty="0">
+                <a:solidFill>
+                  <a:srgbClr val="1F2328"/>
+                </a:solidFill>
+                <a:effectLst/>
+                <a:latin typeface="Cascadia Code" panose="020B0609020000020004" pitchFamily="49" charset="0"/>
+                <a:cs typeface="Cascadia Code" panose="020B0609020000020004" pitchFamily="49" charset="0"/>
+              </a:rPr>
+              <a:t> </a:t>
+            </a:r>
+            <a:r>
+              <a:rPr lang="en-US" b="0" i="0" dirty="0">
+                <a:effectLst/>
+                <a:latin typeface="Cascadia Code" panose="020B0609020000020004" pitchFamily="49" charset="0"/>
+                <a:cs typeface="Cascadia Code" panose="020B0609020000020004" pitchFamily="49" charset="0"/>
+              </a:rPr>
+              <a:t>'angular-oauth2-oidc’</a:t>
+            </a:r>
+            <a:r>
+              <a:rPr lang="en-US" b="0" i="0" dirty="0">
+                <a:solidFill>
+                  <a:srgbClr val="1F2328"/>
+                </a:solidFill>
+                <a:effectLst/>
+                <a:latin typeface="Cascadia Code" panose="020B0609020000020004" pitchFamily="49" charset="0"/>
+                <a:cs typeface="Cascadia Code" panose="020B0609020000020004" pitchFamily="49" charset="0"/>
+              </a:rPr>
+              <a:t>;</a:t>
+            </a:r>
+            <a:br>
+              <a:rPr lang="en-US" b="0" i="0" dirty="0">
+                <a:solidFill>
+                  <a:srgbClr val="1F2328"/>
+                </a:solidFill>
+                <a:effectLst/>
+                <a:latin typeface="Cascadia Code" panose="020B0609020000020004" pitchFamily="49" charset="0"/>
+                <a:cs typeface="Cascadia Code" panose="020B0609020000020004" pitchFamily="49" charset="0"/>
+              </a:rPr>
+            </a:br>
+            <a:r>
+              <a:rPr lang="en-US" b="0" i="0" dirty="0">
+                <a:solidFill>
+                  <a:srgbClr val="1F2328"/>
+                </a:solidFill>
+                <a:effectLst/>
+                <a:latin typeface="Cascadia Code" panose="020B0609020000020004" pitchFamily="49" charset="0"/>
+                <a:cs typeface="Cascadia Code" panose="020B0609020000020004" pitchFamily="49" charset="0"/>
+              </a:rPr>
+              <a:t> providers: [</a:t>
+            </a:r>
+          </a:p>
+          <a:p>
+            <a:r>
+              <a:rPr lang="en-US" b="0" i="0" dirty="0">
+                <a:solidFill>
+                  <a:srgbClr val="1F2328"/>
+                </a:solidFill>
+                <a:effectLst/>
+                <a:latin typeface="Cascadia Code" panose="020B0609020000020004" pitchFamily="49" charset="0"/>
+                <a:cs typeface="Cascadia Code" panose="020B0609020000020004" pitchFamily="49" charset="0"/>
+              </a:rPr>
+              <a:t>        { provide: APP_INITIALIZER, </a:t>
+            </a:r>
+            <a:r>
+              <a:rPr lang="en-US" b="0" i="0" dirty="0" err="1">
+                <a:solidFill>
+                  <a:srgbClr val="1F2328"/>
+                </a:solidFill>
+                <a:effectLst/>
+                <a:latin typeface="Cascadia Code" panose="020B0609020000020004" pitchFamily="49" charset="0"/>
+                <a:cs typeface="Cascadia Code" panose="020B0609020000020004" pitchFamily="49" charset="0"/>
+              </a:rPr>
+              <a:t>useFactory</a:t>
+            </a:r>
+            <a:r>
+              <a:rPr lang="en-US" b="0" i="0" dirty="0">
+                <a:solidFill>
+                  <a:srgbClr val="1F2328"/>
+                </a:solidFill>
+                <a:effectLst/>
+                <a:latin typeface="Cascadia Code" panose="020B0609020000020004" pitchFamily="49" charset="0"/>
+                <a:cs typeface="Cascadia Code" panose="020B0609020000020004" pitchFamily="49" charset="0"/>
+              </a:rPr>
+              <a:t>: </a:t>
+            </a:r>
+            <a:r>
+              <a:rPr lang="en-US" b="0" i="0" dirty="0" err="1">
+                <a:solidFill>
+                  <a:srgbClr val="1F2328"/>
+                </a:solidFill>
+                <a:effectLst/>
+                <a:latin typeface="Cascadia Code" panose="020B0609020000020004" pitchFamily="49" charset="0"/>
+                <a:cs typeface="Cascadia Code" panose="020B0609020000020004" pitchFamily="49" charset="0"/>
+              </a:rPr>
+              <a:t>authAppInitializerFactory</a:t>
+            </a:r>
+            <a:r>
+              <a:rPr lang="en-US" b="0" i="0" dirty="0">
+                <a:solidFill>
+                  <a:srgbClr val="1F2328"/>
+                </a:solidFill>
+                <a:effectLst/>
+                <a:latin typeface="Cascadia Code" panose="020B0609020000020004" pitchFamily="49" charset="0"/>
+                <a:cs typeface="Cascadia Code" panose="020B0609020000020004" pitchFamily="49" charset="0"/>
+              </a:rPr>
+              <a:t>, deps: [</a:t>
+            </a:r>
+            <a:r>
+              <a:rPr lang="en-US" b="0" i="0" dirty="0" err="1">
+                <a:solidFill>
+                  <a:srgbClr val="1F2328"/>
+                </a:solidFill>
+                <a:effectLst/>
+                <a:latin typeface="Cascadia Code" panose="020B0609020000020004" pitchFamily="49" charset="0"/>
+                <a:cs typeface="Cascadia Code" panose="020B0609020000020004" pitchFamily="49" charset="0"/>
+              </a:rPr>
+              <a:t>AuthService</a:t>
+            </a:r>
+            <a:r>
+              <a:rPr lang="en-US" b="0" i="0" dirty="0">
+                <a:solidFill>
+                  <a:srgbClr val="1F2328"/>
+                </a:solidFill>
+                <a:effectLst/>
+                <a:latin typeface="Cascadia Code" panose="020B0609020000020004" pitchFamily="49" charset="0"/>
+                <a:cs typeface="Cascadia Code" panose="020B0609020000020004" pitchFamily="49" charset="0"/>
+              </a:rPr>
+              <a:t>], multi: true },</a:t>
+            </a:r>
+          </a:p>
+          <a:p>
+            <a:r>
+              <a:rPr lang="en-US" b="0" i="0" dirty="0">
+                <a:solidFill>
+                  <a:srgbClr val="1F2328"/>
+                </a:solidFill>
+                <a:effectLst/>
+                <a:latin typeface="Cascadia Code" panose="020B0609020000020004" pitchFamily="49" charset="0"/>
+                <a:cs typeface="Cascadia Code" panose="020B0609020000020004" pitchFamily="49" charset="0"/>
+              </a:rPr>
+              <a:t>        { provide: </a:t>
+            </a:r>
+            <a:r>
+              <a:rPr lang="en-US" b="0" i="0" dirty="0" err="1">
+                <a:solidFill>
+                  <a:srgbClr val="1F2328"/>
+                </a:solidFill>
+                <a:effectLst/>
+                <a:latin typeface="Cascadia Code" panose="020B0609020000020004" pitchFamily="49" charset="0"/>
+                <a:cs typeface="Cascadia Code" panose="020B0609020000020004" pitchFamily="49" charset="0"/>
+              </a:rPr>
+              <a:t>AuthConfig</a:t>
+            </a:r>
+            <a:r>
+              <a:rPr lang="en-US" b="0" i="0" dirty="0">
+                <a:solidFill>
+                  <a:srgbClr val="1F2328"/>
+                </a:solidFill>
+                <a:effectLst/>
+                <a:latin typeface="Cascadia Code" panose="020B0609020000020004" pitchFamily="49" charset="0"/>
+                <a:cs typeface="Cascadia Code" panose="020B0609020000020004" pitchFamily="49" charset="0"/>
+              </a:rPr>
+              <a:t>, </a:t>
+            </a:r>
+            <a:r>
+              <a:rPr lang="en-US" b="0" i="0" dirty="0" err="1">
+                <a:solidFill>
+                  <a:srgbClr val="1F2328"/>
+                </a:solidFill>
+                <a:effectLst/>
+                <a:latin typeface="Cascadia Code" panose="020B0609020000020004" pitchFamily="49" charset="0"/>
+                <a:cs typeface="Cascadia Code" panose="020B0609020000020004" pitchFamily="49" charset="0"/>
+              </a:rPr>
+              <a:t>useValue</a:t>
+            </a:r>
+            <a:r>
+              <a:rPr lang="en-US" b="0" i="0" dirty="0">
+                <a:solidFill>
+                  <a:srgbClr val="1F2328"/>
+                </a:solidFill>
+                <a:effectLst/>
+                <a:latin typeface="Cascadia Code" panose="020B0609020000020004" pitchFamily="49" charset="0"/>
+                <a:cs typeface="Cascadia Code" panose="020B0609020000020004" pitchFamily="49" charset="0"/>
+              </a:rPr>
+              <a:t>: </a:t>
+            </a:r>
+            <a:r>
+              <a:rPr lang="en-US" b="0" i="0" dirty="0" err="1">
+                <a:solidFill>
+                  <a:srgbClr val="1F2328"/>
+                </a:solidFill>
+                <a:effectLst/>
+                <a:latin typeface="Cascadia Code" panose="020B0609020000020004" pitchFamily="49" charset="0"/>
+                <a:cs typeface="Cascadia Code" panose="020B0609020000020004" pitchFamily="49" charset="0"/>
+              </a:rPr>
+              <a:t>authConfig</a:t>
+            </a:r>
+            <a:r>
+              <a:rPr lang="en-US" b="0" i="0" dirty="0">
+                <a:solidFill>
+                  <a:srgbClr val="1F2328"/>
+                </a:solidFill>
+                <a:effectLst/>
+                <a:latin typeface="Cascadia Code" panose="020B0609020000020004" pitchFamily="49" charset="0"/>
+                <a:cs typeface="Cascadia Code" panose="020B0609020000020004" pitchFamily="49" charset="0"/>
+              </a:rPr>
+              <a:t> },</a:t>
+            </a:r>
+          </a:p>
+          <a:p>
+            <a:r>
+              <a:rPr lang="en-US" dirty="0">
+                <a:solidFill>
+                  <a:srgbClr val="1F2328"/>
+                </a:solidFill>
+                <a:latin typeface="Cascadia Code" panose="020B0609020000020004" pitchFamily="49" charset="0"/>
+                <a:cs typeface="Cascadia Code" panose="020B0609020000020004" pitchFamily="49" charset="0"/>
+              </a:rPr>
+              <a:t>]</a:t>
+            </a:r>
+            <a:br>
+              <a:rPr lang="en-US" b="0" i="0" dirty="0">
+                <a:solidFill>
+                  <a:srgbClr val="1F2328"/>
+                </a:solidFill>
+                <a:effectLst/>
+                <a:latin typeface="ui-monospace"/>
+              </a:rPr>
+            </a:br>
+            <a:endParaRPr lang="en-US" b="0" i="0" dirty="0">
+              <a:solidFill>
+                <a:srgbClr val="1F2328"/>
+              </a:solidFill>
+              <a:effectLst/>
+              <a:latin typeface="ui-monospace"/>
+            </a:endParaRPr>
+          </a:p>
+          <a:p>
+            <a:endParaRPr lang="en-US" dirty="0">
+              <a:solidFill>
+                <a:srgbClr val="1F2328"/>
+              </a:solidFill>
+              <a:latin typeface="ui-monospace"/>
+            </a:endParaRPr>
+          </a:p>
+          <a:p>
+            <a:endParaRPr lang="en-US" b="0" i="0" dirty="0">
+              <a:solidFill>
+                <a:srgbClr val="1F2328"/>
+              </a:solidFill>
+              <a:effectLst/>
+              <a:latin typeface="ui-monospace"/>
+            </a:endParaRPr>
+          </a:p>
+          <a:p>
+            <a:endParaRPr lang="en-US" dirty="0">
+              <a:latin typeface="Cascadia Code" panose="020B0609020000020004" pitchFamily="49" charset="0"/>
+              <a:cs typeface="Cascadia Code" panose="020B0609020000020004" pitchFamily="49" charset="0"/>
+            </a:endParaRPr>
+          </a:p>
+        </p:txBody>
+      </p:sp>
+      <p:pic>
+        <p:nvPicPr>
+          <p:cNvPr id="8" name="Picture 7">
+            <a:extLst>
+              <a:ext uri="{FF2B5EF4-FFF2-40B4-BE49-F238E27FC236}">
+                <a16:creationId xmlns:a16="http://schemas.microsoft.com/office/drawing/2014/main" id="{A3DED8E4-2BD9-8726-B9A8-A27C29714BA5}"/>
+              </a:ext>
+            </a:extLst>
+          </p:cNvPr>
+          <p:cNvPicPr>
+            <a:picLocks noChangeAspect="1"/>
+          </p:cNvPicPr>
+          <p:nvPr/>
+        </p:nvPicPr>
+        <p:blipFill>
+          <a:blip r:embed="rId2">
+            <a:extLst>
+              <a:ext uri="{28A0092B-C50C-407E-A947-70E740481C1C}">
+                <a14:useLocalDpi xmlns:a14="http://schemas.microsoft.com/office/drawing/2010/main" val="0"/>
+              </a:ext>
+            </a:extLst>
+          </a:blip>
+          <a:stretch>
+            <a:fillRect/>
+          </a:stretch>
+        </p:blipFill>
+        <p:spPr>
+          <a:xfrm>
+            <a:off x="5113020" y="5715000"/>
+            <a:ext cx="7078980" cy="1143000"/>
+          </a:xfrm>
+          <a:prstGeom prst="rect">
+            <a:avLst/>
+          </a:prstGeom>
+        </p:spPr>
+      </p:pic>
+      <p:pic>
+        <p:nvPicPr>
+          <p:cNvPr id="3074" name="Picture 2" descr="Free Module Datalife Engine icon | Module Datalife Engine icons PNG, ICO or  ICNS | Page 2">
+            <a:extLst>
+              <a:ext uri="{FF2B5EF4-FFF2-40B4-BE49-F238E27FC236}">
+                <a16:creationId xmlns:a16="http://schemas.microsoft.com/office/drawing/2014/main" id="{5380348B-FBC5-DA7C-6F61-896FD9847D86}"/>
+              </a:ext>
+            </a:extLst>
+          </p:cNvPr>
+          <p:cNvPicPr>
+            <a:picLocks noChangeAspect="1" noChangeArrowheads="1"/>
+          </p:cNvPicPr>
+          <p:nvPr/>
+        </p:nvPicPr>
+        <p:blipFill>
+          <a:blip r:embed="rId3">
+            <a:extLst>
+              <a:ext uri="{28A0092B-C50C-407E-A947-70E740481C1C}">
+                <a14:useLocalDpi xmlns:a14="http://schemas.microsoft.com/office/drawing/2010/main" val="0"/>
+              </a:ext>
+            </a:extLst>
+          </a:blip>
+          <a:srcRect/>
+          <a:stretch>
+            <a:fillRect/>
+          </a:stretch>
+        </p:blipFill>
+        <p:spPr bwMode="auto">
+          <a:xfrm>
+            <a:off x="7601803" y="1540434"/>
+            <a:ext cx="2477069" cy="2477069"/>
+          </a:xfrm>
+          <a:prstGeom prst="rect">
+            <a:avLst/>
+          </a:prstGeom>
+          <a:noFill/>
+          <a:extLst>
+            <a:ext uri="{909E8E84-426E-40DD-AFC4-6F175D3DCCD1}">
+              <a14:hiddenFill xmlns:a14="http://schemas.microsoft.com/office/drawing/2010/main">
+                <a:solidFill>
+                  <a:srgbClr val="FFFFFF"/>
+                </a:solidFill>
+              </a14:hiddenFill>
+            </a:ext>
+          </a:extLst>
+        </p:spPr>
+      </p:pic>
+    </p:spTree>
+    <p:extLst>
+      <p:ext uri="{BB962C8B-B14F-4D97-AF65-F5344CB8AC3E}">
+        <p14:creationId xmlns:p14="http://schemas.microsoft.com/office/powerpoint/2010/main" val="2802002551"/>
+      </p:ext>
+    </p:extLst>
+  </p:cSld>
+  <p:clrMapOvr>
+    <a:masterClrMapping/>
+  </p:clrMapOvr>
+</p:sld>
+</file>
+
+<file path=ppt/slides/slide18.xml><?xml version="1.0" encoding="utf-8"?>
+<p:sld xmlns:a="http://schemas.openxmlformats.org/drawingml/2006/main" xmlns:r="http://schemas.openxmlformats.org/officeDocument/2006/relationships" xmlns:p="http://schemas.openxmlformats.org/presentationml/2006/main">
+  <p:cSld>
+    <p:spTree>
+      <p:nvGrpSpPr>
+        <p:cNvPr id="1" name=""/>
+        <p:cNvGrpSpPr/>
+        <p:nvPr/>
+      </p:nvGrpSpPr>
+      <p:grpSpPr>
+        <a:xfrm>
+          <a:off x="0" y="0"/>
+          <a:ext cx="0" cy="0"/>
+          <a:chOff x="0" y="0"/>
+          <a:chExt cx="0" cy="0"/>
+        </a:xfrm>
+      </p:grpSpPr>
+      <p:pic>
+        <p:nvPicPr>
           <p:cNvPr id="4" name="Picture 3"/>
           <p:cNvPicPr>
             <a:picLocks noChangeAspect="1"/>
@@ -6912,7 +8460,7 @@
 </p:sld>
 </file>
 
-<file path=ppt/slides/slide16.xml><?xml version="1.0" encoding="utf-8"?>
+<file path=ppt/slides/slide19.xml><?xml version="1.0" encoding="utf-8"?>
 <p:sld xmlns:a="http://schemas.openxmlformats.org/drawingml/2006/main" xmlns:r="http://schemas.openxmlformats.org/officeDocument/2006/relationships" xmlns:p="http://schemas.openxmlformats.org/presentationml/2006/main">
   <p:cSld>
     <p:spTree>

</xml_diff>

<commit_message>
Add projects to demo CSRF and update presentation
</commit_message>
<xml_diff>
--- a/MeetUP 31-03-2023 BFF and Security/How BFF pattern can be used to improve security in SPAs - 31-03-2023.pptx
+++ b/MeetUP 31-03-2023 BFF and Security/How BFF pattern can be used to improve security in SPAs - 31-03-2023.pptx
@@ -5,28 +5,29 @@
     <p:sldMasterId id="2147483678" r:id="rId1"/>
   </p:sldMasterIdLst>
   <p:notesMasterIdLst>
-    <p:notesMasterId r:id="rId21"/>
+    <p:notesMasterId r:id="rId22"/>
   </p:notesMasterIdLst>
   <p:sldIdLst>
     <p:sldId id="256" r:id="rId2"/>
     <p:sldId id="257" r:id="rId3"/>
-    <p:sldId id="258" r:id="rId4"/>
-    <p:sldId id="262" r:id="rId5"/>
-    <p:sldId id="267" r:id="rId6"/>
-    <p:sldId id="268" r:id="rId7"/>
-    <p:sldId id="269" r:id="rId8"/>
-    <p:sldId id="270" r:id="rId9"/>
-    <p:sldId id="271" r:id="rId10"/>
-    <p:sldId id="272" r:id="rId11"/>
-    <p:sldId id="273" r:id="rId12"/>
-    <p:sldId id="274" r:id="rId13"/>
-    <p:sldId id="275" r:id="rId14"/>
-    <p:sldId id="276" r:id="rId15"/>
-    <p:sldId id="278" r:id="rId16"/>
-    <p:sldId id="279" r:id="rId17"/>
-    <p:sldId id="280" r:id="rId18"/>
-    <p:sldId id="261" r:id="rId19"/>
-    <p:sldId id="277" r:id="rId20"/>
+    <p:sldId id="281" r:id="rId4"/>
+    <p:sldId id="267" r:id="rId5"/>
+    <p:sldId id="268" r:id="rId6"/>
+    <p:sldId id="269" r:id="rId7"/>
+    <p:sldId id="270" r:id="rId8"/>
+    <p:sldId id="271" r:id="rId9"/>
+    <p:sldId id="272" r:id="rId10"/>
+    <p:sldId id="273" r:id="rId11"/>
+    <p:sldId id="274" r:id="rId12"/>
+    <p:sldId id="275" r:id="rId13"/>
+    <p:sldId id="262" r:id="rId14"/>
+    <p:sldId id="258" r:id="rId15"/>
+    <p:sldId id="276" r:id="rId16"/>
+    <p:sldId id="278" r:id="rId17"/>
+    <p:sldId id="279" r:id="rId18"/>
+    <p:sldId id="280" r:id="rId19"/>
+    <p:sldId id="261" r:id="rId20"/>
+    <p:sldId id="277" r:id="rId21"/>
   </p:sldIdLst>
   <p:sldSz cx="12192000" cy="6858000"/>
   <p:notesSz cx="6858000" cy="9144000"/>
@@ -4144,7 +4145,7 @@
                 <a:ea typeface="+mj-lt"/>
                 <a:cs typeface="+mj-lt"/>
               </a:rPr>
-              <a:t>Challenge: Token Storage</a:t>
+              <a:t>Challenge: Token and Session Management</a:t>
             </a:r>
             <a:endParaRPr lang="en-US" dirty="0">
               <a:solidFill>
@@ -4197,23 +4198,9 @@
                 <a:ea typeface="+mn-lt"/>
                 <a:cs typeface="+mn-lt"/>
               </a:rPr>
-              <a:t>The </a:t>
-            </a:r>
-            <a:r>
-              <a:rPr lang="en" sz="2800" b="1" dirty="0">
-                <a:ea typeface="+mn-lt"/>
-                <a:cs typeface="+mn-lt"/>
-              </a:rPr>
-              <a:t>browser </a:t>
-            </a:r>
-            <a:r>
-              <a:rPr lang="en" b="1" dirty="0">
-                <a:ea typeface="+mn-lt"/>
-                <a:cs typeface="+mn-lt"/>
-              </a:rPr>
-              <a:t>does not have "secure" storage</a:t>
-            </a:r>
-            <a:endParaRPr lang="en-US" sz="2800" dirty="0">
+              <a:t>Access tokens need to be managed</a:t>
+            </a:r>
+            <a:endParaRPr lang="en-US" dirty="0">
               <a:ea typeface="+mn-lt"/>
               <a:cs typeface="+mn-lt"/>
             </a:endParaRPr>
@@ -4234,7 +4221,51 @@
                 <a:ea typeface="+mn-lt"/>
                 <a:cs typeface="+mn-lt"/>
               </a:rPr>
-              <a:t>by design storage is accessible via JavaScript</a:t>
+              <a:t>in absence of refresh tokens</a:t>
+            </a:r>
+            <a:r>
+              <a:rPr lang="en" dirty="0">
+                <a:ea typeface="+mn-lt"/>
+                <a:cs typeface="+mn-lt"/>
+              </a:rPr>
+              <a:t>, the "silent renew" technique has been commonly used</a:t>
+            </a:r>
+            <a:endParaRPr lang="en-US" sz="2800" dirty="0">
+              <a:ea typeface="+mn-lt"/>
+              <a:cs typeface="+mn-lt"/>
+            </a:endParaRPr>
+          </a:p>
+          <a:p>
+            <a:pPr marL="914400" lvl="1" indent="-317500">
+              <a:lnSpc>
+                <a:spcPct val="100000"/>
+              </a:lnSpc>
+              <a:spcBef>
+                <a:spcPts val="0"/>
+              </a:spcBef>
+              <a:buFont typeface="Arial,Sans-Serif" panose="020B0604020202020204" pitchFamily="34" charset="0"/>
+              <a:buChar char="○"/>
+            </a:pPr>
+            <a:r>
+              <a:rPr lang="en" sz="2800" dirty="0">
+                <a:ea typeface="+mn-lt"/>
+                <a:cs typeface="+mn-lt"/>
+              </a:rPr>
+              <a:t>utilizes </a:t>
+            </a:r>
+            <a:r>
+              <a:rPr lang="en" sz="2800" dirty="0" err="1">
+                <a:ea typeface="+mn-lt"/>
+                <a:cs typeface="+mn-lt"/>
+              </a:rPr>
+              <a:t>iFrame</a:t>
+            </a:r>
+            <a:r>
+              <a:rPr lang="en" sz="2800" dirty="0">
+                <a:ea typeface="+mn-lt"/>
+                <a:cs typeface="+mn-lt"/>
+              </a:rPr>
+              <a:t> with session cookie to request new tokens</a:t>
             </a:r>
             <a:endParaRPr lang="en-US" sz="2800" dirty="0">
               <a:ea typeface="+mn-lt"/>
@@ -4271,7 +4302,7 @@
                 <a:ea typeface="+mn-lt"/>
                 <a:cs typeface="+mn-lt"/>
               </a:rPr>
-              <a:t>Code injection attacks allow exfiltration of storage content</a:t>
+              <a:t>Frontend applications needs session change notifications</a:t>
             </a:r>
             <a:endParaRPr lang="en-US" dirty="0">
               <a:ea typeface="+mn-lt"/>
@@ -4290,11 +4321,39 @@
               <a:buChar char="○"/>
             </a:pPr>
             <a:r>
+              <a:rPr lang="en" sz="2800" dirty="0">
+                <a:ea typeface="+mn-lt"/>
+                <a:cs typeface="+mn-lt"/>
+              </a:rPr>
+              <a:t>JavaScript </a:t>
+            </a:r>
+            <a:r>
+              <a:rPr lang="en" sz="2800" dirty="0" err="1">
+                <a:ea typeface="+mn-lt"/>
+                <a:cs typeface="+mn-lt"/>
+              </a:rPr>
+              <a:t>checkSession</a:t>
+            </a:r>
+            <a:r>
               <a:rPr lang="en" dirty="0">
                 <a:ea typeface="+mn-lt"/>
                 <a:cs typeface="+mn-lt"/>
               </a:rPr>
-              <a:t>injection attacks top threat on OWASP top ten</a:t>
+              <a:t> </a:t>
+            </a:r>
+            <a:r>
+              <a:rPr lang="en" dirty="0" err="1">
+                <a:ea typeface="+mn-lt"/>
+                <a:cs typeface="+mn-lt"/>
+              </a:rPr>
+              <a:t>iFrame</a:t>
+            </a:r>
+            <a:r>
+              <a:rPr lang="en" dirty="0">
+                <a:ea typeface="+mn-lt"/>
+                <a:cs typeface="+mn-lt"/>
+              </a:rPr>
+              <a:t> technique</a:t>
             </a:r>
             <a:endParaRPr lang="en-US" dirty="0">
               <a:ea typeface="+mn-lt"/>
@@ -4313,80 +4372,27 @@
               <a:buChar char="○"/>
             </a:pPr>
             <a:r>
+              <a:rPr lang="en" sz="2800" dirty="0">
+                <a:ea typeface="+mn-lt"/>
+                <a:cs typeface="+mn-lt"/>
+              </a:rPr>
+              <a:t>relies on </a:t>
+            </a:r>
+            <a:r>
               <a:rPr lang="en" dirty="0">
                 <a:ea typeface="+mn-lt"/>
                 <a:cs typeface="+mn-lt"/>
-                <a:hlinkClick r:id="rId3"/>
-              </a:rPr>
-              <a:t>https://www.securityweek.com/google-releases-poc-exploit-browser-based-spectre-attack</a:t>
-            </a:r>
-            <a:endParaRPr lang="en-US" dirty="0">
-              <a:ea typeface="+mn-lt"/>
-              <a:cs typeface="+mn-lt"/>
-            </a:endParaRPr>
-          </a:p>
-          <a:p>
-            <a:pPr marL="685800">
-              <a:lnSpc>
-                <a:spcPct val="100000"/>
-              </a:lnSpc>
-              <a:spcBef>
-                <a:spcPts val="0"/>
-              </a:spcBef>
-            </a:pPr>
-            <a:endParaRPr lang="en-US" dirty="0">
-              <a:ea typeface="+mn-lt"/>
-              <a:cs typeface="+mn-lt"/>
-            </a:endParaRPr>
-          </a:p>
-          <a:p>
-            <a:pPr marL="457200" indent="-317500">
-              <a:lnSpc>
-                <a:spcPct val="100000"/>
-              </a:lnSpc>
-              <a:spcBef>
-                <a:spcPts val="0"/>
-              </a:spcBef>
-              <a:buFont typeface="Arial,Sans-Serif" panose="020B0604020202020204" pitchFamily="34" charset="0"/>
-              <a:buChar char="●"/>
-            </a:pPr>
-            <a:r>
-              <a:rPr lang="en" b="1" dirty="0">
+              </a:rPr>
+              <a:t>a session cookie in </a:t>
+            </a:r>
+            <a:r>
+              <a:rPr lang="en" dirty="0" err="1">
                 <a:ea typeface="+mn-lt"/>
                 <a:cs typeface="+mn-lt"/>
               </a:rPr>
-              <a:t>That's why Implicit </a:t>
-            </a:r>
-            <a:r>
-              <a:rPr lang="en" sz="2800" b="1" dirty="0">
-                <a:ea typeface="+mn-lt"/>
-                <a:cs typeface="+mn-lt"/>
-              </a:rPr>
-              <a:t>Flow</a:t>
-            </a:r>
-            <a:r>
-              <a:rPr lang="en" b="1" dirty="0">
-                <a:ea typeface="+mn-lt"/>
-                <a:cs typeface="+mn-lt"/>
-              </a:rPr>
-              <a:t> does not allow refresh tokens</a:t>
-            </a:r>
-            <a:endParaRPr lang="en-US" dirty="0">
-              <a:ea typeface="+mn-lt"/>
-              <a:cs typeface="+mn-lt"/>
-            </a:endParaRPr>
-          </a:p>
-          <a:p>
-            <a:pPr marL="0" indent="0">
-              <a:lnSpc>
-                <a:spcPct val="100000"/>
-              </a:lnSpc>
-              <a:spcBef>
-                <a:spcPts val="0"/>
-              </a:spcBef>
-              <a:buNone/>
-            </a:pPr>
-            <a:endParaRPr lang="en-US" dirty="0">
+              <a:t>iFrame</a:t>
+            </a:r>
+            <a:endParaRPr lang="en-US" dirty="0" err="1">
               <a:ea typeface="+mn-lt"/>
               <a:cs typeface="+mn-lt"/>
             </a:endParaRPr>
@@ -4396,7 +4402,7 @@
     </p:spTree>
     <p:extLst>
       <p:ext uri="{BB962C8B-B14F-4D97-AF65-F5344CB8AC3E}">
-        <p14:creationId xmlns:p14="http://schemas.microsoft.com/office/powerpoint/2010/main" val="468047506"/>
+        <p14:creationId xmlns:p14="http://schemas.microsoft.com/office/powerpoint/2010/main" val="871795148"/>
       </p:ext>
     </p:extLst>
   </p:cSld>
@@ -4484,7 +4490,7 @@
                 <a:ea typeface="+mj-lt"/>
                 <a:cs typeface="+mj-lt"/>
               </a:rPr>
-              <a:t>Challenge: Token and Session Management</a:t>
+              <a:t>Browser Changes (1/2)</a:t>
             </a:r>
             <a:endParaRPr lang="en-US" dirty="0">
               <a:solidFill>
@@ -4512,13 +4518,13 @@
         </p:nvSpPr>
         <p:spPr>
           <a:xfrm>
-            <a:off x="837334" y="1104179"/>
-            <a:ext cx="10640291" cy="4382077"/>
+            <a:off x="837334" y="1027979"/>
+            <a:ext cx="10640291" cy="4943185"/>
           </a:xfrm>
         </p:spPr>
         <p:txBody>
           <a:bodyPr vert="horz" lIns="91440" tIns="45720" rIns="91440" bIns="45720" rtlCol="0" anchor="t">
-            <a:normAutofit/>
+            <a:normAutofit fontScale="77500" lnSpcReduction="20000"/>
           </a:bodyPr>
           <a:lstStyle/>
           <a:p>
@@ -4537,7 +4543,7 @@
                 <a:ea typeface="+mn-lt"/>
                 <a:cs typeface="+mn-lt"/>
               </a:rPr>
-              <a:t>Access tokens need to be managed</a:t>
+              <a:t>Browsers more restrictive how they deal with 3rd party cookies</a:t>
             </a:r>
             <a:endParaRPr lang="en-US" dirty="0">
               <a:ea typeface="+mn-lt"/>
@@ -4560,16 +4566,53 @@
                 <a:ea typeface="+mn-lt"/>
                 <a:cs typeface="+mn-lt"/>
               </a:rPr>
-              <a:t>in absence of refresh tokens</a:t>
-            </a:r>
-            <a:r>
-              <a:rPr lang="en" dirty="0">
+              <a:t>especially in </a:t>
+            </a:r>
+            <a:r>
+              <a:rPr lang="en" sz="2800" dirty="0" err="1">
                 <a:ea typeface="+mn-lt"/>
                 <a:cs typeface="+mn-lt"/>
               </a:rPr>
-              <a:t>, the "silent renew" technique has been commonly used</a:t>
-            </a:r>
-            <a:endParaRPr lang="en-US" sz="2800" dirty="0">
+              <a:t>iFrames</a:t>
+            </a:r>
+            <a:endParaRPr lang="en-US" sz="2800" dirty="0" err="1">
+              <a:ea typeface="+mn-lt"/>
+              <a:cs typeface="+mn-lt"/>
+            </a:endParaRPr>
+          </a:p>
+          <a:p>
+            <a:pPr marL="685800">
+              <a:lnSpc>
+                <a:spcPct val="100000"/>
+              </a:lnSpc>
+              <a:spcBef>
+                <a:spcPts val="0"/>
+              </a:spcBef>
+            </a:pPr>
+            <a:endParaRPr lang="en-US" dirty="0">
+              <a:ea typeface="+mn-lt"/>
+              <a:cs typeface="+mn-lt"/>
+            </a:endParaRPr>
+          </a:p>
+          <a:p>
+            <a:pPr marL="457200" indent="-317500">
+              <a:lnSpc>
+                <a:spcPct val="100000"/>
+              </a:lnSpc>
+              <a:spcBef>
+                <a:spcPts val="0"/>
+              </a:spcBef>
+              <a:buFont typeface="Arial,Sans-Serif" panose="020B0604020202020204" pitchFamily="34" charset="0"/>
+              <a:buChar char="●"/>
+            </a:pPr>
+            <a:r>
+              <a:rPr lang="en" b="1" dirty="0">
+                <a:ea typeface="+mn-lt"/>
+                <a:cs typeface="+mn-lt"/>
+              </a:rPr>
+              <a:t>Safari</a:t>
+            </a:r>
+            <a:endParaRPr lang="en-US" dirty="0">
               <a:ea typeface="+mn-lt"/>
               <a:cs typeface="+mn-lt"/>
             </a:endParaRPr>
@@ -4586,40 +4629,16 @@
               <a:buChar char="○"/>
             </a:pPr>
             <a:r>
-              <a:rPr lang="en" sz="2800" dirty="0">
+              <a:rPr lang="en" sz="2800" u="sng" dirty="0">
+                <a:solidFill>
+                  <a:schemeClr val="hlink"/>
+                </a:solidFill>
                 <a:ea typeface="+mn-lt"/>
                 <a:cs typeface="+mn-lt"/>
-              </a:rPr>
-              <a:t>utilizes </a:t>
-            </a:r>
-            <a:r>
-              <a:rPr lang="en" sz="2800" dirty="0" err="1">
-                <a:ea typeface="+mn-lt"/>
-                <a:cs typeface="+mn-lt"/>
-              </a:rPr>
-              <a:t>iFrame</a:t>
-            </a:r>
-            <a:r>
-              <a:rPr lang="en" sz="2800" dirty="0">
-                <a:ea typeface="+mn-lt"/>
-                <a:cs typeface="+mn-lt"/>
-              </a:rPr>
-              <a:t> with session cookie to request new tokens</a:t>
-            </a:r>
-            <a:endParaRPr lang="en-US" sz="2800" dirty="0">
-              <a:ea typeface="+mn-lt"/>
-              <a:cs typeface="+mn-lt"/>
-            </a:endParaRPr>
-          </a:p>
-          <a:p>
-            <a:pPr marL="685800">
-              <a:lnSpc>
-                <a:spcPct val="100000"/>
-              </a:lnSpc>
-              <a:spcBef>
-                <a:spcPts val="0"/>
-              </a:spcBef>
-            </a:pPr>
+                <a:hlinkClick r:id="rId3"/>
+              </a:rPr>
+              <a:t>https://webkit.org/blog/10218/full-third-party-cookie-blocking-and-more/</a:t>
+            </a:r>
             <a:endParaRPr lang="en-US" sz="2800" dirty="0">
               <a:ea typeface="+mn-lt"/>
               <a:cs typeface="+mn-lt"/>
@@ -4641,7 +4660,7 @@
                 <a:ea typeface="+mn-lt"/>
                 <a:cs typeface="+mn-lt"/>
               </a:rPr>
-              <a:t>Frontend applications needs session change notifications</a:t>
+              <a:t>Chrome</a:t>
             </a:r>
             <a:endParaRPr lang="en-US" dirty="0">
               <a:ea typeface="+mn-lt"/>
@@ -4660,39 +4679,38 @@
               <a:buChar char="○"/>
             </a:pPr>
             <a:r>
-              <a:rPr lang="en" sz="2800" dirty="0">
+              <a:rPr lang="en" sz="2800" u="sng" dirty="0">
+                <a:solidFill>
+                  <a:schemeClr val="hlink"/>
+                </a:solidFill>
                 <a:ea typeface="+mn-lt"/>
                 <a:cs typeface="+mn-lt"/>
-              </a:rPr>
-              <a:t>JavaScript </a:t>
-            </a:r>
-            <a:r>
-              <a:rPr lang="en" sz="2800" dirty="0" err="1">
+                <a:hlinkClick r:id="rId4"/>
+              </a:rPr>
+              <a:t>https://www.theverge.com/2021/6/24/22547339/google-chromecookiepocalypse-delayed-2023</a:t>
+            </a:r>
+            <a:endParaRPr lang="en-US" sz="2800" dirty="0">
+              <a:ea typeface="+mn-lt"/>
+              <a:cs typeface="+mn-lt"/>
+            </a:endParaRPr>
+          </a:p>
+          <a:p>
+            <a:pPr marL="457200" indent="-317500">
+              <a:lnSpc>
+                <a:spcPct val="100000"/>
+              </a:lnSpc>
+              <a:spcBef>
+                <a:spcPts val="0"/>
+              </a:spcBef>
+              <a:buFont typeface="Arial,Sans-Serif" panose="020B0604020202020204" pitchFamily="34" charset="0"/>
+              <a:buChar char="●"/>
+            </a:pPr>
+            <a:r>
+              <a:rPr lang="en" b="1" dirty="0">
                 <a:ea typeface="+mn-lt"/>
                 <a:cs typeface="+mn-lt"/>
               </a:rPr>
-              <a:t>checkSession</a:t>
-            </a:r>
-            <a:r>
-              <a:rPr lang="en" dirty="0">
-                <a:ea typeface="+mn-lt"/>
-                <a:cs typeface="+mn-lt"/>
-              </a:rPr>
-              <a:t> </a:t>
-            </a:r>
-            <a:r>
-              <a:rPr lang="en" dirty="0" err="1">
-                <a:ea typeface="+mn-lt"/>
-                <a:cs typeface="+mn-lt"/>
-              </a:rPr>
-              <a:t>iFrame</a:t>
-            </a:r>
-            <a:r>
-              <a:rPr lang="en" dirty="0">
-                <a:ea typeface="+mn-lt"/>
-                <a:cs typeface="+mn-lt"/>
-              </a:rPr>
-              <a:t> technique</a:t>
+              <a:t>Affected features</a:t>
             </a:r>
             <a:endParaRPr lang="en-US" dirty="0">
               <a:ea typeface="+mn-lt"/>
@@ -4715,23 +4733,200 @@
                 <a:ea typeface="+mn-lt"/>
                 <a:cs typeface="+mn-lt"/>
               </a:rPr>
-              <a:t>relies on </a:t>
+              <a:t>silent renew</a:t>
+            </a:r>
+            <a:endParaRPr lang="en-US" sz="2800" dirty="0">
+              <a:ea typeface="+mn-lt"/>
+              <a:cs typeface="+mn-lt"/>
+            </a:endParaRPr>
+          </a:p>
+          <a:p>
+            <a:pPr marL="914400" lvl="1" indent="-317500">
+              <a:lnSpc>
+                <a:spcPct val="100000"/>
+              </a:lnSpc>
+              <a:spcBef>
+                <a:spcPts val="0"/>
+              </a:spcBef>
+              <a:buFont typeface="Arial,Sans-Serif" panose="020B0604020202020204" pitchFamily="34" charset="0"/>
+              <a:buChar char="○"/>
+            </a:pPr>
+            <a:r>
+              <a:rPr lang="en" sz="2800" dirty="0">
+                <a:ea typeface="+mn-lt"/>
+                <a:cs typeface="+mn-lt"/>
+              </a:rPr>
+              <a:t>session notifications</a:t>
+            </a:r>
+            <a:endParaRPr lang="en-US" sz="2800" dirty="0">
+              <a:ea typeface="+mn-lt"/>
+              <a:cs typeface="+mn-lt"/>
+            </a:endParaRPr>
+          </a:p>
+          <a:p>
+            <a:pPr marL="1371600" lvl="2" indent="-317500">
+              <a:lnSpc>
+                <a:spcPct val="100000"/>
+              </a:lnSpc>
+              <a:spcBef>
+                <a:spcPts val="0"/>
+              </a:spcBef>
+              <a:buFont typeface="Arial,Sans-Serif" panose="020B0604020202020204" pitchFamily="34" charset="0"/>
+              <a:buChar char="■"/>
+            </a:pPr>
+            <a:r>
+              <a:rPr lang="en" sz="2800" dirty="0">
+                <a:ea typeface="+mn-lt"/>
+                <a:cs typeface="+mn-lt"/>
+              </a:rPr>
+              <a:t>both JS and front-channel</a:t>
+            </a:r>
+            <a:endParaRPr lang="en-US" sz="2800" dirty="0">
+              <a:ea typeface="+mn-lt"/>
+              <a:cs typeface="+mn-lt"/>
+            </a:endParaRPr>
+          </a:p>
+          <a:p>
+            <a:pPr marL="457200" indent="-317500">
+              <a:lnSpc>
+                <a:spcPct val="100000"/>
+              </a:lnSpc>
+              <a:spcBef>
+                <a:spcPts val="0"/>
+              </a:spcBef>
+              <a:buFont typeface="Arial,Sans-Serif" panose="020B0604020202020204" pitchFamily="34" charset="0"/>
+              <a:buChar char="●"/>
+            </a:pPr>
+            <a:r>
+              <a:rPr lang="en" b="1" dirty="0">
+                <a:ea typeface="+mn-lt"/>
+                <a:cs typeface="+mn-lt"/>
+              </a:rPr>
+              <a:t>End result: do your own token management with refresh </a:t>
+            </a:r>
+            <a:r>
+              <a:rPr lang="en" sz="2800" b="1" dirty="0">
+                <a:ea typeface="+mn-lt"/>
+                <a:cs typeface="+mn-lt"/>
+              </a:rPr>
+              <a:t>tokens</a:t>
+            </a:r>
+            <a:endParaRPr lang="en-US" sz="2800" b="1" dirty="0">
+              <a:ea typeface="+mn-lt"/>
+              <a:cs typeface="+mn-lt"/>
+            </a:endParaRPr>
+          </a:p>
+          <a:p>
+            <a:pPr marL="914400" lvl="1" indent="-317500">
+              <a:lnSpc>
+                <a:spcPct val="100000"/>
+              </a:lnSpc>
+              <a:spcBef>
+                <a:spcPts val="0"/>
+              </a:spcBef>
+              <a:buFont typeface="Arial,Sans-Serif" panose="020B0604020202020204" pitchFamily="34" charset="0"/>
+              <a:buChar char="○"/>
+            </a:pPr>
+            <a:r>
+              <a:rPr lang="en" sz="2800" dirty="0">
+                <a:ea typeface="+mn-lt"/>
+                <a:cs typeface="+mn-lt"/>
+              </a:rPr>
+              <a:t>refresh tokens end up in the browser</a:t>
+            </a:r>
+            <a:endParaRPr lang="en-US" sz="2800" dirty="0">
+              <a:ea typeface="+mn-lt"/>
+              <a:cs typeface="+mn-lt"/>
+            </a:endParaRPr>
+          </a:p>
+          <a:p>
+            <a:pPr marL="914400" lvl="1" indent="-317500">
+              <a:lnSpc>
+                <a:spcPct val="100000"/>
+              </a:lnSpc>
+              <a:spcBef>
+                <a:spcPts val="0"/>
+              </a:spcBef>
+              <a:buFont typeface="Arial,Sans-Serif" panose="020B0604020202020204" pitchFamily="34" charset="0"/>
+              <a:buChar char="○"/>
+            </a:pPr>
+            <a:r>
+              <a:rPr lang="en" sz="2800" dirty="0">
+                <a:ea typeface="+mn-lt"/>
+                <a:cs typeface="+mn-lt"/>
+              </a:rPr>
+              <a:t>requires complicated token </a:t>
             </a:r>
             <a:r>
               <a:rPr lang="en" dirty="0">
                 <a:ea typeface="+mn-lt"/>
                 <a:cs typeface="+mn-lt"/>
               </a:rPr>
-              <a:t>a session cookie in </a:t>
-            </a:r>
-            <a:r>
-              <a:rPr lang="en" dirty="0" err="1">
+              <a:t>rotation techniques (that do not really work)</a:t>
+            </a:r>
+            <a:endParaRPr lang="en-US" sz="2800" dirty="0">
+              <a:ea typeface="+mn-lt"/>
+              <a:cs typeface="+mn-lt"/>
+            </a:endParaRPr>
+          </a:p>
+          <a:p>
+            <a:pPr marL="457200" indent="-317500">
+              <a:lnSpc>
+                <a:spcPct val="100000"/>
+              </a:lnSpc>
+              <a:spcBef>
+                <a:spcPts val="0"/>
+              </a:spcBef>
+              <a:buFont typeface="Arial,Sans-Serif" panose="020B0604020202020204" pitchFamily="34" charset="0"/>
+              <a:buChar char="●"/>
+            </a:pPr>
+            <a:r>
+              <a:rPr lang="en" b="1" dirty="0">
                 <a:ea typeface="+mn-lt"/>
                 <a:cs typeface="+mn-lt"/>
               </a:rPr>
-              <a:t>iFrame</a:t>
-            </a:r>
-            <a:endParaRPr lang="en-US" dirty="0" err="1">
+              <a:t>Session change notifications do not work anymore</a:t>
+            </a:r>
+            <a:endParaRPr lang="en-US" dirty="0">
+              <a:ea typeface="+mn-lt"/>
+              <a:cs typeface="+mn-lt"/>
+            </a:endParaRPr>
+          </a:p>
+          <a:p>
+            <a:pPr marL="914400" lvl="1" indent="-317500">
+              <a:lnSpc>
+                <a:spcPct val="100000"/>
+              </a:lnSpc>
+              <a:spcBef>
+                <a:spcPts val="0"/>
+              </a:spcBef>
+              <a:buFont typeface="Arial,Sans-Serif" panose="020B0604020202020204" pitchFamily="34" charset="0"/>
+              <a:buChar char="○"/>
+            </a:pPr>
+            <a:r>
+              <a:rPr lang="en" sz="2800" dirty="0">
+                <a:ea typeface="+mn-lt"/>
+                <a:cs typeface="+mn-lt"/>
+              </a:rPr>
+              <a:t>back-channel notifications rarely implemented</a:t>
+            </a:r>
+            <a:endParaRPr lang="en-US" sz="2800" dirty="0">
+              <a:ea typeface="+mn-lt"/>
+              <a:cs typeface="+mn-lt"/>
+            </a:endParaRPr>
+          </a:p>
+          <a:p>
+            <a:pPr marL="457200" indent="-317500">
+              <a:lnSpc>
+                <a:spcPct val="100000"/>
+              </a:lnSpc>
+              <a:spcBef>
+                <a:spcPts val="0"/>
+              </a:spcBef>
+              <a:buFont typeface="Arial,Sans-Serif" panose="020B0604020202020204" pitchFamily="34" charset="0"/>
+              <a:buChar char="●"/>
+            </a:pPr>
+            <a:endParaRPr lang="en" b="1" dirty="0">
               <a:ea typeface="+mn-lt"/>
               <a:cs typeface="+mn-lt"/>
             </a:endParaRPr>
@@ -4741,7 +4936,7 @@
     </p:spTree>
     <p:extLst>
       <p:ext uri="{BB962C8B-B14F-4D97-AF65-F5344CB8AC3E}">
-        <p14:creationId xmlns:p14="http://schemas.microsoft.com/office/powerpoint/2010/main" val="871795148"/>
+        <p14:creationId xmlns:p14="http://schemas.microsoft.com/office/powerpoint/2010/main" val="3593153976"/>
       </p:ext>
     </p:extLst>
   </p:cSld>
@@ -4829,7 +5024,7 @@
                 <a:ea typeface="+mj-lt"/>
                 <a:cs typeface="+mj-lt"/>
               </a:rPr>
-              <a:t>Browser Changes (1/2)</a:t>
+              <a:t>Browser Changes (2/2)</a:t>
             </a:r>
             <a:endParaRPr lang="en-US" dirty="0">
               <a:solidFill>
@@ -4858,12 +5053,12 @@
         <p:spPr>
           <a:xfrm>
             <a:off x="837334" y="1027979"/>
-            <a:ext cx="10640291" cy="4943185"/>
+            <a:ext cx="10640291" cy="1701222"/>
           </a:xfrm>
         </p:spPr>
         <p:txBody>
           <a:bodyPr vert="horz" lIns="91440" tIns="45720" rIns="91440" bIns="45720" rtlCol="0" anchor="t">
-            <a:normAutofit fontScale="77500" lnSpcReduction="20000"/>
+            <a:normAutofit/>
           </a:bodyPr>
           <a:lstStyle/>
           <a:p>
@@ -4882,9 +5077,23 @@
                 <a:ea typeface="+mn-lt"/>
                 <a:cs typeface="+mn-lt"/>
               </a:rPr>
-              <a:t>Browsers more restrictive how they deal with 3rd party cookies</a:t>
-            </a:r>
-            <a:endParaRPr lang="en-US" dirty="0">
+              <a:t>Browser vendors emphasize the "same site" sandbox </a:t>
+            </a:r>
+            <a:r>
+              <a:rPr lang="en" sz="2800" b="1" dirty="0">
+                <a:ea typeface="+mn-lt"/>
+                <a:cs typeface="+mn-lt"/>
+              </a:rPr>
+              <a:t>and </a:t>
+            </a:r>
+            <a:r>
+              <a:rPr lang="en" b="1" dirty="0">
+                <a:ea typeface="+mn-lt"/>
+                <a:cs typeface="+mn-lt"/>
+              </a:rPr>
+              <a:t>architecture</a:t>
+            </a:r>
+            <a:endParaRPr lang="en-US" sz="2800" dirty="0">
               <a:ea typeface="+mn-lt"/>
               <a:cs typeface="+mn-lt"/>
             </a:endParaRPr>
@@ -4901,55 +5110,18 @@
               <a:buChar char="○"/>
             </a:pPr>
             <a:r>
-              <a:rPr lang="en" sz="2800" dirty="0">
+              <a:rPr lang="en" dirty="0" err="1">
                 <a:ea typeface="+mn-lt"/>
                 <a:cs typeface="+mn-lt"/>
               </a:rPr>
-              <a:t>especially in </a:t>
-            </a:r>
-            <a:r>
-              <a:rPr lang="en" sz="2800" dirty="0" err="1">
+              <a:t>SameSite</a:t>
+            </a:r>
+            <a:r>
+              <a:rPr lang="en" dirty="0">
                 <a:ea typeface="+mn-lt"/>
                 <a:cs typeface="+mn-lt"/>
               </a:rPr>
-              <a:t>iFrames</a:t>
-            </a:r>
-            <a:endParaRPr lang="en-US" sz="2800" dirty="0" err="1">
-              <a:ea typeface="+mn-lt"/>
-              <a:cs typeface="+mn-lt"/>
-            </a:endParaRPr>
-          </a:p>
-          <a:p>
-            <a:pPr marL="685800">
-              <a:lnSpc>
-                <a:spcPct val="100000"/>
-              </a:lnSpc>
-              <a:spcBef>
-                <a:spcPts val="0"/>
-              </a:spcBef>
-            </a:pPr>
-            <a:endParaRPr lang="en-US" dirty="0">
-              <a:ea typeface="+mn-lt"/>
-              <a:cs typeface="+mn-lt"/>
-            </a:endParaRPr>
-          </a:p>
-          <a:p>
-            <a:pPr marL="457200" indent="-317500">
-              <a:lnSpc>
-                <a:spcPct val="100000"/>
-              </a:lnSpc>
-              <a:spcBef>
-                <a:spcPts val="0"/>
-              </a:spcBef>
-              <a:buFont typeface="Arial,Sans-Serif" panose="020B0604020202020204" pitchFamily="34" charset="0"/>
-              <a:buChar char="●"/>
-            </a:pPr>
-            <a:r>
-              <a:rPr lang="en" b="1" dirty="0">
-                <a:ea typeface="+mn-lt"/>
-                <a:cs typeface="+mn-lt"/>
-              </a:rPr>
-              <a:t>Safari</a:t>
+              <a:t> cookies</a:t>
             </a:r>
             <a:endParaRPr lang="en-US" dirty="0">
               <a:ea typeface="+mn-lt"/>
@@ -4968,288 +5140,13 @@
               <a:buChar char="○"/>
             </a:pPr>
             <a:r>
-              <a:rPr lang="en" sz="2800" u="sng" dirty="0">
-                <a:solidFill>
-                  <a:schemeClr val="hlink"/>
-                </a:solidFill>
-                <a:ea typeface="+mn-lt"/>
-                <a:cs typeface="+mn-lt"/>
-                <a:hlinkClick r:id="rId3"/>
-              </a:rPr>
-              <a:t>https://webkit.org/blog/10218/full-third-party-cookie-blocking-and-more/</a:t>
-            </a:r>
-            <a:endParaRPr lang="en-US" sz="2800" dirty="0">
-              <a:ea typeface="+mn-lt"/>
-              <a:cs typeface="+mn-lt"/>
-            </a:endParaRPr>
-          </a:p>
-          <a:p>
-            <a:pPr marL="457200" indent="-317500">
-              <a:lnSpc>
-                <a:spcPct val="100000"/>
-              </a:lnSpc>
-              <a:spcBef>
-                <a:spcPts val="0"/>
-              </a:spcBef>
-              <a:buFont typeface="Arial,Sans-Serif" panose="020B0604020202020204" pitchFamily="34" charset="0"/>
-              <a:buChar char="●"/>
-            </a:pPr>
-            <a:r>
-              <a:rPr lang="en" b="1" dirty="0">
-                <a:ea typeface="+mn-lt"/>
-                <a:cs typeface="+mn-lt"/>
-              </a:rPr>
-              <a:t>Chrome</a:t>
-            </a:r>
-            <a:endParaRPr lang="en-US" dirty="0">
-              <a:ea typeface="+mn-lt"/>
-              <a:cs typeface="+mn-lt"/>
-            </a:endParaRPr>
-          </a:p>
-          <a:p>
-            <a:pPr marL="914400" lvl="1" indent="-317500">
-              <a:lnSpc>
-                <a:spcPct val="100000"/>
-              </a:lnSpc>
-              <a:spcBef>
-                <a:spcPts val="0"/>
-              </a:spcBef>
-              <a:buFont typeface="Arial,Sans-Serif" panose="020B0604020202020204" pitchFamily="34" charset="0"/>
-              <a:buChar char="○"/>
-            </a:pPr>
-            <a:r>
-              <a:rPr lang="en" sz="2800" u="sng" dirty="0">
-                <a:solidFill>
-                  <a:schemeClr val="hlink"/>
-                </a:solidFill>
-                <a:ea typeface="+mn-lt"/>
-                <a:cs typeface="+mn-lt"/>
-                <a:hlinkClick r:id="rId4"/>
-              </a:rPr>
-              <a:t>https://www.theverge.com/2021/6/24/22547339/google-chromecookiepocalypse-delayed-2023</a:t>
-            </a:r>
-            <a:endParaRPr lang="en-US" sz="2800" dirty="0">
-              <a:ea typeface="+mn-lt"/>
-              <a:cs typeface="+mn-lt"/>
-            </a:endParaRPr>
-          </a:p>
-          <a:p>
-            <a:pPr marL="457200" indent="-317500">
-              <a:lnSpc>
-                <a:spcPct val="100000"/>
-              </a:lnSpc>
-              <a:spcBef>
-                <a:spcPts val="0"/>
-              </a:spcBef>
-              <a:buFont typeface="Arial,Sans-Serif" panose="020B0604020202020204" pitchFamily="34" charset="0"/>
-              <a:buChar char="●"/>
-            </a:pPr>
-            <a:r>
-              <a:rPr lang="en" b="1" dirty="0">
-                <a:ea typeface="+mn-lt"/>
-                <a:cs typeface="+mn-lt"/>
-              </a:rPr>
-              <a:t>Affected features</a:t>
-            </a:r>
-            <a:endParaRPr lang="en-US" dirty="0">
-              <a:ea typeface="+mn-lt"/>
-              <a:cs typeface="+mn-lt"/>
-            </a:endParaRPr>
-          </a:p>
-          <a:p>
-            <a:pPr marL="914400" lvl="1" indent="-317500">
-              <a:lnSpc>
-                <a:spcPct val="100000"/>
-              </a:lnSpc>
-              <a:spcBef>
-                <a:spcPts val="0"/>
-              </a:spcBef>
-              <a:buFont typeface="Arial,Sans-Serif" panose="020B0604020202020204" pitchFamily="34" charset="0"/>
-              <a:buChar char="○"/>
-            </a:pPr>
-            <a:r>
-              <a:rPr lang="en" sz="2800" dirty="0">
-                <a:ea typeface="+mn-lt"/>
-                <a:cs typeface="+mn-lt"/>
-              </a:rPr>
-              <a:t>silent renew</a:t>
-            </a:r>
-            <a:endParaRPr lang="en-US" sz="2800" dirty="0">
-              <a:ea typeface="+mn-lt"/>
-              <a:cs typeface="+mn-lt"/>
-            </a:endParaRPr>
-          </a:p>
-          <a:p>
-            <a:pPr marL="914400" lvl="1" indent="-317500">
-              <a:lnSpc>
-                <a:spcPct val="100000"/>
-              </a:lnSpc>
-              <a:spcBef>
-                <a:spcPts val="0"/>
-              </a:spcBef>
-              <a:buFont typeface="Arial,Sans-Serif" panose="020B0604020202020204" pitchFamily="34" charset="0"/>
-              <a:buChar char="○"/>
-            </a:pPr>
-            <a:r>
-              <a:rPr lang="en" sz="2800" dirty="0">
-                <a:ea typeface="+mn-lt"/>
-                <a:cs typeface="+mn-lt"/>
-              </a:rPr>
-              <a:t>session notifications</a:t>
-            </a:r>
-            <a:endParaRPr lang="en-US" sz="2800" dirty="0">
-              <a:ea typeface="+mn-lt"/>
-              <a:cs typeface="+mn-lt"/>
-            </a:endParaRPr>
-          </a:p>
-          <a:p>
-            <a:pPr marL="1371600" lvl="2" indent="-317500">
-              <a:lnSpc>
-                <a:spcPct val="100000"/>
-              </a:lnSpc>
-              <a:spcBef>
-                <a:spcPts val="0"/>
-              </a:spcBef>
-              <a:buFont typeface="Arial,Sans-Serif" panose="020B0604020202020204" pitchFamily="34" charset="0"/>
-              <a:buChar char="■"/>
-            </a:pPr>
-            <a:r>
-              <a:rPr lang="en" sz="2800" dirty="0">
-                <a:ea typeface="+mn-lt"/>
-                <a:cs typeface="+mn-lt"/>
-              </a:rPr>
-              <a:t>both JS and front-channel</a:t>
-            </a:r>
-            <a:endParaRPr lang="en-US" sz="2800" dirty="0">
-              <a:ea typeface="+mn-lt"/>
-              <a:cs typeface="+mn-lt"/>
-            </a:endParaRPr>
-          </a:p>
-          <a:p>
-            <a:pPr marL="457200" indent="-317500">
-              <a:lnSpc>
-                <a:spcPct val="100000"/>
-              </a:lnSpc>
-              <a:spcBef>
-                <a:spcPts val="0"/>
-              </a:spcBef>
-              <a:buFont typeface="Arial,Sans-Serif" panose="020B0604020202020204" pitchFamily="34" charset="0"/>
-              <a:buChar char="●"/>
-            </a:pPr>
-            <a:r>
-              <a:rPr lang="en" b="1" dirty="0">
-                <a:ea typeface="+mn-lt"/>
-                <a:cs typeface="+mn-lt"/>
-              </a:rPr>
-              <a:t>End result: do your own token management with refresh </a:t>
-            </a:r>
-            <a:r>
-              <a:rPr lang="en" sz="2800" b="1" dirty="0">
-                <a:ea typeface="+mn-lt"/>
-                <a:cs typeface="+mn-lt"/>
-              </a:rPr>
-              <a:t>tokens</a:t>
-            </a:r>
-            <a:endParaRPr lang="en-US" sz="2800" b="1" dirty="0">
-              <a:ea typeface="+mn-lt"/>
-              <a:cs typeface="+mn-lt"/>
-            </a:endParaRPr>
-          </a:p>
-          <a:p>
-            <a:pPr marL="914400" lvl="1" indent="-317500">
-              <a:lnSpc>
-                <a:spcPct val="100000"/>
-              </a:lnSpc>
-              <a:spcBef>
-                <a:spcPts val="0"/>
-              </a:spcBef>
-              <a:buFont typeface="Arial,Sans-Serif" panose="020B0604020202020204" pitchFamily="34" charset="0"/>
-              <a:buChar char="○"/>
-            </a:pPr>
-            <a:r>
-              <a:rPr lang="en" sz="2800" dirty="0">
-                <a:ea typeface="+mn-lt"/>
-                <a:cs typeface="+mn-lt"/>
-              </a:rPr>
-              <a:t>refresh tokens end up in the browser</a:t>
-            </a:r>
-            <a:endParaRPr lang="en-US" sz="2800" dirty="0">
-              <a:ea typeface="+mn-lt"/>
-              <a:cs typeface="+mn-lt"/>
-            </a:endParaRPr>
-          </a:p>
-          <a:p>
-            <a:pPr marL="914400" lvl="1" indent="-317500">
-              <a:lnSpc>
-                <a:spcPct val="100000"/>
-              </a:lnSpc>
-              <a:spcBef>
-                <a:spcPts val="0"/>
-              </a:spcBef>
-              <a:buFont typeface="Arial,Sans-Serif" panose="020B0604020202020204" pitchFamily="34" charset="0"/>
-              <a:buChar char="○"/>
-            </a:pPr>
-            <a:r>
-              <a:rPr lang="en" sz="2800" dirty="0">
-                <a:ea typeface="+mn-lt"/>
-                <a:cs typeface="+mn-lt"/>
-              </a:rPr>
-              <a:t>requires complicated token </a:t>
-            </a:r>
-            <a:r>
               <a:rPr lang="en" dirty="0">
                 <a:ea typeface="+mn-lt"/>
                 <a:cs typeface="+mn-lt"/>
               </a:rPr>
-              <a:t>rotation techniques (that do not really work)</a:t>
-            </a:r>
-            <a:endParaRPr lang="en-US" sz="2800" dirty="0">
-              <a:ea typeface="+mn-lt"/>
-              <a:cs typeface="+mn-lt"/>
-            </a:endParaRPr>
-          </a:p>
-          <a:p>
-            <a:pPr marL="457200" indent="-317500">
-              <a:lnSpc>
-                <a:spcPct val="100000"/>
-              </a:lnSpc>
-              <a:spcBef>
-                <a:spcPts val="0"/>
-              </a:spcBef>
-              <a:buFont typeface="Arial,Sans-Serif" panose="020B0604020202020204" pitchFamily="34" charset="0"/>
-              <a:buChar char="●"/>
-            </a:pPr>
-            <a:r>
-              <a:rPr lang="en" b="1" dirty="0">
-                <a:ea typeface="+mn-lt"/>
-                <a:cs typeface="+mn-lt"/>
-              </a:rPr>
-              <a:t>Session change notifications do not work anymore</a:t>
-            </a:r>
-            <a:endParaRPr lang="en-US" dirty="0">
-              <a:ea typeface="+mn-lt"/>
-              <a:cs typeface="+mn-lt"/>
-            </a:endParaRPr>
-          </a:p>
-          <a:p>
-            <a:pPr marL="914400" lvl="1" indent="-317500">
-              <a:lnSpc>
-                <a:spcPct val="100000"/>
-              </a:lnSpc>
-              <a:spcBef>
-                <a:spcPts val="0"/>
-              </a:spcBef>
-              <a:buFont typeface="Arial,Sans-Serif" panose="020B0604020202020204" pitchFamily="34" charset="0"/>
-              <a:buChar char="○"/>
-            </a:pPr>
-            <a:r>
-              <a:rPr lang="en" sz="2800" dirty="0">
-                <a:ea typeface="+mn-lt"/>
-                <a:cs typeface="+mn-lt"/>
-              </a:rPr>
-              <a:t>back-channel notifications rarely implemented</a:t>
-            </a:r>
-            <a:endParaRPr lang="en-US" sz="2800" dirty="0">
+              <a:t>CORS for additional sandboxing</a:t>
+            </a:r>
+            <a:endParaRPr lang="en-US">
               <a:ea typeface="+mn-lt"/>
               <a:cs typeface="+mn-lt"/>
             </a:endParaRPr>
@@ -5272,10 +5169,40 @@
           </a:p>
         </p:txBody>
       </p:sp>
+      <p:pic>
+        <p:nvPicPr>
+          <p:cNvPr id="2" name="Picture 2">
+            <a:extLst>
+              <a:ext uri="{FF2B5EF4-FFF2-40B4-BE49-F238E27FC236}">
+                <a16:creationId xmlns:a16="http://schemas.microsoft.com/office/drawing/2014/main" id="{3B1F4CAC-575B-7C9E-744E-BDD9045DB3A5}"/>
+              </a:ext>
+            </a:extLst>
+          </p:cNvPr>
+          <p:cNvPicPr>
+            <a:picLocks noChangeAspect="1"/>
+          </p:cNvPicPr>
+          <p:nvPr/>
+        </p:nvPicPr>
+        <p:blipFill>
+          <a:blip r:embed="rId3"/>
+          <a:stretch>
+            <a:fillRect/>
+          </a:stretch>
+        </p:blipFill>
+        <p:spPr>
+          <a:xfrm>
+            <a:off x="1891146" y="2731001"/>
+            <a:ext cx="8409709" cy="3183235"/>
+          </a:xfrm>
+          <a:prstGeom prst="rect">
+            <a:avLst/>
+          </a:prstGeom>
+        </p:spPr>
+      </p:pic>
     </p:spTree>
     <p:extLst>
       <p:ext uri="{BB962C8B-B14F-4D97-AF65-F5344CB8AC3E}">
-        <p14:creationId xmlns:p14="http://schemas.microsoft.com/office/powerpoint/2010/main" val="3593153976"/>
+        <p14:creationId xmlns:p14="http://schemas.microsoft.com/office/powerpoint/2010/main" val="2742187842"/>
       </p:ext>
     </p:extLst>
   </p:cSld>
@@ -5357,18 +5284,14 @@
             <a:pPr algn="ctr"/>
             <a:r>
               <a:rPr lang="en" dirty="0">
-                <a:solidFill>
-                  <a:schemeClr val="dk1"/>
-                </a:solidFill>
                 <a:ea typeface="+mj-lt"/>
                 <a:cs typeface="+mj-lt"/>
               </a:rPr>
-              <a:t>Browser Changes (2/2)</a:t>
+              <a:t>The BFF Pattern</a:t>
             </a:r>
             <a:endParaRPr lang="en-US" dirty="0">
-              <a:solidFill>
-                <a:schemeClr val="dk1"/>
-              </a:solidFill>
+              <a:ea typeface="+mj-lt"/>
+              <a:cs typeface="+mj-lt"/>
             </a:endParaRPr>
           </a:p>
         </p:txBody>
@@ -5391,76 +5314,54 @@
         </p:nvSpPr>
         <p:spPr>
           <a:xfrm>
-            <a:off x="837334" y="1027979"/>
-            <a:ext cx="10640291" cy="1701222"/>
+            <a:off x="837334" y="965634"/>
+            <a:ext cx="10640291" cy="4389004"/>
           </a:xfrm>
         </p:spPr>
         <p:txBody>
           <a:bodyPr vert="horz" lIns="91440" tIns="45720" rIns="91440" bIns="45720" rtlCol="0" anchor="t">
-            <a:normAutofit/>
+            <a:normAutofit lnSpcReduction="10000"/>
           </a:bodyPr>
           <a:lstStyle/>
           <a:p>
-            <a:pPr marL="457200" indent="-317500">
-              <a:lnSpc>
-                <a:spcPct val="100000"/>
-              </a:lnSpc>
-              <a:spcBef>
-                <a:spcPts val="0"/>
-              </a:spcBef>
-              <a:buFont typeface="Arial,Sans-Serif" panose="020B0604020202020204" pitchFamily="34" charset="0"/>
-              <a:buChar char="●"/>
+            <a:pPr marL="0" indent="0">
+              <a:buNone/>
             </a:pPr>
+            <a:r>
+              <a:rPr lang="en-US" dirty="0">
+                <a:cs typeface="Calibri" panose="020F0502020204030204"/>
+              </a:rPr>
+              <a:t>Pros</a:t>
+            </a:r>
+          </a:p>
+          <a:p>
             <a:r>
               <a:rPr lang="en" b="1" dirty="0">
                 <a:ea typeface="+mn-lt"/>
                 <a:cs typeface="+mn-lt"/>
               </a:rPr>
-              <a:t>Browser vendors emphasize the "same site" sandbox </a:t>
-            </a:r>
-            <a:r>
-              <a:rPr lang="en" sz="2800" b="1" dirty="0">
+              <a:t>Better security</a:t>
+            </a:r>
+            <a:endParaRPr lang="en-US" dirty="0">
+              <a:cs typeface="Calibri"/>
+            </a:endParaRPr>
+          </a:p>
+          <a:p>
+            <a:r>
+              <a:rPr lang="en-US" dirty="0">
                 <a:ea typeface="+mn-lt"/>
                 <a:cs typeface="+mn-lt"/>
               </a:rPr>
-              <a:t>and </a:t>
-            </a:r>
-            <a:r>
-              <a:rPr lang="en" b="1" dirty="0">
-                <a:ea typeface="+mn-lt"/>
-                <a:cs typeface="+mn-lt"/>
-              </a:rPr>
-              <a:t>architecture</a:t>
-            </a:r>
-            <a:endParaRPr lang="en-US" sz="2800" dirty="0">
-              <a:ea typeface="+mn-lt"/>
-              <a:cs typeface="+mn-lt"/>
-            </a:endParaRPr>
-          </a:p>
-          <a:p>
-            <a:pPr marL="914400" lvl="1" indent="-317500">
-              <a:lnSpc>
-                <a:spcPct val="100000"/>
-              </a:lnSpc>
-              <a:spcBef>
-                <a:spcPts val="0"/>
-              </a:spcBef>
-              <a:buFont typeface="Arial,Sans-Serif" panose="020B0604020202020204" pitchFamily="34" charset="0"/>
-              <a:buChar char="○"/>
-            </a:pPr>
-            <a:r>
-              <a:rPr lang="en" dirty="0" err="1">
-                <a:ea typeface="+mn-lt"/>
-                <a:cs typeface="+mn-lt"/>
-              </a:rPr>
-              <a:t>SameSite</a:t>
-            </a:r>
+              <a:t>Separation of Concerns</a:t>
+            </a:r>
+          </a:p>
+          <a:p>
             <a:r>
               <a:rPr lang="en" dirty="0">
                 <a:ea typeface="+mn-lt"/>
                 <a:cs typeface="+mn-lt"/>
               </a:rPr>
-              <a:t> cookies</a:t>
+              <a:t>Easier to maintain and modify APIs</a:t>
             </a:r>
             <a:endParaRPr lang="en-US" dirty="0">
               <a:ea typeface="+mn-lt"/>
@@ -5468,52 +5369,137 @@
             </a:endParaRPr>
           </a:p>
           <a:p>
-            <a:pPr marL="914400" lvl="1" indent="-317500">
-              <a:lnSpc>
-                <a:spcPct val="100000"/>
-              </a:lnSpc>
-              <a:spcBef>
-                <a:spcPts val="0"/>
-              </a:spcBef>
-              <a:buFont typeface="Arial,Sans-Serif" panose="020B0604020202020204" pitchFamily="34" charset="0"/>
-              <a:buChar char="○"/>
-            </a:pPr>
             <a:r>
               <a:rPr lang="en" dirty="0">
                 <a:ea typeface="+mn-lt"/>
                 <a:cs typeface="+mn-lt"/>
               </a:rPr>
-              <a:t>CORS for additional sandboxing</a:t>
-            </a:r>
-            <a:endParaRPr lang="en-US">
+              <a:t>Better error handling in the frontend</a:t>
+            </a:r>
+          </a:p>
+          <a:p>
+            <a:pPr marL="0" indent="0">
+              <a:buNone/>
+            </a:pPr>
+            <a:endParaRPr lang="en" dirty="0">
+              <a:cs typeface="Calibri"/>
+            </a:endParaRPr>
+          </a:p>
+          <a:p>
+            <a:pPr marL="0" indent="0">
+              <a:buNone/>
+            </a:pPr>
+            <a:r>
+              <a:rPr lang="en" dirty="0">
+                <a:cs typeface="Calibri"/>
+              </a:rPr>
+              <a:t>Cons</a:t>
+            </a:r>
+            <a:endParaRPr lang="en" dirty="0"/>
+          </a:p>
+          <a:p>
+            <a:r>
+              <a:rPr lang="en" dirty="0">
+                <a:cs typeface="Calibri"/>
+              </a:rPr>
+              <a:t>Duplication and Lower Reuse</a:t>
+            </a:r>
+            <a:endParaRPr lang="en-US" dirty="0">
+              <a:cs typeface="Calibri"/>
+            </a:endParaRPr>
+          </a:p>
+          <a:p>
+            <a:r>
+              <a:rPr lang="en" dirty="0">
+                <a:cs typeface="Calibri"/>
+              </a:rPr>
+              <a:t>Yet</a:t>
+            </a:r>
+            <a:r>
+              <a:rPr lang="en" dirty="0">
+                <a:ea typeface="+mn-lt"/>
+                <a:cs typeface="+mn-lt"/>
+              </a:rPr>
+              <a:t> another service to monitor and maintain</a:t>
+            </a:r>
+            <a:endParaRPr lang="en-US" dirty="0">
               <a:ea typeface="+mn-lt"/>
               <a:cs typeface="+mn-lt"/>
             </a:endParaRPr>
           </a:p>
           <a:p>
-            <a:pPr marL="457200" indent="-317500">
-              <a:lnSpc>
-                <a:spcPct val="100000"/>
-              </a:lnSpc>
-              <a:spcBef>
-                <a:spcPts val="0"/>
-              </a:spcBef>
-              <a:buFont typeface="Arial,Sans-Serif" panose="020B0604020202020204" pitchFamily="34" charset="0"/>
-              <a:buChar char="●"/>
-            </a:pPr>
-            <a:endParaRPr lang="en" b="1" dirty="0">
-              <a:ea typeface="+mn-lt"/>
-              <a:cs typeface="+mn-lt"/>
+            <a:endParaRPr lang="en" dirty="0">
+              <a:cs typeface="Calibri"/>
             </a:endParaRPr>
           </a:p>
         </p:txBody>
       </p:sp>
+    </p:spTree>
+    <p:extLst>
+      <p:ext uri="{BB962C8B-B14F-4D97-AF65-F5344CB8AC3E}">
+        <p14:creationId xmlns:p14="http://schemas.microsoft.com/office/powerpoint/2010/main" val="1432592030"/>
+      </p:ext>
+    </p:extLst>
+  </p:cSld>
+  <p:clrMapOvr>
+    <a:masterClrMapping/>
+  </p:clrMapOvr>
+</p:sld>
+</file>
+
+<file path=ppt/slides/slide14.xml><?xml version="1.0" encoding="utf-8"?>
+<p:sld xmlns:a="http://schemas.openxmlformats.org/drawingml/2006/main" xmlns:r="http://schemas.openxmlformats.org/officeDocument/2006/relationships" xmlns:p="http://schemas.openxmlformats.org/presentationml/2006/main">
+  <p:cSld>
+    <p:spTree>
+      <p:nvGrpSpPr>
+        <p:cNvPr id="1" name=""/>
+        <p:cNvGrpSpPr/>
+        <p:nvPr/>
+      </p:nvGrpSpPr>
+      <p:grpSpPr>
+        <a:xfrm>
+          <a:off x="0" y="0"/>
+          <a:ext cx="0" cy="0"/>
+          <a:chOff x="0" y="0"/>
+          <a:chExt cx="0" cy="0"/>
+        </a:xfrm>
+      </p:grpSpPr>
       <p:pic>
         <p:nvPicPr>
-          <p:cNvPr id="2" name="Picture 2">
+          <p:cNvPr id="4" name="Picture 3"/>
+          <p:cNvPicPr>
+            <a:picLocks noChangeAspect="1"/>
+          </p:cNvPicPr>
+          <p:nvPr/>
+        </p:nvPicPr>
+        <p:blipFill>
+          <a:blip r:embed="rId2">
+            <a:extLst>
+              <a:ext uri="{28A0092B-C50C-407E-A947-70E740481C1C}">
+                <a14:useLocalDpi xmlns:a14="http://schemas.microsoft.com/office/drawing/2010/main" val="0"/>
+              </a:ext>
+            </a:extLst>
+          </a:blip>
+          <a:stretch>
+            <a:fillRect/>
+          </a:stretch>
+        </p:blipFill>
+        <p:spPr>
+          <a:xfrm>
+            <a:off x="5113020" y="5715000"/>
+            <a:ext cx="7078980" cy="1143000"/>
+          </a:xfrm>
+          <a:prstGeom prst="rect">
+            <a:avLst/>
+          </a:prstGeom>
+        </p:spPr>
+      </p:pic>
+      <p:pic>
+        <p:nvPicPr>
+          <p:cNvPr id="9" name="Picture 9" descr="Diagram&#10;&#10;Description automatically generated">
             <a:extLst>
               <a:ext uri="{FF2B5EF4-FFF2-40B4-BE49-F238E27FC236}">
-                <a16:creationId xmlns:a16="http://schemas.microsoft.com/office/drawing/2014/main" id="{3B1F4CAC-575B-7C9E-744E-BDD9045DB3A5}"/>
+                <a16:creationId xmlns:a16="http://schemas.microsoft.com/office/drawing/2014/main" id="{333D7221-AD4D-4742-43AE-3E1B604279F4}"/>
               </a:ext>
             </a:extLst>
           </p:cNvPr>
@@ -5530,8 +5516,8 @@
         </p:blipFill>
         <p:spPr>
           <a:xfrm>
-            <a:off x="1891146" y="2731001"/>
-            <a:ext cx="8409709" cy="3183235"/>
+            <a:off x="1059873" y="633899"/>
+            <a:ext cx="9996054" cy="4904403"/>
           </a:xfrm>
           <a:prstGeom prst="rect">
             <a:avLst/>
@@ -5541,7 +5527,7 @@
     </p:spTree>
     <p:extLst>
       <p:ext uri="{BB962C8B-B14F-4D97-AF65-F5344CB8AC3E}">
-        <p14:creationId xmlns:p14="http://schemas.microsoft.com/office/powerpoint/2010/main" val="2742187842"/>
+        <p14:creationId xmlns:p14="http://schemas.microsoft.com/office/powerpoint/2010/main" val="4183059362"/>
       </p:ext>
     </p:extLst>
   </p:cSld>
@@ -5551,7 +5537,7 @@
 </p:sld>
 </file>
 
-<file path=ppt/slides/slide14.xml><?xml version="1.0" encoding="utf-8"?>
+<file path=ppt/slides/slide15.xml><?xml version="1.0" encoding="utf-8"?>
 <p:sld xmlns:a="http://schemas.openxmlformats.org/drawingml/2006/main" xmlns:r="http://schemas.openxmlformats.org/officeDocument/2006/relationships" xmlns:p="http://schemas.openxmlformats.org/presentationml/2006/main">
   <p:cSld>
     <p:spTree>
@@ -6794,7 +6780,7 @@
 </p:sld>
 </file>
 
-<file path=ppt/slides/slide15.xml><?xml version="1.0" encoding="utf-8"?>
+<file path=ppt/slides/slide16.xml><?xml version="1.0" encoding="utf-8"?>
 <p:sld xmlns:a="http://schemas.openxmlformats.org/drawingml/2006/main" xmlns:r="http://schemas.openxmlformats.org/officeDocument/2006/relationships" xmlns:p="http://schemas.openxmlformats.org/presentationml/2006/main">
   <p:cSld>
     <p:spTree>
@@ -7240,7 +7226,7 @@
 </p:sld>
 </file>
 
-<file path=ppt/slides/slide16.xml><?xml version="1.0" encoding="utf-8"?>
+<file path=ppt/slides/slide17.xml><?xml version="1.0" encoding="utf-8"?>
 <p:sld xmlns:a="http://schemas.openxmlformats.org/drawingml/2006/main" xmlns:r="http://schemas.openxmlformats.org/officeDocument/2006/relationships" xmlns:p="http://schemas.openxmlformats.org/presentationml/2006/main">
   <p:cSld>
     <p:spTree>
@@ -7804,7 +7790,7 @@
 </p:sld>
 </file>
 
-<file path=ppt/slides/slide17.xml><?xml version="1.0" encoding="utf-8"?>
+<file path=ppt/slides/slide18.xml><?xml version="1.0" encoding="utf-8"?>
 <p:sld xmlns:a="http://schemas.openxmlformats.org/drawingml/2006/main" xmlns:r="http://schemas.openxmlformats.org/officeDocument/2006/relationships" xmlns:p="http://schemas.openxmlformats.org/presentationml/2006/main">
   <p:cSld>
     <p:spTree>
@@ -8339,7 +8325,7 @@
 </p:sld>
 </file>
 
-<file path=ppt/slides/slide18.xml><?xml version="1.0" encoding="utf-8"?>
+<file path=ppt/slides/slide19.xml><?xml version="1.0" encoding="utf-8"?>
 <p:sld xmlns:a="http://schemas.openxmlformats.org/drawingml/2006/main" xmlns:r="http://schemas.openxmlformats.org/officeDocument/2006/relationships" xmlns:p="http://schemas.openxmlformats.org/presentationml/2006/main">
   <p:cSld>
     <p:spTree>
@@ -8445,158 +8431,21 @@
             </a:r>
             <a:endParaRPr lang="en-US" sz="2000" dirty="0"/>
           </a:p>
+          <a:p>
+            <a:r>
+              <a:rPr lang="en-US" sz="2000" dirty="0">
+                <a:hlinkClick r:id="rId4"/>
+              </a:rPr>
+              <a:t>Cross Site Request Forgery (CSRF)​</a:t>
+            </a:r>
+            <a:endParaRPr lang="en-US" sz="2000" dirty="0"/>
+          </a:p>
         </p:txBody>
       </p:sp>
     </p:spTree>
     <p:extLst>
       <p:ext uri="{BB962C8B-B14F-4D97-AF65-F5344CB8AC3E}">
         <p14:creationId xmlns:p14="http://schemas.microsoft.com/office/powerpoint/2010/main" val="1913391185"/>
-      </p:ext>
-    </p:extLst>
-  </p:cSld>
-  <p:clrMapOvr>
-    <a:masterClrMapping/>
-  </p:clrMapOvr>
-</p:sld>
-</file>
-
-<file path=ppt/slides/slide19.xml><?xml version="1.0" encoding="utf-8"?>
-<p:sld xmlns:a="http://schemas.openxmlformats.org/drawingml/2006/main" xmlns:r="http://schemas.openxmlformats.org/officeDocument/2006/relationships" xmlns:p="http://schemas.openxmlformats.org/presentationml/2006/main">
-  <p:cSld>
-    <p:spTree>
-      <p:nvGrpSpPr>
-        <p:cNvPr id="1" name=""/>
-        <p:cNvGrpSpPr/>
-        <p:nvPr/>
-      </p:nvGrpSpPr>
-      <p:grpSpPr>
-        <a:xfrm>
-          <a:off x="0" y="0"/>
-          <a:ext cx="0" cy="0"/>
-          <a:chOff x="0" y="0"/>
-          <a:chExt cx="0" cy="0"/>
-        </a:xfrm>
-      </p:grpSpPr>
-      <p:pic>
-        <p:nvPicPr>
-          <p:cNvPr id="4" name="Picture 3"/>
-          <p:cNvPicPr>
-            <a:picLocks noChangeAspect="1"/>
-          </p:cNvPicPr>
-          <p:nvPr/>
-        </p:nvPicPr>
-        <p:blipFill>
-          <a:blip r:embed="rId2">
-            <a:extLst>
-              <a:ext uri="{28A0092B-C50C-407E-A947-70E740481C1C}">
-                <a14:useLocalDpi xmlns:a14="http://schemas.microsoft.com/office/drawing/2010/main" val="0"/>
-              </a:ext>
-            </a:extLst>
-          </a:blip>
-          <a:stretch>
-            <a:fillRect/>
-          </a:stretch>
-        </p:blipFill>
-        <p:spPr>
-          <a:xfrm>
-            <a:off x="5113020" y="5715000"/>
-            <a:ext cx="7078980" cy="1143000"/>
-          </a:xfrm>
-          <a:prstGeom prst="rect">
-            <a:avLst/>
-          </a:prstGeom>
-        </p:spPr>
-      </p:pic>
-      <p:sp>
-        <p:nvSpPr>
-          <p:cNvPr id="9" name="TextBox 8">
-            <a:extLst>
-              <a:ext uri="{FF2B5EF4-FFF2-40B4-BE49-F238E27FC236}">
-                <a16:creationId xmlns:a16="http://schemas.microsoft.com/office/drawing/2014/main" id="{7ABD19AF-ACF2-B3CA-8941-F6C2DF448584}"/>
-              </a:ext>
-            </a:extLst>
-          </p:cNvPr>
-          <p:cNvSpPr txBox="1"/>
-          <p:nvPr/>
-        </p:nvSpPr>
-        <p:spPr>
-          <a:xfrm>
-            <a:off x="1011382" y="471055"/>
-            <a:ext cx="10737272" cy="3354765"/>
-          </a:xfrm>
-          <a:prstGeom prst="rect">
-            <a:avLst/>
-          </a:prstGeom>
-          <a:noFill/>
-        </p:spPr>
-        <p:txBody>
-          <a:bodyPr rot="0" spcFirstLastPara="0" vertOverflow="overflow" horzOverflow="overflow" vert="horz" wrap="square" lIns="91440" tIns="45720" rIns="91440" bIns="45720" numCol="1" spcCol="0" rtlCol="0" fromWordArt="0" anchor="t" anchorCtr="0" forceAA="0" compatLnSpc="1">
-            <a:prstTxWarp prst="textNoShape">
-              <a:avLst/>
-            </a:prstTxWarp>
-            <a:spAutoFit/>
-          </a:bodyPr>
-          <a:lstStyle/>
-          <a:p>
-            <a:pPr algn="ctr"/>
-            <a:r>
-              <a:rPr lang="en-US" sz="4400" dirty="0">
-                <a:latin typeface="Poppins Black"/>
-                <a:cs typeface="Segoe UI"/>
-              </a:rPr>
-              <a:t>Thanks!​</a:t>
-            </a:r>
-          </a:p>
-          <a:p>
-            <a:pPr algn="ctr"/>
-            <a:endParaRPr lang="en-US" sz="4400" dirty="0">
-              <a:latin typeface="Poppins Black"/>
-              <a:cs typeface="Segoe UI"/>
-            </a:endParaRPr>
-          </a:p>
-          <a:p>
-            <a:pPr algn="ctr"/>
-            <a:endParaRPr lang="en-US" sz="4400" dirty="0">
-              <a:latin typeface="Poppins Black"/>
-              <a:cs typeface="Segoe UI"/>
-            </a:endParaRPr>
-          </a:p>
-          <a:p>
-            <a:pPr algn="ctr"/>
-            <a:r>
-              <a:rPr lang="en-US" dirty="0">
-                <a:latin typeface="Poppins Black"/>
-                <a:cs typeface="Segoe UI"/>
-              </a:rPr>
-              <a:t>​</a:t>
-            </a:r>
-          </a:p>
-          <a:p>
-            <a:pPr algn="ctr"/>
-            <a:r>
-              <a:rPr lang="en-US" dirty="0">
-                <a:latin typeface="Poppins Black"/>
-                <a:cs typeface="Segoe UI"/>
-              </a:rPr>
-              <a:t>​</a:t>
-            </a:r>
-          </a:p>
-          <a:p>
-            <a:pPr algn="ctr"/>
-            <a:r>
-              <a:rPr lang="en-US" sz="4400" dirty="0">
-                <a:latin typeface="Poppins Black"/>
-                <a:cs typeface="Segoe UI"/>
-              </a:rPr>
-              <a:t>Any Questions?​</a:t>
-            </a:r>
-          </a:p>
-        </p:txBody>
-      </p:sp>
-    </p:spTree>
-    <p:extLst>
-      <p:ext uri="{BB962C8B-B14F-4D97-AF65-F5344CB8AC3E}">
-        <p14:creationId xmlns:p14="http://schemas.microsoft.com/office/powerpoint/2010/main" val="1093858790"/>
       </p:ext>
     </p:extLst>
   </p:cSld>
@@ -8770,6 +8619,152 @@
 </p:sld>
 </file>
 
+<file path=ppt/slides/slide20.xml><?xml version="1.0" encoding="utf-8"?>
+<p:sld xmlns:a="http://schemas.openxmlformats.org/drawingml/2006/main" xmlns:r="http://schemas.openxmlformats.org/officeDocument/2006/relationships" xmlns:p="http://schemas.openxmlformats.org/presentationml/2006/main">
+  <p:cSld>
+    <p:spTree>
+      <p:nvGrpSpPr>
+        <p:cNvPr id="1" name=""/>
+        <p:cNvGrpSpPr/>
+        <p:nvPr/>
+      </p:nvGrpSpPr>
+      <p:grpSpPr>
+        <a:xfrm>
+          <a:off x="0" y="0"/>
+          <a:ext cx="0" cy="0"/>
+          <a:chOff x="0" y="0"/>
+          <a:chExt cx="0" cy="0"/>
+        </a:xfrm>
+      </p:grpSpPr>
+      <p:pic>
+        <p:nvPicPr>
+          <p:cNvPr id="4" name="Picture 3"/>
+          <p:cNvPicPr>
+            <a:picLocks noChangeAspect="1"/>
+          </p:cNvPicPr>
+          <p:nvPr/>
+        </p:nvPicPr>
+        <p:blipFill>
+          <a:blip r:embed="rId2">
+            <a:extLst>
+              <a:ext uri="{28A0092B-C50C-407E-A947-70E740481C1C}">
+                <a14:useLocalDpi xmlns:a14="http://schemas.microsoft.com/office/drawing/2010/main" val="0"/>
+              </a:ext>
+            </a:extLst>
+          </a:blip>
+          <a:stretch>
+            <a:fillRect/>
+          </a:stretch>
+        </p:blipFill>
+        <p:spPr>
+          <a:xfrm>
+            <a:off x="5113020" y="5715000"/>
+            <a:ext cx="7078980" cy="1143000"/>
+          </a:xfrm>
+          <a:prstGeom prst="rect">
+            <a:avLst/>
+          </a:prstGeom>
+        </p:spPr>
+      </p:pic>
+      <p:sp>
+        <p:nvSpPr>
+          <p:cNvPr id="9" name="TextBox 8">
+            <a:extLst>
+              <a:ext uri="{FF2B5EF4-FFF2-40B4-BE49-F238E27FC236}">
+                <a16:creationId xmlns:a16="http://schemas.microsoft.com/office/drawing/2014/main" id="{7ABD19AF-ACF2-B3CA-8941-F6C2DF448584}"/>
+              </a:ext>
+            </a:extLst>
+          </p:cNvPr>
+          <p:cNvSpPr txBox="1"/>
+          <p:nvPr/>
+        </p:nvSpPr>
+        <p:spPr>
+          <a:xfrm>
+            <a:off x="1011382" y="471055"/>
+            <a:ext cx="10737272" cy="3354765"/>
+          </a:xfrm>
+          <a:prstGeom prst="rect">
+            <a:avLst/>
+          </a:prstGeom>
+          <a:noFill/>
+        </p:spPr>
+        <p:txBody>
+          <a:bodyPr rot="0" spcFirstLastPara="0" vertOverflow="overflow" horzOverflow="overflow" vert="horz" wrap="square" lIns="91440" tIns="45720" rIns="91440" bIns="45720" numCol="1" spcCol="0" rtlCol="0" fromWordArt="0" anchor="t" anchorCtr="0" forceAA="0" compatLnSpc="1">
+            <a:prstTxWarp prst="textNoShape">
+              <a:avLst/>
+            </a:prstTxWarp>
+            <a:spAutoFit/>
+          </a:bodyPr>
+          <a:lstStyle/>
+          <a:p>
+            <a:pPr algn="ctr"/>
+            <a:r>
+              <a:rPr lang="en-US" sz="4400" dirty="0">
+                <a:latin typeface="Poppins Black"/>
+                <a:cs typeface="Segoe UI"/>
+              </a:rPr>
+              <a:t>Thanks!​</a:t>
+            </a:r>
+          </a:p>
+          <a:p>
+            <a:pPr algn="ctr"/>
+            <a:endParaRPr lang="en-US" sz="4400" dirty="0">
+              <a:latin typeface="Poppins Black"/>
+              <a:cs typeface="Segoe UI"/>
+            </a:endParaRPr>
+          </a:p>
+          <a:p>
+            <a:pPr algn="ctr"/>
+            <a:endParaRPr lang="en-US" sz="4400" dirty="0">
+              <a:latin typeface="Poppins Black"/>
+              <a:cs typeface="Segoe UI"/>
+            </a:endParaRPr>
+          </a:p>
+          <a:p>
+            <a:pPr algn="ctr"/>
+            <a:r>
+              <a:rPr lang="en-US" dirty="0">
+                <a:latin typeface="Poppins Black"/>
+                <a:cs typeface="Segoe UI"/>
+              </a:rPr>
+              <a:t>​</a:t>
+            </a:r>
+          </a:p>
+          <a:p>
+            <a:pPr algn="ctr"/>
+            <a:r>
+              <a:rPr lang="en-US" dirty="0">
+                <a:latin typeface="Poppins Black"/>
+                <a:cs typeface="Segoe UI"/>
+              </a:rPr>
+              <a:t>​</a:t>
+            </a:r>
+          </a:p>
+          <a:p>
+            <a:pPr algn="ctr"/>
+            <a:r>
+              <a:rPr lang="en-US" sz="4400" dirty="0">
+                <a:latin typeface="Poppins Black"/>
+                <a:cs typeface="Segoe UI"/>
+              </a:rPr>
+              <a:t>Any Questions?​</a:t>
+            </a:r>
+          </a:p>
+        </p:txBody>
+      </p:sp>
+    </p:spTree>
+    <p:extLst>
+      <p:ext uri="{BB962C8B-B14F-4D97-AF65-F5344CB8AC3E}">
+        <p14:creationId xmlns:p14="http://schemas.microsoft.com/office/powerpoint/2010/main" val="1093858790"/>
+      </p:ext>
+    </p:extLst>
+  </p:cSld>
+  <p:clrMapOvr>
+    <a:masterClrMapping/>
+  </p:clrMapOvr>
+</p:sld>
+</file>
+
 <file path=ppt/slides/slide3.xml><?xml version="1.0" encoding="utf-8"?>
 <p:sld xmlns:a="http://schemas.openxmlformats.org/drawingml/2006/main" xmlns:r="http://schemas.openxmlformats.org/officeDocument/2006/relationships" xmlns:p="http://schemas.openxmlformats.org/presentationml/2006/main">
   <p:cSld>
@@ -8817,40 +8812,145 @@
           </a:prstGeom>
         </p:spPr>
       </p:pic>
-      <p:pic>
-        <p:nvPicPr>
-          <p:cNvPr id="9" name="Picture 9" descr="Diagram&#10;&#10;Description automatically generated">
+      <p:sp>
+        <p:nvSpPr>
+          <p:cNvPr id="5" name="Title 4"/>
+          <p:cNvSpPr>
+            <a:spLocks noGrp="1"/>
+          </p:cNvSpPr>
+          <p:nvPr>
+            <p:ph type="title"/>
+          </p:nvPr>
+        </p:nvSpPr>
+        <p:spPr>
+          <a:xfrm>
+            <a:off x="838200" y="142876"/>
+            <a:ext cx="10515600" cy="781050"/>
+          </a:xfrm>
+        </p:spPr>
+        <p:txBody>
+          <a:bodyPr>
+            <a:normAutofit/>
+          </a:bodyPr>
+          <a:lstStyle/>
+          <a:p>
+            <a:pPr algn="ctr"/>
+            <a:r>
+              <a:rPr lang="en-US" b="0" i="0" dirty="0">
+                <a:solidFill>
+                  <a:srgbClr val="000000"/>
+                </a:solidFill>
+                <a:effectLst/>
+                <a:latin typeface="Poppins" panose="00000500000000000000" pitchFamily="2" charset="0"/>
+              </a:rPr>
+              <a:t>Agenda</a:t>
+            </a:r>
+            <a:endParaRPr lang="en-US" dirty="0">
+              <a:ea typeface="+mj-lt"/>
+              <a:cs typeface="+mj-lt"/>
+            </a:endParaRPr>
+          </a:p>
+        </p:txBody>
+      </p:sp>
+      <p:sp>
+        <p:nvSpPr>
+          <p:cNvPr id="18" name="Content Placeholder 1">
             <a:extLst>
               <a:ext uri="{FF2B5EF4-FFF2-40B4-BE49-F238E27FC236}">
-                <a16:creationId xmlns:a16="http://schemas.microsoft.com/office/drawing/2014/main" id="{333D7221-AD4D-4742-43AE-3E1B604279F4}"/>
+                <a16:creationId xmlns:a16="http://schemas.microsoft.com/office/drawing/2014/main" id="{EFAAF181-7326-7F1B-D1DD-1D9AA2BC303E}"/>
               </a:ext>
             </a:extLst>
           </p:cNvPr>
-          <p:cNvPicPr>
-            <a:picLocks noChangeAspect="1"/>
-          </p:cNvPicPr>
-          <p:nvPr/>
-        </p:nvPicPr>
-        <p:blipFill>
-          <a:blip r:embed="rId3"/>
-          <a:stretch>
-            <a:fillRect/>
-          </a:stretch>
-        </p:blipFill>
+          <p:cNvSpPr>
+            <a:spLocks noGrp="1"/>
+          </p:cNvSpPr>
+          <p:nvPr>
+            <p:ph idx="1"/>
+          </p:nvPr>
+        </p:nvSpPr>
         <p:spPr>
           <a:xfrm>
-            <a:off x="1059873" y="633899"/>
-            <a:ext cx="9996054" cy="4904403"/>
+            <a:off x="837334" y="965634"/>
+            <a:ext cx="10640291" cy="4389004"/>
           </a:xfrm>
-          <a:prstGeom prst="rect">
-            <a:avLst/>
-          </a:prstGeom>
         </p:spPr>
-      </p:pic>
+        <p:txBody>
+          <a:bodyPr vert="horz" lIns="91440" tIns="45720" rIns="91440" bIns="45720" rtlCol="0" anchor="t">
+            <a:normAutofit/>
+          </a:bodyPr>
+          <a:lstStyle/>
+          <a:p>
+            <a:pPr marL="0" indent="0">
+              <a:buNone/>
+            </a:pPr>
+            <a:r>
+              <a:rPr lang="en-US" dirty="0">
+                <a:cs typeface="Calibri" panose="020F0502020204030204"/>
+              </a:rPr>
+              <a:t>Some History:</a:t>
+            </a:r>
+          </a:p>
+          <a:p>
+            <a:r>
+              <a:rPr lang="en-US" dirty="0">
+                <a:ea typeface="+mn-lt"/>
+                <a:cs typeface="+mn-lt"/>
+              </a:rPr>
+              <a:t>The cookie era</a:t>
+            </a:r>
+          </a:p>
+          <a:p>
+            <a:r>
+              <a:rPr lang="en-US" dirty="0">
+                <a:ea typeface="+mn-lt"/>
+                <a:cs typeface="+mn-lt"/>
+              </a:rPr>
+              <a:t>The token era</a:t>
+            </a:r>
+          </a:p>
+          <a:p>
+            <a:r>
+              <a:rPr lang="en" dirty="0">
+                <a:ea typeface="+mn-lt"/>
+                <a:cs typeface="+mn-lt"/>
+              </a:rPr>
+              <a:t>Problems</a:t>
+            </a:r>
+          </a:p>
+          <a:p>
+            <a:pPr marL="0" indent="0">
+              <a:buNone/>
+            </a:pPr>
+            <a:endParaRPr lang="en" dirty="0">
+              <a:cs typeface="Calibri"/>
+            </a:endParaRPr>
+          </a:p>
+          <a:p>
+            <a:pPr marL="0" indent="0">
+              <a:buNone/>
+            </a:pPr>
+            <a:r>
+              <a:rPr lang="en" dirty="0">
+                <a:cs typeface="Calibri"/>
+              </a:rPr>
+              <a:t>Getting the best of both worlds:</a:t>
+            </a:r>
+            <a:endParaRPr lang="en" dirty="0"/>
+          </a:p>
+          <a:p>
+            <a:r>
+              <a:rPr lang="en-US" dirty="0">
+                <a:cs typeface="Calibri"/>
+              </a:rPr>
+              <a:t>Backend for Frontend Pattern</a:t>
+            </a:r>
+          </a:p>
+        </p:txBody>
+      </p:sp>
     </p:spTree>
     <p:extLst>
       <p:ext uri="{BB962C8B-B14F-4D97-AF65-F5344CB8AC3E}">
-        <p14:creationId xmlns:p14="http://schemas.microsoft.com/office/powerpoint/2010/main" val="4183059362"/>
+        <p14:creationId xmlns:p14="http://schemas.microsoft.com/office/powerpoint/2010/main" val="702166988"/>
       </p:ext>
     </p:extLst>
   </p:cSld>
@@ -8932,15 +9032,14 @@
             <a:pPr algn="ctr"/>
             <a:r>
               <a:rPr lang="en" dirty="0">
+                <a:solidFill>
+                  <a:schemeClr val="dk1"/>
+                </a:solidFill>
                 <a:ea typeface="+mj-lt"/>
                 <a:cs typeface="+mj-lt"/>
               </a:rPr>
-              <a:t>The BFF Pattern</a:t>
-            </a:r>
-            <a:endParaRPr lang="en-US" dirty="0">
-              <a:ea typeface="+mj-lt"/>
-              <a:cs typeface="+mj-lt"/>
-            </a:endParaRPr>
+              <a:t>Security issues in Web Apps - The cookie era</a:t>
+            </a:r>
           </a:p>
         </p:txBody>
       </p:sp>
@@ -8962,36 +9061,50 @@
         </p:nvSpPr>
         <p:spPr>
           <a:xfrm>
-            <a:off x="837334" y="965634"/>
-            <a:ext cx="10640291" cy="4389004"/>
+            <a:off x="837334" y="1104179"/>
+            <a:ext cx="10640291" cy="4250459"/>
           </a:xfrm>
         </p:spPr>
         <p:txBody>
           <a:bodyPr vert="horz" lIns="91440" tIns="45720" rIns="91440" bIns="45720" rtlCol="0" anchor="t">
-            <a:normAutofit lnSpcReduction="10000"/>
+            <a:normAutofit/>
           </a:bodyPr>
           <a:lstStyle/>
           <a:p>
-            <a:pPr marL="0" indent="0">
+            <a:r>
+              <a:rPr lang="en-US" dirty="0">
+                <a:cs typeface="Calibri"/>
+              </a:rPr>
+              <a:t>Most applications started as "classic web apps"</a:t>
+            </a:r>
+            <a:endParaRPr lang="en-US" dirty="0"/>
+          </a:p>
+          <a:p>
+            <a:pPr lvl="1" indent="-317500"/>
+            <a:r>
+              <a:rPr lang="en" dirty="0">
+                <a:ea typeface="+mn-lt"/>
+                <a:cs typeface="+mn-lt"/>
+              </a:rPr>
+              <a:t>"spiced up" with JavaScript over time</a:t>
+            </a:r>
+            <a:endParaRPr lang="en-US" dirty="0">
+              <a:cs typeface="Calibri" panose="020F0502020204030204"/>
+            </a:endParaRPr>
+          </a:p>
+          <a:p>
+            <a:pPr marL="596900" lvl="1" indent="0">
+              <a:lnSpc>
+                <a:spcPct val="100000"/>
+              </a:lnSpc>
+              <a:spcBef>
+                <a:spcPts val="0"/>
+              </a:spcBef>
               <a:buNone/>
             </a:pPr>
-            <a:r>
-              <a:rPr lang="en-US" dirty="0">
-                <a:cs typeface="Calibri" panose="020F0502020204030204"/>
-              </a:rPr>
-              <a:t>Pros</a:t>
-            </a:r>
-          </a:p>
-          <a:p>
-            <a:r>
-              <a:rPr lang="en" b="1" dirty="0">
-                <a:ea typeface="+mn-lt"/>
-                <a:cs typeface="+mn-lt"/>
-              </a:rPr>
-              <a:t>Better security</a:t>
-            </a:r>
-            <a:endParaRPr lang="en-US" dirty="0">
-              <a:cs typeface="Calibri"/>
+            <a:endParaRPr lang="en" dirty="0">
+              <a:ea typeface="+mn-lt"/>
+              <a:cs typeface="+mn-lt"/>
             </a:endParaRPr>
           </a:p>
           <a:p>
@@ -9000,80 +9113,48 @@
                 <a:ea typeface="+mn-lt"/>
                 <a:cs typeface="+mn-lt"/>
               </a:rPr>
-              <a:t>Separation of Concerns</a:t>
-            </a:r>
-          </a:p>
-          <a:p>
+              <a:t>Cookies have been used in the first place for authentication sessions</a:t>
+            </a:r>
+          </a:p>
+          <a:p>
+            <a:pPr lvl="1" indent="-317500"/>
             <a:r>
               <a:rPr lang="en" dirty="0">
                 <a:ea typeface="+mn-lt"/>
                 <a:cs typeface="+mn-lt"/>
               </a:rPr>
-              <a:t>Easier to maintain and modify APIs</a:t>
-            </a:r>
-            <a:endParaRPr lang="en-US" dirty="0">
+              <a:t>"just worked" for doing Ajax calls as well</a:t>
+            </a:r>
+            <a:endParaRPr lang="en" dirty="0"/>
+          </a:p>
+          <a:p>
+            <a:pPr marL="914400" lvl="1" indent="-317500">
+              <a:lnSpc>
+                <a:spcPct val="100000"/>
+              </a:lnSpc>
+              <a:spcBef>
+                <a:spcPts val="0"/>
+              </a:spcBef>
+              <a:buFont typeface="Arial,Sans-Serif" panose="020B0604020202020204" pitchFamily="34" charset="0"/>
+              <a:buChar char="○"/>
+            </a:pPr>
+            <a:endParaRPr lang="en" dirty="0">
               <a:ea typeface="+mn-lt"/>
               <a:cs typeface="+mn-lt"/>
             </a:endParaRPr>
           </a:p>
           <a:p>
-            <a:r>
-              <a:rPr lang="en" dirty="0">
+            <a:pPr>
+              <a:buFont typeface="Arial"/>
+              <a:buChar char="•"/>
+            </a:pPr>
+            <a:r>
+              <a:rPr lang="en-US" dirty="0">
                 <a:ea typeface="+mn-lt"/>
                 <a:cs typeface="+mn-lt"/>
               </a:rPr>
-              <a:t>Better error handling in the frontend</a:t>
-            </a:r>
-          </a:p>
-          <a:p>
-            <a:pPr marL="0" indent="0">
-              <a:buNone/>
-            </a:pPr>
-            <a:endParaRPr lang="en" dirty="0">
-              <a:cs typeface="Calibri"/>
-            </a:endParaRPr>
-          </a:p>
-          <a:p>
-            <a:pPr marL="0" indent="0">
-              <a:buNone/>
-            </a:pPr>
-            <a:r>
-              <a:rPr lang="en" dirty="0">
-                <a:cs typeface="Calibri"/>
-              </a:rPr>
-              <a:t>Cons</a:t>
-            </a:r>
-            <a:endParaRPr lang="en" dirty="0"/>
-          </a:p>
-          <a:p>
-            <a:r>
-              <a:rPr lang="en" dirty="0">
-                <a:cs typeface="Calibri"/>
-              </a:rPr>
-              <a:t>Duplication and Lower Reuse</a:t>
-            </a:r>
-            <a:endParaRPr lang="en-US" dirty="0">
-              <a:cs typeface="Calibri"/>
-            </a:endParaRPr>
-          </a:p>
-          <a:p>
-            <a:r>
-              <a:rPr lang="en" dirty="0">
-                <a:cs typeface="Calibri"/>
-              </a:rPr>
-              <a:t>Yet</a:t>
-            </a:r>
-            <a:r>
-              <a:rPr lang="en" dirty="0">
-                <a:ea typeface="+mn-lt"/>
-                <a:cs typeface="+mn-lt"/>
-              </a:rPr>
-              <a:t> another service to monitor and maintain</a:t>
-            </a:r>
-            <a:endParaRPr lang="en-US" dirty="0">
-              <a:ea typeface="+mn-lt"/>
-              <a:cs typeface="+mn-lt"/>
-            </a:endParaRPr>
+              <a:t>Cross Site Request Forgery (CSRF) was discovered</a:t>
+            </a:r>
           </a:p>
           <a:p>
             <a:endParaRPr lang="en" dirty="0">
@@ -9085,7 +9166,7 @@
     </p:spTree>
     <p:extLst>
       <p:ext uri="{BB962C8B-B14F-4D97-AF65-F5344CB8AC3E}">
-        <p14:creationId xmlns:p14="http://schemas.microsoft.com/office/powerpoint/2010/main" val="1432592030"/>
+        <p14:creationId xmlns:p14="http://schemas.microsoft.com/office/powerpoint/2010/main" val="666087577"/>
       </p:ext>
     </p:extLst>
   </p:cSld>
@@ -9173,135 +9254,49 @@
                 <a:ea typeface="+mj-lt"/>
                 <a:cs typeface="+mj-lt"/>
               </a:rPr>
-              <a:t>Security issues in Web Apps - The cookie era</a:t>
-            </a:r>
+              <a:t>Threat: cross-site request forgery (CSRF)</a:t>
+            </a:r>
+            <a:endParaRPr lang="en" dirty="0">
+              <a:ea typeface="+mj-lt"/>
+              <a:cs typeface="+mj-lt"/>
+            </a:endParaRPr>
           </a:p>
         </p:txBody>
       </p:sp>
-      <p:sp>
-        <p:nvSpPr>
-          <p:cNvPr id="18" name="Content Placeholder 1">
+      <p:pic>
+        <p:nvPicPr>
+          <p:cNvPr id="6" name="Picture 6" descr="Diagram&#10;&#10;Description automatically generated">
             <a:extLst>
               <a:ext uri="{FF2B5EF4-FFF2-40B4-BE49-F238E27FC236}">
-                <a16:creationId xmlns:a16="http://schemas.microsoft.com/office/drawing/2014/main" id="{EFAAF181-7326-7F1B-D1DD-1D9AA2BC303E}"/>
+                <a16:creationId xmlns:a16="http://schemas.microsoft.com/office/drawing/2014/main" id="{72D75E03-7019-FB81-8DAC-A694EB7ED796}"/>
               </a:ext>
             </a:extLst>
           </p:cNvPr>
-          <p:cNvSpPr>
-            <a:spLocks noGrp="1"/>
-          </p:cNvSpPr>
-          <p:nvPr>
-            <p:ph idx="1"/>
-          </p:nvPr>
-        </p:nvSpPr>
+          <p:cNvPicPr>
+            <a:picLocks noChangeAspect="1"/>
+          </p:cNvPicPr>
+          <p:nvPr/>
+        </p:nvPicPr>
+        <p:blipFill>
+          <a:blip r:embed="rId3"/>
+          <a:stretch>
+            <a:fillRect/>
+          </a:stretch>
+        </p:blipFill>
         <p:spPr>
           <a:xfrm>
-            <a:off x="837334" y="1104179"/>
-            <a:ext cx="10640291" cy="4250459"/>
+            <a:off x="1835727" y="1057025"/>
+            <a:ext cx="8520545" cy="4743950"/>
           </a:xfrm>
+          <a:prstGeom prst="rect">
+            <a:avLst/>
+          </a:prstGeom>
         </p:spPr>
-        <p:txBody>
-          <a:bodyPr vert="horz" lIns="91440" tIns="45720" rIns="91440" bIns="45720" rtlCol="0" anchor="t">
-            <a:normAutofit/>
-          </a:bodyPr>
-          <a:lstStyle/>
-          <a:p>
-            <a:r>
-              <a:rPr lang="en-US" dirty="0">
-                <a:cs typeface="Calibri"/>
-              </a:rPr>
-              <a:t>Most applications started as "classic web apps"</a:t>
-            </a:r>
-            <a:endParaRPr lang="en-US" dirty="0"/>
-          </a:p>
-          <a:p>
-            <a:pPr lvl="1" indent="-317500"/>
-            <a:r>
-              <a:rPr lang="en" dirty="0">
-                <a:ea typeface="+mn-lt"/>
-                <a:cs typeface="+mn-lt"/>
-              </a:rPr>
-              <a:t>"spiced up" with JavaScript over time</a:t>
-            </a:r>
-            <a:endParaRPr lang="en-US" dirty="0">
-              <a:cs typeface="Calibri" panose="020F0502020204030204"/>
-            </a:endParaRPr>
-          </a:p>
-          <a:p>
-            <a:pPr marL="596900" lvl="1" indent="0">
-              <a:lnSpc>
-                <a:spcPct val="100000"/>
-              </a:lnSpc>
-              <a:spcBef>
-                <a:spcPts val="0"/>
-              </a:spcBef>
-              <a:buNone/>
-            </a:pPr>
-            <a:endParaRPr lang="en" dirty="0">
-              <a:ea typeface="+mn-lt"/>
-              <a:cs typeface="+mn-lt"/>
-            </a:endParaRPr>
-          </a:p>
-          <a:p>
-            <a:r>
-              <a:rPr lang="en-US" dirty="0">
-                <a:ea typeface="+mn-lt"/>
-                <a:cs typeface="+mn-lt"/>
-              </a:rPr>
-              <a:t>Cookies have been used in the first place for authentication sessions</a:t>
-            </a:r>
-          </a:p>
-          <a:p>
-            <a:pPr lvl="1" indent="-317500"/>
-            <a:r>
-              <a:rPr lang="en" dirty="0">
-                <a:ea typeface="+mn-lt"/>
-                <a:cs typeface="+mn-lt"/>
-              </a:rPr>
-              <a:t>"just worked" for doing Ajax calls as well</a:t>
-            </a:r>
-            <a:endParaRPr lang="en" dirty="0"/>
-          </a:p>
-          <a:p>
-            <a:pPr marL="914400" lvl="1" indent="-317500">
-              <a:lnSpc>
-                <a:spcPct val="100000"/>
-              </a:lnSpc>
-              <a:spcBef>
-                <a:spcPts val="0"/>
-              </a:spcBef>
-              <a:buFont typeface="Arial,Sans-Serif" panose="020B0604020202020204" pitchFamily="34" charset="0"/>
-              <a:buChar char="○"/>
-            </a:pPr>
-            <a:endParaRPr lang="en" dirty="0">
-              <a:ea typeface="+mn-lt"/>
-              <a:cs typeface="+mn-lt"/>
-            </a:endParaRPr>
-          </a:p>
-          <a:p>
-            <a:pPr>
-              <a:buFont typeface="Arial"/>
-              <a:buChar char="•"/>
-            </a:pPr>
-            <a:r>
-              <a:rPr lang="en-US" dirty="0">
-                <a:ea typeface="+mn-lt"/>
-                <a:cs typeface="+mn-lt"/>
-              </a:rPr>
-              <a:t>Cross Site Request Forgery (CSRF) was discovered</a:t>
-            </a:r>
-          </a:p>
-          <a:p>
-            <a:endParaRPr lang="en" dirty="0">
-              <a:cs typeface="Calibri"/>
-            </a:endParaRPr>
-          </a:p>
-        </p:txBody>
-      </p:sp>
+      </p:pic>
     </p:spTree>
     <p:extLst>
       <p:ext uri="{BB962C8B-B14F-4D97-AF65-F5344CB8AC3E}">
-        <p14:creationId xmlns:p14="http://schemas.microsoft.com/office/powerpoint/2010/main" val="666087577"/>
+        <p14:creationId xmlns:p14="http://schemas.microsoft.com/office/powerpoint/2010/main" val="167938182"/>
       </p:ext>
     </p:extLst>
   </p:cSld>
@@ -9389,21 +9384,65 @@
                 <a:ea typeface="+mj-lt"/>
                 <a:cs typeface="+mj-lt"/>
               </a:rPr>
-              <a:t>Threat: cross-site request forgery (CSRF)</a:t>
-            </a:r>
+              <a:t>CSRF mitigation with anti-forgery tokens</a:t>
+            </a:r>
+            <a:endParaRPr lang="en-US" dirty="0">
+              <a:solidFill>
+                <a:schemeClr val="dk1"/>
+              </a:solidFill>
+            </a:endParaRPr>
+          </a:p>
+        </p:txBody>
+      </p:sp>
+      <p:sp>
+        <p:nvSpPr>
+          <p:cNvPr id="18" name="Content Placeholder 1">
+            <a:extLst>
+              <a:ext uri="{FF2B5EF4-FFF2-40B4-BE49-F238E27FC236}">
+                <a16:creationId xmlns:a16="http://schemas.microsoft.com/office/drawing/2014/main" id="{EFAAF181-7326-7F1B-D1DD-1D9AA2BC303E}"/>
+              </a:ext>
+            </a:extLst>
+          </p:cNvPr>
+          <p:cNvSpPr>
+            <a:spLocks noGrp="1"/>
+          </p:cNvSpPr>
+          <p:nvPr>
+            <p:ph idx="1"/>
+          </p:nvPr>
+        </p:nvSpPr>
+        <p:spPr>
+          <a:xfrm>
+            <a:off x="837334" y="1104179"/>
+            <a:ext cx="10640291" cy="599787"/>
+          </a:xfrm>
+        </p:spPr>
+        <p:txBody>
+          <a:bodyPr vert="horz" lIns="91440" tIns="45720" rIns="91440" bIns="45720" rtlCol="0" anchor="t">
+            <a:normAutofit/>
+          </a:bodyPr>
+          <a:lstStyle/>
+          <a:p>
+            <a:r>
+              <a:rPr lang="en-US" dirty="0">
+                <a:ea typeface="+mn-lt"/>
+                <a:cs typeface="+mn-lt"/>
+              </a:rPr>
+              <a:t>Add explicit “credential” on every request</a:t>
+            </a:r>
+          </a:p>
+          <a:p>
             <a:endParaRPr lang="en" dirty="0">
-              <a:ea typeface="+mj-lt"/>
-              <a:cs typeface="+mj-lt"/>
+              <a:cs typeface="Calibri"/>
             </a:endParaRPr>
           </a:p>
         </p:txBody>
       </p:sp>
       <p:pic>
         <p:nvPicPr>
-          <p:cNvPr id="6" name="Picture 6" descr="Diagram&#10;&#10;Description automatically generated">
+          <p:cNvPr id="2" name="Picture 2">
             <a:extLst>
               <a:ext uri="{FF2B5EF4-FFF2-40B4-BE49-F238E27FC236}">
-                <a16:creationId xmlns:a16="http://schemas.microsoft.com/office/drawing/2014/main" id="{72D75E03-7019-FB81-8DAC-A694EB7ED796}"/>
+                <a16:creationId xmlns:a16="http://schemas.microsoft.com/office/drawing/2014/main" id="{F8B7F15C-AA74-134F-BDD4-B16E42EFD3DA}"/>
               </a:ext>
             </a:extLst>
           </p:cNvPr>
@@ -9420,8 +9459,8 @@
         </p:blipFill>
         <p:spPr>
           <a:xfrm>
-            <a:off x="1835727" y="1057025"/>
-            <a:ext cx="8520545" cy="4743950"/>
+            <a:off x="2098964" y="1705312"/>
+            <a:ext cx="8118763" cy="4091612"/>
           </a:xfrm>
           <a:prstGeom prst="rect">
             <a:avLst/>
@@ -9431,7 +9470,7 @@
     </p:spTree>
     <p:extLst>
       <p:ext uri="{BB962C8B-B14F-4D97-AF65-F5344CB8AC3E}">
-        <p14:creationId xmlns:p14="http://schemas.microsoft.com/office/powerpoint/2010/main" val="167938182"/>
+        <p14:creationId xmlns:p14="http://schemas.microsoft.com/office/powerpoint/2010/main" val="2381598451"/>
       </p:ext>
     </p:extLst>
   </p:cSld>
@@ -9519,13 +9558,9 @@
                 <a:ea typeface="+mj-lt"/>
                 <a:cs typeface="+mj-lt"/>
               </a:rPr>
-              <a:t>CSRF mitigation with anti-forgery tokens</a:t>
-            </a:r>
-            <a:endParaRPr lang="en-US" dirty="0">
-              <a:solidFill>
-                <a:schemeClr val="dk1"/>
-              </a:solidFill>
-            </a:endParaRPr>
+              <a:t>Security issues in Web Apps - The Token Era</a:t>
+            </a:r>
+            <a:endParaRPr lang="en-US" dirty="0"/>
           </a:p>
         </p:txBody>
       </p:sp>
@@ -9548,7 +9583,7 @@
         <p:spPr>
           <a:xfrm>
             <a:off x="837334" y="1104179"/>
-            <a:ext cx="10640291" cy="599787"/>
+            <a:ext cx="10640291" cy="4382077"/>
           </a:xfrm>
         </p:spPr>
         <p:txBody>
@@ -9557,55 +9592,233 @@
           </a:bodyPr>
           <a:lstStyle/>
           <a:p>
+            <a:pPr marL="457200" indent="-457200"/>
             <a:r>
               <a:rPr lang="en-US" dirty="0">
                 <a:ea typeface="+mn-lt"/>
                 <a:cs typeface="+mn-lt"/>
               </a:rPr>
-              <a:t>Add explicit “credential” on every request</a:t>
-            </a:r>
-          </a:p>
-          <a:p>
+              <a:t>With OAuth 2 the IETF tried to solve the cookie problem</a:t>
+            </a:r>
+            <a:endParaRPr lang="en-US" dirty="0">
+              <a:cs typeface="Calibri" panose="020F0502020204030204"/>
+            </a:endParaRPr>
+          </a:p>
+          <a:p>
+            <a:pPr marL="914400" lvl="1" indent="-317500">
+              <a:lnSpc>
+                <a:spcPct val="100000"/>
+              </a:lnSpc>
+              <a:spcBef>
+                <a:spcPts val="0"/>
+              </a:spcBef>
+              <a:buFont typeface="Arial,Sans-Serif" panose="020B0604020202020204" pitchFamily="34" charset="0"/>
+              <a:buChar char="○"/>
+            </a:pPr>
+            <a:r>
+              <a:rPr lang="en" dirty="0">
+                <a:ea typeface="+mn-lt"/>
+                <a:cs typeface="+mn-lt"/>
+              </a:rPr>
+              <a:t>encourage the use of token-based API calls in the browser</a:t>
+            </a:r>
+            <a:endParaRPr lang="en-US" dirty="0">
+              <a:ea typeface="+mn-lt"/>
+              <a:cs typeface="+mn-lt"/>
+            </a:endParaRPr>
+          </a:p>
+          <a:p>
+            <a:pPr marL="914400" lvl="1" indent="-317500">
+              <a:lnSpc>
+                <a:spcPct val="100000"/>
+              </a:lnSpc>
+              <a:spcBef>
+                <a:spcPts val="0"/>
+              </a:spcBef>
+              <a:buFont typeface="Arial,Sans-Serif" panose="020B0604020202020204" pitchFamily="34" charset="0"/>
+              <a:buChar char="○"/>
+            </a:pPr>
+            <a:r>
+              <a:rPr lang="en" dirty="0">
+                <a:ea typeface="+mn-lt"/>
+                <a:cs typeface="+mn-lt"/>
+              </a:rPr>
+              <a:t>explicitly send tokens as opposed to automatic cookie transmission</a:t>
+            </a:r>
+            <a:endParaRPr lang="en-US" dirty="0">
+              <a:ea typeface="+mn-lt"/>
+              <a:cs typeface="+mn-lt"/>
+            </a:endParaRPr>
+          </a:p>
+          <a:p>
+            <a:pPr marL="914400" lvl="1" indent="-317500">
+              <a:lnSpc>
+                <a:spcPct val="100000"/>
+              </a:lnSpc>
+              <a:spcBef>
+                <a:spcPts val="0"/>
+              </a:spcBef>
+              <a:buFont typeface="Arial,Sans-Serif" panose="020B0604020202020204" pitchFamily="34" charset="0"/>
+              <a:buChar char="○"/>
+            </a:pPr>
+            <a:r>
+              <a:rPr lang="en" dirty="0">
+                <a:ea typeface="+mn-lt"/>
+                <a:cs typeface="+mn-lt"/>
+              </a:rPr>
+              <a:t>OAuth 2 implicit flow to overcome same-origin restrictions</a:t>
+            </a:r>
+            <a:endParaRPr lang="en-US">
+              <a:cs typeface="Calibri" panose="020F0502020204030204"/>
+            </a:endParaRPr>
+          </a:p>
+          <a:p>
+            <a:pPr marL="596900" lvl="1" indent="0">
+              <a:lnSpc>
+                <a:spcPct val="100000"/>
+              </a:lnSpc>
+              <a:spcBef>
+                <a:spcPts val="0"/>
+              </a:spcBef>
+              <a:buNone/>
+            </a:pPr>
             <a:endParaRPr lang="en" dirty="0">
               <a:cs typeface="Calibri"/>
             </a:endParaRPr>
           </a:p>
+          <a:p>
+            <a:pPr marL="482600" indent="-342900">
+              <a:lnSpc>
+                <a:spcPct val="100000"/>
+              </a:lnSpc>
+              <a:spcBef>
+                <a:spcPts val="0"/>
+              </a:spcBef>
+            </a:pPr>
+            <a:r>
+              <a:rPr lang="en" sz="2400" b="1" dirty="0">
+                <a:ea typeface="+mn-lt"/>
+                <a:cs typeface="+mn-lt"/>
+              </a:rPr>
+              <a:t>Lots of security compromises</a:t>
+            </a:r>
+            <a:endParaRPr lang="en-US" sz="2400" dirty="0">
+              <a:ea typeface="+mn-lt"/>
+              <a:cs typeface="+mn-lt"/>
+            </a:endParaRPr>
+          </a:p>
+          <a:p>
+            <a:pPr marL="914400" lvl="1" indent="-317500">
+              <a:lnSpc>
+                <a:spcPct val="100000"/>
+              </a:lnSpc>
+              <a:spcBef>
+                <a:spcPts val="0"/>
+              </a:spcBef>
+              <a:buFont typeface="Arial,Sans-Serif"/>
+              <a:buChar char="○"/>
+            </a:pPr>
+            <a:r>
+              <a:rPr lang="en" dirty="0">
+                <a:ea typeface="+mn-lt"/>
+                <a:cs typeface="+mn-lt"/>
+              </a:rPr>
+              <a:t>token transport over URLs</a:t>
+            </a:r>
+            <a:endParaRPr lang="en-US" dirty="0">
+              <a:ea typeface="+mn-lt"/>
+              <a:cs typeface="+mn-lt"/>
+            </a:endParaRPr>
+          </a:p>
+          <a:p>
+            <a:pPr marL="914400" lvl="1" indent="-317500">
+              <a:lnSpc>
+                <a:spcPct val="100000"/>
+              </a:lnSpc>
+              <a:spcBef>
+                <a:spcPts val="0"/>
+              </a:spcBef>
+              <a:buFont typeface="Arial,Sans-Serif"/>
+              <a:buChar char="○"/>
+            </a:pPr>
+            <a:r>
+              <a:rPr lang="en" dirty="0">
+                <a:ea typeface="+mn-lt"/>
+                <a:cs typeface="+mn-lt"/>
+              </a:rPr>
+              <a:t>token storage in the browser</a:t>
+            </a:r>
+            <a:endParaRPr lang="en-US" dirty="0">
+              <a:ea typeface="+mn-lt"/>
+              <a:cs typeface="+mn-lt"/>
+            </a:endParaRPr>
+          </a:p>
+          <a:p>
+            <a:pPr marL="914400" indent="0">
+              <a:lnSpc>
+                <a:spcPct val="100000"/>
+              </a:lnSpc>
+              <a:spcBef>
+                <a:spcPts val="0"/>
+              </a:spcBef>
+              <a:buNone/>
+            </a:pPr>
+            <a:endParaRPr lang="en-US" sz="2400" dirty="0">
+              <a:ea typeface="+mn-lt"/>
+              <a:cs typeface="+mn-lt"/>
+            </a:endParaRPr>
+          </a:p>
+          <a:p>
+            <a:pPr marL="482600" indent="-342900">
+              <a:lnSpc>
+                <a:spcPct val="100000"/>
+              </a:lnSpc>
+              <a:spcBef>
+                <a:spcPts val="0"/>
+              </a:spcBef>
+            </a:pPr>
+            <a:r>
+              <a:rPr lang="en" sz="2400" b="1" dirty="0">
+                <a:ea typeface="+mn-lt"/>
+                <a:cs typeface="+mn-lt"/>
+              </a:rPr>
+              <a:t>Threat: Cross Site Scripting</a:t>
+            </a:r>
+            <a:endParaRPr lang="en-US" sz="2400" dirty="0">
+              <a:ea typeface="+mn-lt"/>
+              <a:cs typeface="+mn-lt"/>
+            </a:endParaRPr>
+          </a:p>
+          <a:p>
+            <a:pPr marL="596900" lvl="1" indent="0">
+              <a:lnSpc>
+                <a:spcPct val="100000"/>
+              </a:lnSpc>
+              <a:spcBef>
+                <a:spcPts val="0"/>
+              </a:spcBef>
+              <a:buNone/>
+            </a:pPr>
+            <a:endParaRPr lang="en" dirty="0">
+              <a:cs typeface="Calibri"/>
+            </a:endParaRPr>
+          </a:p>
+          <a:p>
+            <a:endParaRPr lang="en-US" dirty="0">
+              <a:cs typeface="Calibri"/>
+            </a:endParaRPr>
+          </a:p>
+          <a:p>
+            <a:endParaRPr lang="en" dirty="0">
+              <a:cs typeface="Calibri"/>
+            </a:endParaRPr>
+          </a:p>
         </p:txBody>
       </p:sp>
-      <p:pic>
-        <p:nvPicPr>
-          <p:cNvPr id="2" name="Picture 2">
-            <a:extLst>
-              <a:ext uri="{FF2B5EF4-FFF2-40B4-BE49-F238E27FC236}">
-                <a16:creationId xmlns:a16="http://schemas.microsoft.com/office/drawing/2014/main" id="{F8B7F15C-AA74-134F-BDD4-B16E42EFD3DA}"/>
-              </a:ext>
-            </a:extLst>
-          </p:cNvPr>
-          <p:cNvPicPr>
-            <a:picLocks noChangeAspect="1"/>
-          </p:cNvPicPr>
-          <p:nvPr/>
-        </p:nvPicPr>
-        <p:blipFill>
-          <a:blip r:embed="rId3"/>
-          <a:stretch>
-            <a:fillRect/>
-          </a:stretch>
-        </p:blipFill>
-        <p:spPr>
-          <a:xfrm>
-            <a:off x="2098964" y="1705312"/>
-            <a:ext cx="8118763" cy="4091612"/>
-          </a:xfrm>
-          <a:prstGeom prst="rect">
-            <a:avLst/>
-          </a:prstGeom>
-        </p:spPr>
-      </p:pic>
     </p:spTree>
     <p:extLst>
       <p:ext uri="{BB962C8B-B14F-4D97-AF65-F5344CB8AC3E}">
-        <p14:creationId xmlns:p14="http://schemas.microsoft.com/office/powerpoint/2010/main" val="2381598451"/>
+        <p14:creationId xmlns:p14="http://schemas.microsoft.com/office/powerpoint/2010/main" val="1925372198"/>
       </p:ext>
     </p:extLst>
   </p:cSld>
@@ -9693,9 +9906,13 @@
                 <a:ea typeface="+mj-lt"/>
                 <a:cs typeface="+mj-lt"/>
               </a:rPr>
-              <a:t>Security issues in Web Apps - The Token Era</a:t>
-            </a:r>
-            <a:endParaRPr lang="en-US" dirty="0"/>
+              <a:t>Challenge: Token Transmission</a:t>
+            </a:r>
+            <a:endParaRPr lang="en-US" dirty="0">
+              <a:solidFill>
+                <a:schemeClr val="dk1"/>
+              </a:solidFill>
+            </a:endParaRPr>
           </a:p>
         </p:txBody>
       </p:sp>
@@ -9723,20 +9940,30 @@
         </p:spPr>
         <p:txBody>
           <a:bodyPr vert="horz" lIns="91440" tIns="45720" rIns="91440" bIns="45720" rtlCol="0" anchor="t">
-            <a:normAutofit/>
+            <a:normAutofit lnSpcReduction="10000"/>
           </a:bodyPr>
           <a:lstStyle/>
           <a:p>
-            <a:pPr marL="457200" indent="-457200"/>
-            <a:r>
-              <a:rPr lang="en-US" dirty="0">
+            <a:pPr marL="457200" indent="-317500">
+              <a:lnSpc>
+                <a:spcPct val="100000"/>
+              </a:lnSpc>
+              <a:spcBef>
+                <a:spcPts val="0"/>
+              </a:spcBef>
+              <a:buFont typeface="Arial,Sans-Serif" panose="020B0604020202020204" pitchFamily="34" charset="0"/>
+              <a:buChar char="●"/>
+            </a:pPr>
+            <a:r>
+              <a:rPr lang="en" b="1" dirty="0">
                 <a:ea typeface="+mn-lt"/>
                 <a:cs typeface="+mn-lt"/>
               </a:rPr>
-              <a:t>With OAuth 2 the IETF tried to solve the cookie problem</a:t>
+              <a:t>Token transmission over URL is leaky</a:t>
             </a:r>
             <a:endParaRPr lang="en-US" dirty="0">
-              <a:cs typeface="Calibri" panose="020F0502020204030204"/>
+              <a:ea typeface="+mn-lt"/>
+              <a:cs typeface="+mn-lt"/>
             </a:endParaRPr>
           </a:p>
           <a:p>
@@ -9751,11 +9978,11 @@
               <a:buChar char="○"/>
             </a:pPr>
             <a:r>
-              <a:rPr lang="en" dirty="0">
+              <a:rPr lang="en" sz="2800" dirty="0">
                 <a:ea typeface="+mn-lt"/>
                 <a:cs typeface="+mn-lt"/>
               </a:rPr>
-              <a:t>encourage the use of token-based API calls in the browser</a:t>
+              <a:t>log files</a:t>
             </a:r>
             <a:endParaRPr lang="en-US" dirty="0">
               <a:ea typeface="+mn-lt"/>
@@ -9774,13 +10001,13 @@
               <a:buChar char="○"/>
             </a:pPr>
             <a:r>
-              <a:rPr lang="en" dirty="0">
+              <a:rPr lang="en" sz="2800" dirty="0">
                 <a:ea typeface="+mn-lt"/>
                 <a:cs typeface="+mn-lt"/>
               </a:rPr>
-              <a:t>explicitly send tokens as opposed to automatic cookie transmission</a:t>
-            </a:r>
-            <a:endParaRPr lang="en-US" dirty="0">
+              <a:t>browser history</a:t>
+            </a:r>
+            <a:endParaRPr lang="en-US" sz="2800" dirty="0">
               <a:ea typeface="+mn-lt"/>
               <a:cs typeface="+mn-lt"/>
             </a:endParaRPr>
@@ -9797,47 +10024,13 @@
               <a:buChar char="○"/>
             </a:pPr>
             <a:r>
-              <a:rPr lang="en" dirty="0">
+              <a:rPr lang="en" sz="2800" dirty="0">
                 <a:ea typeface="+mn-lt"/>
                 <a:cs typeface="+mn-lt"/>
               </a:rPr>
-              <a:t>OAuth 2 implicit flow to overcome same-origin restrictions</a:t>
-            </a:r>
-            <a:endParaRPr lang="en-US">
-              <a:cs typeface="Calibri" panose="020F0502020204030204"/>
-            </a:endParaRPr>
-          </a:p>
-          <a:p>
-            <a:pPr marL="596900" lvl="1" indent="0">
-              <a:lnSpc>
-                <a:spcPct val="100000"/>
-              </a:lnSpc>
-              <a:spcBef>
-                <a:spcPts val="0"/>
-              </a:spcBef>
-              <a:buNone/>
-            </a:pPr>
-            <a:endParaRPr lang="en" dirty="0">
-              <a:cs typeface="Calibri"/>
-            </a:endParaRPr>
-          </a:p>
-          <a:p>
-            <a:pPr marL="482600" indent="-342900">
-              <a:lnSpc>
-                <a:spcPct val="100000"/>
-              </a:lnSpc>
-              <a:spcBef>
-                <a:spcPts val="0"/>
-              </a:spcBef>
-            </a:pPr>
-            <a:r>
-              <a:rPr lang="en" sz="2400" b="1" dirty="0">
-                <a:ea typeface="+mn-lt"/>
-                <a:cs typeface="+mn-lt"/>
-              </a:rPr>
-              <a:t>Lots of security compromises</a:t>
-            </a:r>
-            <a:endParaRPr lang="en-US" sz="2400" dirty="0">
+              <a:t>referrer headers</a:t>
+            </a:r>
+            <a:endParaRPr lang="en-US" sz="2800" dirty="0">
               <a:ea typeface="+mn-lt"/>
               <a:cs typeface="+mn-lt"/>
             </a:endParaRPr>
@@ -9850,17 +10043,17 @@
               <a:spcBef>
                 <a:spcPts val="0"/>
               </a:spcBef>
-              <a:buFont typeface="Arial,Sans-Serif"/>
+              <a:buFont typeface="Arial,Sans-Serif" panose="020B0604020202020204" pitchFamily="34" charset="0"/>
               <a:buChar char="○"/>
             </a:pPr>
             <a:r>
-              <a:rPr lang="en" dirty="0">
+              <a:rPr lang="en" sz="2800" dirty="0">
                 <a:ea typeface="+mn-lt"/>
                 <a:cs typeface="+mn-lt"/>
               </a:rPr>
-              <a:t>token transport over URLs</a:t>
-            </a:r>
-            <a:endParaRPr lang="en-US" dirty="0">
+              <a:t>implementation errors</a:t>
+            </a:r>
+            <a:endParaRPr lang="en-US" sz="2800" dirty="0">
               <a:ea typeface="+mn-lt"/>
               <a:cs typeface="+mn-lt"/>
             </a:endParaRPr>
@@ -9873,38 +10066,60 @@
               <a:spcBef>
                 <a:spcPts val="0"/>
               </a:spcBef>
-              <a:buFont typeface="Arial,Sans-Serif"/>
+              <a:buFont typeface="Arial,Sans-Serif" panose="020B0604020202020204" pitchFamily="34" charset="0"/>
               <a:buChar char="○"/>
             </a:pPr>
             <a:r>
-              <a:rPr lang="en" dirty="0">
+              <a:rPr lang="en" sz="2800" dirty="0">
                 <a:ea typeface="+mn-lt"/>
                 <a:cs typeface="+mn-lt"/>
               </a:rPr>
-              <a:t>token storage in the browser</a:t>
-            </a:r>
+              <a:t>proxies</a:t>
+            </a:r>
+            <a:endParaRPr lang="en-US" sz="2800" dirty="0">
+              <a:ea typeface="+mn-lt"/>
+              <a:cs typeface="+mn-lt"/>
+            </a:endParaRPr>
+          </a:p>
+          <a:p>
+            <a:pPr marL="685800">
+              <a:lnSpc>
+                <a:spcPct val="100000"/>
+              </a:lnSpc>
+              <a:spcBef>
+                <a:spcPts val="0"/>
+              </a:spcBef>
+            </a:pPr>
             <a:endParaRPr lang="en-US" dirty="0">
               <a:ea typeface="+mn-lt"/>
               <a:cs typeface="+mn-lt"/>
             </a:endParaRPr>
           </a:p>
           <a:p>
-            <a:pPr marL="914400" indent="0">
+            <a:pPr marL="457200" indent="-317500">
               <a:lnSpc>
                 <a:spcPct val="100000"/>
               </a:lnSpc>
               <a:spcBef>
                 <a:spcPts val="0"/>
               </a:spcBef>
-              <a:buNone/>
+              <a:buFont typeface="Arial,Sans-Serif" panose="020B0604020202020204" pitchFamily="34" charset="0"/>
+              <a:buChar char="●"/>
             </a:pPr>
-            <a:endParaRPr lang="en-US" sz="2400" dirty="0">
+            <a:r>
+              <a:rPr lang="en" b="1" dirty="0">
+                <a:ea typeface="+mn-lt"/>
+                <a:cs typeface="+mn-lt"/>
+              </a:rPr>
+              <a:t>No solution for token injection</a:t>
+            </a:r>
+            <a:endParaRPr lang="en-US" dirty="0">
               <a:ea typeface="+mn-lt"/>
               <a:cs typeface="+mn-lt"/>
             </a:endParaRPr>
           </a:p>
           <a:p>
-            <a:pPr marL="482600" indent="-342900">
+            <a:pPr>
               <a:lnSpc>
                 <a:spcPct val="100000"/>
               </a:lnSpc>
@@ -9912,17 +10127,53 @@
                 <a:spcPts val="0"/>
               </a:spcBef>
             </a:pPr>
-            <a:r>
-              <a:rPr lang="en" sz="2400" b="1" dirty="0">
+            <a:endParaRPr lang="en-US" dirty="0">
+              <a:ea typeface="+mn-lt"/>
+              <a:cs typeface="+mn-lt"/>
+            </a:endParaRPr>
+          </a:p>
+          <a:p>
+            <a:pPr marL="457200" indent="-317500">
+              <a:lnSpc>
+                <a:spcPct val="100000"/>
+              </a:lnSpc>
+              <a:spcBef>
+                <a:spcPts val="0"/>
+              </a:spcBef>
+              <a:buFont typeface="Arial,Sans-Serif" panose="020B0604020202020204" pitchFamily="34" charset="0"/>
+              <a:buChar char="●"/>
+            </a:pPr>
+            <a:r>
+              <a:rPr lang="en" b="1" dirty="0">
                 <a:ea typeface="+mn-lt"/>
                 <a:cs typeface="+mn-lt"/>
               </a:rPr>
-              <a:t>Threat: Cross Site Scripting</a:t>
-            </a:r>
-            <a:endParaRPr lang="en-US" sz="2400" dirty="0">
+              <a:t>Deprecated in OAuth 2.1</a:t>
+            </a:r>
+            <a:endParaRPr lang="en-US" dirty="0">
               <a:ea typeface="+mn-lt"/>
               <a:cs typeface="+mn-lt"/>
             </a:endParaRPr>
+          </a:p>
+          <a:p>
+            <a:pPr marL="914400" lvl="1" indent="-317500">
+              <a:lnSpc>
+                <a:spcPct val="100000"/>
+              </a:lnSpc>
+              <a:spcBef>
+                <a:spcPts val="0"/>
+              </a:spcBef>
+              <a:buFont typeface="Arial,Sans-Serif" panose="020B0604020202020204" pitchFamily="34" charset="0"/>
+              <a:buChar char="○"/>
+            </a:pPr>
+            <a:r>
+              <a:rPr lang="en" sz="2800" dirty="0">
+                <a:ea typeface="+mn-lt"/>
+                <a:cs typeface="+mn-lt"/>
+              </a:rPr>
+              <a:t>in favor of OAuth 2 Authorization Code Flow</a:t>
+            </a:r>
+            <a:endParaRPr lang="en-US" dirty="0"/>
           </a:p>
           <a:p>
             <a:pPr marL="596900" lvl="1" indent="0">
@@ -9953,7 +10204,7 @@
     </p:spTree>
     <p:extLst>
       <p:ext uri="{BB962C8B-B14F-4D97-AF65-F5344CB8AC3E}">
-        <p14:creationId xmlns:p14="http://schemas.microsoft.com/office/powerpoint/2010/main" val="1925372198"/>
+        <p14:creationId xmlns:p14="http://schemas.microsoft.com/office/powerpoint/2010/main" val="2463523320"/>
       </p:ext>
     </p:extLst>
   </p:cSld>
@@ -10041,7 +10292,7 @@
                 <a:ea typeface="+mj-lt"/>
                 <a:cs typeface="+mj-lt"/>
               </a:rPr>
-              <a:t>Challenge: Token Transmission</a:t>
+              <a:t>Challenge: Token Storage</a:t>
             </a:r>
             <a:endParaRPr lang="en-US" dirty="0">
               <a:solidFill>
@@ -10075,7 +10326,7 @@
         </p:spPr>
         <p:txBody>
           <a:bodyPr vert="horz" lIns="91440" tIns="45720" rIns="91440" bIns="45720" rtlCol="0" anchor="t">
-            <a:normAutofit lnSpcReduction="10000"/>
+            <a:normAutofit/>
           </a:bodyPr>
           <a:lstStyle/>
           <a:p>
@@ -10094,9 +10345,23 @@
                 <a:ea typeface="+mn-lt"/>
                 <a:cs typeface="+mn-lt"/>
               </a:rPr>
-              <a:t>Token transmission over URL is leaky</a:t>
-            </a:r>
-            <a:endParaRPr lang="en-US" dirty="0">
+              <a:t>The </a:t>
+            </a:r>
+            <a:r>
+              <a:rPr lang="en" sz="2800" b="1" dirty="0">
+                <a:ea typeface="+mn-lt"/>
+                <a:cs typeface="+mn-lt"/>
+              </a:rPr>
+              <a:t>browser </a:t>
+            </a:r>
+            <a:r>
+              <a:rPr lang="en" b="1" dirty="0">
+                <a:ea typeface="+mn-lt"/>
+                <a:cs typeface="+mn-lt"/>
+              </a:rPr>
+              <a:t>does not have "secure" storage</a:t>
+            </a:r>
+            <a:endParaRPr lang="en-US" sz="2800" dirty="0">
               <a:ea typeface="+mn-lt"/>
               <a:cs typeface="+mn-lt"/>
             </a:endParaRPr>
@@ -10117,7 +10382,44 @@
                 <a:ea typeface="+mn-lt"/>
                 <a:cs typeface="+mn-lt"/>
               </a:rPr>
-              <a:t>log files</a:t>
+              <a:t>by design storage is accessible via JavaScript</a:t>
+            </a:r>
+            <a:endParaRPr lang="en-US" sz="2800" dirty="0">
+              <a:ea typeface="+mn-lt"/>
+              <a:cs typeface="+mn-lt"/>
+            </a:endParaRPr>
+          </a:p>
+          <a:p>
+            <a:pPr marL="685800">
+              <a:lnSpc>
+                <a:spcPct val="100000"/>
+              </a:lnSpc>
+              <a:spcBef>
+                <a:spcPts val="0"/>
+              </a:spcBef>
+            </a:pPr>
+            <a:endParaRPr lang="en-US" sz="2800" dirty="0">
+              <a:ea typeface="+mn-lt"/>
+              <a:cs typeface="+mn-lt"/>
+            </a:endParaRPr>
+          </a:p>
+          <a:p>
+            <a:pPr marL="457200" indent="-317500">
+              <a:lnSpc>
+                <a:spcPct val="100000"/>
+              </a:lnSpc>
+              <a:spcBef>
+                <a:spcPts val="0"/>
+              </a:spcBef>
+              <a:buFont typeface="Arial,Sans-Serif" panose="020B0604020202020204" pitchFamily="34" charset="0"/>
+              <a:buChar char="●"/>
+            </a:pPr>
+            <a:r>
+              <a:rPr lang="en" b="1" dirty="0">
+                <a:ea typeface="+mn-lt"/>
+                <a:cs typeface="+mn-lt"/>
+              </a:rPr>
+              <a:t>Code injection attacks allow exfiltration of storage content</a:t>
             </a:r>
             <a:endParaRPr lang="en-US" dirty="0">
               <a:ea typeface="+mn-lt"/>
@@ -10136,13 +10438,13 @@
               <a:buChar char="○"/>
             </a:pPr>
             <a:r>
-              <a:rPr lang="en" sz="2800" dirty="0">
+              <a:rPr lang="en" dirty="0">
                 <a:ea typeface="+mn-lt"/>
                 <a:cs typeface="+mn-lt"/>
               </a:rPr>
-              <a:t>browser history</a:t>
-            </a:r>
-            <a:endParaRPr lang="en-US" sz="2800" dirty="0">
+              <a:t>injection attacks top threat on OWASP top ten</a:t>
+            </a:r>
+            <a:endParaRPr lang="en-US" dirty="0">
               <a:ea typeface="+mn-lt"/>
               <a:cs typeface="+mn-lt"/>
             </a:endParaRPr>
@@ -10159,59 +10461,14 @@
               <a:buChar char="○"/>
             </a:pPr>
             <a:r>
-              <a:rPr lang="en" sz="2800" dirty="0">
+              <a:rPr lang="en" dirty="0">
                 <a:ea typeface="+mn-lt"/>
                 <a:cs typeface="+mn-lt"/>
-              </a:rPr>
-              <a:t>referrer headers</a:t>
-            </a:r>
-            <a:endParaRPr lang="en-US" sz="2800" dirty="0">
-              <a:ea typeface="+mn-lt"/>
-              <a:cs typeface="+mn-lt"/>
-            </a:endParaRPr>
-          </a:p>
-          <a:p>
-            <a:pPr marL="914400" lvl="1" indent="-317500">
-              <a:lnSpc>
-                <a:spcPct val="100000"/>
-              </a:lnSpc>
-              <a:spcBef>
-                <a:spcPts val="0"/>
-              </a:spcBef>
-              <a:buFont typeface="Arial,Sans-Serif" panose="020B0604020202020204" pitchFamily="34" charset="0"/>
-              <a:buChar char="○"/>
-            </a:pPr>
-            <a:r>
-              <a:rPr lang="en" sz="2800" dirty="0">
-                <a:ea typeface="+mn-lt"/>
-                <a:cs typeface="+mn-lt"/>
-              </a:rPr>
-              <a:t>implementation errors</a:t>
-            </a:r>
-            <a:endParaRPr lang="en-US" sz="2800" dirty="0">
-              <a:ea typeface="+mn-lt"/>
-              <a:cs typeface="+mn-lt"/>
-            </a:endParaRPr>
-          </a:p>
-          <a:p>
-            <a:pPr marL="914400" lvl="1" indent="-317500">
-              <a:lnSpc>
-                <a:spcPct val="100000"/>
-              </a:lnSpc>
-              <a:spcBef>
-                <a:spcPts val="0"/>
-              </a:spcBef>
-              <a:buFont typeface="Arial,Sans-Serif" panose="020B0604020202020204" pitchFamily="34" charset="0"/>
-              <a:buChar char="○"/>
-            </a:pPr>
-            <a:r>
-              <a:rPr lang="en" sz="2800" dirty="0">
-                <a:ea typeface="+mn-lt"/>
-                <a:cs typeface="+mn-lt"/>
-              </a:rPr>
-              <a:t>proxies</a:t>
-            </a:r>
-            <a:endParaRPr lang="en-US" sz="2800" dirty="0">
+                <a:hlinkClick r:id="rId3"/>
+              </a:rPr>
+              <a:t>https://www.securityweek.com/google-releases-poc-exploit-browser-based-spectre-attack</a:t>
+            </a:r>
+            <a:endParaRPr lang="en-US" dirty="0">
               <a:ea typeface="+mn-lt"/>
               <a:cs typeface="+mn-lt"/>
             </a:endParaRPr>
@@ -10246,7 +10503,21 @@
                 <a:ea typeface="+mn-lt"/>
                 <a:cs typeface="+mn-lt"/>
               </a:rPr>
-              <a:t>No solution for token injection</a:t>
+              <a:t>That's why Implicit </a:t>
+            </a:r>
+            <a:r>
+              <a:rPr lang="en" sz="2800" b="1" dirty="0">
+                <a:ea typeface="+mn-lt"/>
+                <a:cs typeface="+mn-lt"/>
+              </a:rPr>
+              <a:t>Flow</a:t>
+            </a:r>
+            <a:r>
+              <a:rPr lang="en" b="1" dirty="0">
+                <a:ea typeface="+mn-lt"/>
+                <a:cs typeface="+mn-lt"/>
+              </a:rPr>
+              <a:t> does not allow refresh tokens</a:t>
             </a:r>
             <a:endParaRPr lang="en-US" dirty="0">
               <a:ea typeface="+mn-lt"/>
@@ -10254,84 +10525,18 @@
             </a:endParaRPr>
           </a:p>
           <a:p>
-            <a:pPr>
+            <a:pPr marL="0" indent="0">
               <a:lnSpc>
                 <a:spcPct val="100000"/>
               </a:lnSpc>
               <a:spcBef>
                 <a:spcPts val="0"/>
               </a:spcBef>
+              <a:buNone/>
             </a:pPr>
             <a:endParaRPr lang="en-US" dirty="0">
               <a:ea typeface="+mn-lt"/>
               <a:cs typeface="+mn-lt"/>
-            </a:endParaRPr>
-          </a:p>
-          <a:p>
-            <a:pPr marL="457200" indent="-317500">
-              <a:lnSpc>
-                <a:spcPct val="100000"/>
-              </a:lnSpc>
-              <a:spcBef>
-                <a:spcPts val="0"/>
-              </a:spcBef>
-              <a:buFont typeface="Arial,Sans-Serif" panose="020B0604020202020204" pitchFamily="34" charset="0"/>
-              <a:buChar char="●"/>
-            </a:pPr>
-            <a:r>
-              <a:rPr lang="en" b="1" dirty="0">
-                <a:ea typeface="+mn-lt"/>
-                <a:cs typeface="+mn-lt"/>
-              </a:rPr>
-              <a:t>Deprecated in OAuth 2.1</a:t>
-            </a:r>
-            <a:endParaRPr lang="en-US" dirty="0">
-              <a:ea typeface="+mn-lt"/>
-              <a:cs typeface="+mn-lt"/>
-            </a:endParaRPr>
-          </a:p>
-          <a:p>
-            <a:pPr marL="914400" lvl="1" indent="-317500">
-              <a:lnSpc>
-                <a:spcPct val="100000"/>
-              </a:lnSpc>
-              <a:spcBef>
-                <a:spcPts val="0"/>
-              </a:spcBef>
-              <a:buFont typeface="Arial,Sans-Serif" panose="020B0604020202020204" pitchFamily="34" charset="0"/>
-              <a:buChar char="○"/>
-            </a:pPr>
-            <a:r>
-              <a:rPr lang="en" sz="2800" dirty="0">
-                <a:ea typeface="+mn-lt"/>
-                <a:cs typeface="+mn-lt"/>
-              </a:rPr>
-              <a:t>in favor of OAuth 2 Authorization Code Flow</a:t>
-            </a:r>
-            <a:endParaRPr lang="en-US" dirty="0"/>
-          </a:p>
-          <a:p>
-            <a:pPr marL="596900" lvl="1" indent="0">
-              <a:lnSpc>
-                <a:spcPct val="100000"/>
-              </a:lnSpc>
-              <a:spcBef>
-                <a:spcPts val="0"/>
-              </a:spcBef>
-              <a:buNone/>
-            </a:pPr>
-            <a:endParaRPr lang="en" dirty="0">
-              <a:cs typeface="Calibri"/>
-            </a:endParaRPr>
-          </a:p>
-          <a:p>
-            <a:endParaRPr lang="en-US" dirty="0">
-              <a:cs typeface="Calibri"/>
-            </a:endParaRPr>
-          </a:p>
-          <a:p>
-            <a:endParaRPr lang="en" dirty="0">
-              <a:cs typeface="Calibri"/>
             </a:endParaRPr>
           </a:p>
         </p:txBody>
@@ -10339,7 +10544,7 @@
     </p:spTree>
     <p:extLst>
       <p:ext uri="{BB962C8B-B14F-4D97-AF65-F5344CB8AC3E}">
-        <p14:creationId xmlns:p14="http://schemas.microsoft.com/office/powerpoint/2010/main" val="2463523320"/>
+        <p14:creationId xmlns:p14="http://schemas.microsoft.com/office/powerpoint/2010/main" val="468047506"/>
       </p:ext>
     </p:extLst>
   </p:cSld>

</xml_diff>